<commit_message>
publish only home and about
</commit_message>
<xml_diff>
--- a/public/images/logo-RCM-coop-dev.pptx
+++ b/public/images/logo-RCM-coop-dev.pptx
@@ -12,6 +12,7 @@
     <p:sldId id="269" r:id="rId6"/>
     <p:sldId id="267" r:id="rId7"/>
     <p:sldId id="268" r:id="rId8"/>
+    <p:sldId id="270" r:id="rId9"/>
   </p:sldIdLst>
   <p:sldSz cx="12192000" cy="6858000"/>
   <p:notesSz cx="6858000" cy="9144000"/>
@@ -121,7 +122,7 @@
 <file path=ppt/revisionInfo.xml><?xml version="1.0" encoding="utf-8"?>
 <p1510:revInfo xmlns:a="http://schemas.openxmlformats.org/drawingml/2006/main" xmlns:r="http://schemas.openxmlformats.org/officeDocument/2006/relationships" xmlns:p1510="http://schemas.microsoft.com/office/powerpoint/2015/10/main">
   <p1510:revLst>
-    <p1510:client id="{F1C8B9D2-4377-2C45-B746-CF37BA7A4C1F}" v="15" dt="2025-01-30T22:02:56.202"/>
+    <p1510:client id="{F1C8B9D2-4377-2C45-B746-CF37BA7A4C1F}" v="38" dt="2025-02-07T10:13:18.520"/>
   </p1510:revLst>
 </p1510:revInfo>
 </file>
@@ -131,7 +132,7 @@
   <pc:docChgLst>
     <pc:chgData name="Cassandra Gould Van Praag" userId="d2248499-4cc7-4575-92a4-3dec06827e7f" providerId="ADAL" clId="{F1C8B9D2-4377-2C45-B746-CF37BA7A4C1F}"/>
     <pc:docChg chg="undo redo custSel addSld delSld modSld sldOrd">
-      <pc:chgData name="Cassandra Gould Van Praag" userId="d2248499-4cc7-4575-92a4-3dec06827e7f" providerId="ADAL" clId="{F1C8B9D2-4377-2C45-B746-CF37BA7A4C1F}" dt="2025-01-30T22:02:56.202" v="237"/>
+      <pc:chgData name="Cassandra Gould Van Praag" userId="d2248499-4cc7-4575-92a4-3dec06827e7f" providerId="ADAL" clId="{F1C8B9D2-4377-2C45-B746-CF37BA7A4C1F}" dt="2025-02-07T10:13:18.520" v="355" actId="164"/>
       <pc:docMkLst>
         <pc:docMk/>
       </pc:docMkLst>
@@ -195,46 +196,6 @@
           <pc:docMk/>
           <pc:sldMk cId="2574613050" sldId="259"/>
         </pc:sldMkLst>
-        <pc:spChg chg="add mod">
-          <ac:chgData name="Cassandra Gould Van Praag" userId="d2248499-4cc7-4575-92a4-3dec06827e7f" providerId="ADAL" clId="{F1C8B9D2-4377-2C45-B746-CF37BA7A4C1F}" dt="2025-01-30T17:30:04.135" v="61" actId="1076"/>
-          <ac:spMkLst>
-            <pc:docMk/>
-            <pc:sldMk cId="2574613050" sldId="259"/>
-            <ac:spMk id="2" creationId="{B4238814-DB62-06FF-1D21-5F19FED69465}"/>
-          </ac:spMkLst>
-        </pc:spChg>
-        <pc:spChg chg="add mod">
-          <ac:chgData name="Cassandra Gould Van Praag" userId="d2248499-4cc7-4575-92a4-3dec06827e7f" providerId="ADAL" clId="{F1C8B9D2-4377-2C45-B746-CF37BA7A4C1F}" dt="2025-01-30T17:31:37.519" v="82" actId="14100"/>
-          <ac:spMkLst>
-            <pc:docMk/>
-            <pc:sldMk cId="2574613050" sldId="259"/>
-            <ac:spMk id="3" creationId="{E9B23948-0454-DA29-2656-D2F569A31C99}"/>
-          </ac:spMkLst>
-        </pc:spChg>
-        <pc:spChg chg="del">
-          <ac:chgData name="Cassandra Gould Van Praag" userId="d2248499-4cc7-4575-92a4-3dec06827e7f" providerId="ADAL" clId="{F1C8B9D2-4377-2C45-B746-CF37BA7A4C1F}" dt="2025-01-30T17:29:43.107" v="55" actId="478"/>
-          <ac:spMkLst>
-            <pc:docMk/>
-            <pc:sldMk cId="2574613050" sldId="259"/>
-            <ac:spMk id="16" creationId="{E3257FD5-55F4-69D9-4612-89B8C62ED5B9}"/>
-          </ac:spMkLst>
-        </pc:spChg>
-        <pc:spChg chg="del">
-          <ac:chgData name="Cassandra Gould Van Praag" userId="d2248499-4cc7-4575-92a4-3dec06827e7f" providerId="ADAL" clId="{F1C8B9D2-4377-2C45-B746-CF37BA7A4C1F}" dt="2025-01-30T17:29:44.301" v="56" actId="478"/>
-          <ac:spMkLst>
-            <pc:docMk/>
-            <pc:sldMk cId="2574613050" sldId="259"/>
-            <ac:spMk id="17" creationId="{DC5EF9F4-CD46-D8D7-FB73-A22D9034D777}"/>
-          </ac:spMkLst>
-        </pc:spChg>
-        <pc:picChg chg="mod">
-          <ac:chgData name="Cassandra Gould Van Praag" userId="d2248499-4cc7-4575-92a4-3dec06827e7f" providerId="ADAL" clId="{F1C8B9D2-4377-2C45-B746-CF37BA7A4C1F}" dt="2025-01-30T17:32:15.345" v="85" actId="1076"/>
-          <ac:picMkLst>
-            <pc:docMk/>
-            <pc:sldMk cId="2574613050" sldId="259"/>
-            <ac:picMk id="15" creationId="{85E148AC-4F00-4777-5B13-0BE52AC5C365}"/>
-          </ac:picMkLst>
-        </pc:picChg>
       </pc:sldChg>
       <pc:sldChg chg="delSp modSp add del mod">
         <pc:chgData name="Cassandra Gould Van Praag" userId="d2248499-4cc7-4575-92a4-3dec06827e7f" providerId="ADAL" clId="{F1C8B9D2-4377-2C45-B746-CF37BA7A4C1F}" dt="2025-01-30T17:53:41.637" v="206" actId="2696"/>
@@ -242,30 +203,6 @@
           <pc:docMk/>
           <pc:sldMk cId="352792775" sldId="260"/>
         </pc:sldMkLst>
-        <pc:spChg chg="mod">
-          <ac:chgData name="Cassandra Gould Van Praag" userId="d2248499-4cc7-4575-92a4-3dec06827e7f" providerId="ADAL" clId="{F1C8B9D2-4377-2C45-B746-CF37BA7A4C1F}" dt="2025-01-30T17:41:06.583" v="110" actId="1076"/>
-          <ac:spMkLst>
-            <pc:docMk/>
-            <pc:sldMk cId="352792775" sldId="260"/>
-            <ac:spMk id="16" creationId="{332CE46B-A105-2785-BE17-AEFA03BBF710}"/>
-          </ac:spMkLst>
-        </pc:spChg>
-        <pc:spChg chg="del">
-          <ac:chgData name="Cassandra Gould Van Praag" userId="d2248499-4cc7-4575-92a4-3dec06827e7f" providerId="ADAL" clId="{F1C8B9D2-4377-2C45-B746-CF37BA7A4C1F}" dt="2025-01-30T17:40:12.227" v="92" actId="478"/>
-          <ac:spMkLst>
-            <pc:docMk/>
-            <pc:sldMk cId="352792775" sldId="260"/>
-            <ac:spMk id="17" creationId="{C3A15379-BEC3-4A79-3639-3E48E7B04E32}"/>
-          </ac:spMkLst>
-        </pc:spChg>
-        <pc:picChg chg="mod">
-          <ac:chgData name="Cassandra Gould Van Praag" userId="d2248499-4cc7-4575-92a4-3dec06827e7f" providerId="ADAL" clId="{F1C8B9D2-4377-2C45-B746-CF37BA7A4C1F}" dt="2025-01-30T17:41:02.676" v="109" actId="1076"/>
-          <ac:picMkLst>
-            <pc:docMk/>
-            <pc:sldMk cId="352792775" sldId="260"/>
-            <ac:picMk id="15" creationId="{20A4AC6B-0CE3-6530-7B80-599B48B8756F}"/>
-          </ac:picMkLst>
-        </pc:picChg>
       </pc:sldChg>
       <pc:sldChg chg="modSp add del">
         <pc:chgData name="Cassandra Gould Van Praag" userId="d2248499-4cc7-4575-92a4-3dec06827e7f" providerId="ADAL" clId="{F1C8B9D2-4377-2C45-B746-CF37BA7A4C1F}" dt="2025-01-30T17:40:02.039" v="91" actId="2696"/>
@@ -273,14 +210,6 @@
           <pc:docMk/>
           <pc:sldMk cId="1433239986" sldId="261"/>
         </pc:sldMkLst>
-        <pc:picChg chg="mod">
-          <ac:chgData name="Cassandra Gould Van Praag" userId="d2248499-4cc7-4575-92a4-3dec06827e7f" providerId="ADAL" clId="{F1C8B9D2-4377-2C45-B746-CF37BA7A4C1F}" dt="2025-01-30T17:33:31.783" v="87" actId="1367"/>
-          <ac:picMkLst>
-            <pc:docMk/>
-            <pc:sldMk cId="1433239986" sldId="261"/>
-            <ac:picMk id="15" creationId="{FA396F7D-34D7-9BC1-DEAE-1C468560EF18}"/>
-          </ac:picMkLst>
-        </pc:picChg>
       </pc:sldChg>
       <pc:sldChg chg="modSp add mod">
         <pc:chgData name="Cassandra Gould Van Praag" userId="d2248499-4cc7-4575-92a4-3dec06827e7f" providerId="ADAL" clId="{F1C8B9D2-4377-2C45-B746-CF37BA7A4C1F}" dt="2025-01-30T17:37:47.664" v="90" actId="1076"/>
@@ -303,22 +232,6 @@
           <pc:docMk/>
           <pc:sldMk cId="514661090" sldId="263"/>
         </pc:sldMkLst>
-        <pc:spChg chg="mod">
-          <ac:chgData name="Cassandra Gould Van Praag" userId="d2248499-4cc7-4575-92a4-3dec06827e7f" providerId="ADAL" clId="{F1C8B9D2-4377-2C45-B746-CF37BA7A4C1F}" dt="2025-01-30T17:42:26.395" v="123" actId="14100"/>
-          <ac:spMkLst>
-            <pc:docMk/>
-            <pc:sldMk cId="514661090" sldId="263"/>
-            <ac:spMk id="16" creationId="{2C9B62ED-6DF4-C386-D5D7-DABCC7B55213}"/>
-          </ac:spMkLst>
-        </pc:spChg>
-        <pc:picChg chg="mod">
-          <ac:chgData name="Cassandra Gould Van Praag" userId="d2248499-4cc7-4575-92a4-3dec06827e7f" providerId="ADAL" clId="{F1C8B9D2-4377-2C45-B746-CF37BA7A4C1F}" dt="2025-01-30T17:42:32.194" v="125" actId="1076"/>
-          <ac:picMkLst>
-            <pc:docMk/>
-            <pc:sldMk cId="514661090" sldId="263"/>
-            <ac:picMk id="15" creationId="{6F14179E-3441-05B3-B5ED-2DB10A1FBD55}"/>
-          </ac:picMkLst>
-        </pc:picChg>
       </pc:sldChg>
       <pc:sldChg chg="addSp delSp modSp add del mod ord">
         <pc:chgData name="Cassandra Gould Van Praag" userId="d2248499-4cc7-4575-92a4-3dec06827e7f" providerId="ADAL" clId="{F1C8B9D2-4377-2C45-B746-CF37BA7A4C1F}" dt="2025-01-30T17:52:24.494" v="202" actId="2696"/>
@@ -326,38 +239,6 @@
           <pc:docMk/>
           <pc:sldMk cId="4258866302" sldId="264"/>
         </pc:sldMkLst>
-        <pc:spChg chg="add mod">
-          <ac:chgData name="Cassandra Gould Van Praag" userId="d2248499-4cc7-4575-92a4-3dec06827e7f" providerId="ADAL" clId="{F1C8B9D2-4377-2C45-B746-CF37BA7A4C1F}" dt="2025-01-30T17:47:36.844" v="168" actId="1076"/>
-          <ac:spMkLst>
-            <pc:docMk/>
-            <pc:sldMk cId="4258866302" sldId="264"/>
-            <ac:spMk id="2" creationId="{3529324F-D9C2-0987-1120-57258C40A03C}"/>
-          </ac:spMkLst>
-        </pc:spChg>
-        <pc:spChg chg="mod">
-          <ac:chgData name="Cassandra Gould Van Praag" userId="d2248499-4cc7-4575-92a4-3dec06827e7f" providerId="ADAL" clId="{F1C8B9D2-4377-2C45-B746-CF37BA7A4C1F}" dt="2025-01-30T17:47:44.517" v="170" actId="1076"/>
-          <ac:spMkLst>
-            <pc:docMk/>
-            <pc:sldMk cId="4258866302" sldId="264"/>
-            <ac:spMk id="16" creationId="{FDF5876F-BC57-6C1D-C4DD-39701D688908}"/>
-          </ac:spMkLst>
-        </pc:spChg>
-        <pc:spChg chg="del">
-          <ac:chgData name="Cassandra Gould Van Praag" userId="d2248499-4cc7-4575-92a4-3dec06827e7f" providerId="ADAL" clId="{F1C8B9D2-4377-2C45-B746-CF37BA7A4C1F}" dt="2025-01-30T17:44:30.734" v="129" actId="478"/>
-          <ac:spMkLst>
-            <pc:docMk/>
-            <pc:sldMk cId="4258866302" sldId="264"/>
-            <ac:spMk id="17" creationId="{804DEC0F-7581-9070-AEA8-B589F6CA8B5B}"/>
-          </ac:spMkLst>
-        </pc:spChg>
-        <pc:picChg chg="mod">
-          <ac:chgData name="Cassandra Gould Van Praag" userId="d2248499-4cc7-4575-92a4-3dec06827e7f" providerId="ADAL" clId="{F1C8B9D2-4377-2C45-B746-CF37BA7A4C1F}" dt="2025-01-30T17:47:26.606" v="167" actId="1076"/>
-          <ac:picMkLst>
-            <pc:docMk/>
-            <pc:sldMk cId="4258866302" sldId="264"/>
-            <ac:picMk id="15" creationId="{984F923B-2453-C3F2-63F2-269BE29AF37C}"/>
-          </ac:picMkLst>
-        </pc:picChg>
       </pc:sldChg>
       <pc:sldChg chg="addSp delSp modSp add del mod">
         <pc:chgData name="Cassandra Gould Van Praag" userId="d2248499-4cc7-4575-92a4-3dec06827e7f" providerId="ADAL" clId="{F1C8B9D2-4377-2C45-B746-CF37BA7A4C1F}" dt="2025-01-30T17:57:00.345" v="221" actId="2696"/>
@@ -365,38 +246,6 @@
           <pc:docMk/>
           <pc:sldMk cId="2775549265" sldId="265"/>
         </pc:sldMkLst>
-        <pc:spChg chg="mod">
-          <ac:chgData name="Cassandra Gould Van Praag" userId="d2248499-4cc7-4575-92a4-3dec06827e7f" providerId="ADAL" clId="{F1C8B9D2-4377-2C45-B746-CF37BA7A4C1F}" dt="2025-01-30T17:52:33.452" v="203" actId="207"/>
-          <ac:spMkLst>
-            <pc:docMk/>
-            <pc:sldMk cId="2775549265" sldId="265"/>
-            <ac:spMk id="2" creationId="{C68292D8-5FF6-C940-4DCD-7413A6FC592A}"/>
-          </ac:spMkLst>
-        </pc:spChg>
-        <pc:spChg chg="add del mod">
-          <ac:chgData name="Cassandra Gould Van Praag" userId="d2248499-4cc7-4575-92a4-3dec06827e7f" providerId="ADAL" clId="{F1C8B9D2-4377-2C45-B746-CF37BA7A4C1F}" dt="2025-01-30T17:52:48.456" v="205" actId="478"/>
-          <ac:spMkLst>
-            <pc:docMk/>
-            <pc:sldMk cId="2775549265" sldId="265"/>
-            <ac:spMk id="3" creationId="{D58FC199-67D1-D1F6-07A9-52894542CACA}"/>
-          </ac:spMkLst>
-        </pc:spChg>
-        <pc:spChg chg="mod">
-          <ac:chgData name="Cassandra Gould Van Praag" userId="d2248499-4cc7-4575-92a4-3dec06827e7f" providerId="ADAL" clId="{F1C8B9D2-4377-2C45-B746-CF37BA7A4C1F}" dt="2025-01-30T17:52:33.452" v="203" actId="207"/>
-          <ac:spMkLst>
-            <pc:docMk/>
-            <pc:sldMk cId="2775549265" sldId="265"/>
-            <ac:spMk id="16" creationId="{B4E9B1A2-FDB7-0BD9-0AE6-299ADCBDF234}"/>
-          </ac:spMkLst>
-        </pc:spChg>
-        <pc:picChg chg="mod">
-          <ac:chgData name="Cassandra Gould Van Praag" userId="d2248499-4cc7-4575-92a4-3dec06827e7f" providerId="ADAL" clId="{F1C8B9D2-4377-2C45-B746-CF37BA7A4C1F}" dt="2025-01-30T17:52:45.994" v="204"/>
-          <ac:picMkLst>
-            <pc:docMk/>
-            <pc:sldMk cId="2775549265" sldId="265"/>
-            <ac:picMk id="15" creationId="{6E58D2D4-82F5-F17D-DDD5-5D824EE20DE0}"/>
-          </ac:picMkLst>
-        </pc:picChg>
       </pc:sldChg>
       <pc:sldChg chg="modSp add del mod">
         <pc:chgData name="Cassandra Gould Van Praag" userId="d2248499-4cc7-4575-92a4-3dec06827e7f" providerId="ADAL" clId="{F1C8B9D2-4377-2C45-B746-CF37BA7A4C1F}" dt="2025-01-30T17:57:18.870" v="225" actId="2696"/>
@@ -404,22 +253,6 @@
           <pc:docMk/>
           <pc:sldMk cId="4243949110" sldId="266"/>
         </pc:sldMkLst>
-        <pc:spChg chg="mod">
-          <ac:chgData name="Cassandra Gould Van Praag" userId="d2248499-4cc7-4575-92a4-3dec06827e7f" providerId="ADAL" clId="{F1C8B9D2-4377-2C45-B746-CF37BA7A4C1F}" dt="2025-01-30T17:56:43.605" v="220" actId="1037"/>
-          <ac:spMkLst>
-            <pc:docMk/>
-            <pc:sldMk cId="4243949110" sldId="266"/>
-            <ac:spMk id="2" creationId="{2F96B286-046B-ADD3-C419-74D432EB5BB1}"/>
-          </ac:spMkLst>
-        </pc:spChg>
-        <pc:spChg chg="mod">
-          <ac:chgData name="Cassandra Gould Van Praag" userId="d2248499-4cc7-4575-92a4-3dec06827e7f" providerId="ADAL" clId="{F1C8B9D2-4377-2C45-B746-CF37BA7A4C1F}" dt="2025-01-30T17:56:43.605" v="220" actId="1037"/>
-          <ac:spMkLst>
-            <pc:docMk/>
-            <pc:sldMk cId="4243949110" sldId="266"/>
-            <ac:spMk id="16" creationId="{2E763038-4A81-99FD-FA68-26BD13BF37A4}"/>
-          </ac:spMkLst>
-        </pc:spChg>
       </pc:sldChg>
       <pc:sldChg chg="delSp modSp add mod">
         <pc:chgData name="Cassandra Gould Van Praag" userId="d2248499-4cc7-4575-92a4-3dec06827e7f" providerId="ADAL" clId="{F1C8B9D2-4377-2C45-B746-CF37BA7A4C1F}" dt="2025-01-30T17:57:38.954" v="229" actId="478"/>
@@ -433,14 +266,6 @@
             <pc:docMk/>
             <pc:sldMk cId="991837179" sldId="267"/>
             <ac:spMk id="2" creationId="{35E25FF8-0506-8A6F-340C-46F748CA9204}"/>
-          </ac:spMkLst>
-        </pc:spChg>
-        <pc:spChg chg="del">
-          <ac:chgData name="Cassandra Gould Van Praag" userId="d2248499-4cc7-4575-92a4-3dec06827e7f" providerId="ADAL" clId="{F1C8B9D2-4377-2C45-B746-CF37BA7A4C1F}" dt="2025-01-30T17:57:38.954" v="229" actId="478"/>
-          <ac:spMkLst>
-            <pc:docMk/>
-            <pc:sldMk cId="991837179" sldId="267"/>
-            <ac:spMk id="3" creationId="{16A6B215-D626-CA69-F6E2-704DE34CD1F5}"/>
           </ac:spMkLst>
         </pc:spChg>
         <pc:spChg chg="mod">
@@ -468,41 +293,208 @@
         </pc:sldMkLst>
       </pc:sldChg>
       <pc:sldChg chg="addSp delSp modSp add mod">
-        <pc:chgData name="Cassandra Gould Van Praag" userId="d2248499-4cc7-4575-92a4-3dec06827e7f" providerId="ADAL" clId="{F1C8B9D2-4377-2C45-B746-CF37BA7A4C1F}" dt="2025-01-30T22:02:56.202" v="237"/>
+        <pc:chgData name="Cassandra Gould Van Praag" userId="d2248499-4cc7-4575-92a4-3dec06827e7f" providerId="ADAL" clId="{F1C8B9D2-4377-2C45-B746-CF37BA7A4C1F}" dt="2025-02-07T10:13:18.520" v="355" actId="164"/>
         <pc:sldMkLst>
           <pc:docMk/>
           <pc:sldMk cId="2701810344" sldId="269"/>
         </pc:sldMkLst>
-        <pc:spChg chg="del">
-          <ac:chgData name="Cassandra Gould Van Praag" userId="d2248499-4cc7-4575-92a4-3dec06827e7f" providerId="ADAL" clId="{F1C8B9D2-4377-2C45-B746-CF37BA7A4C1F}" dt="2025-01-30T21:53:13.683" v="231" actId="478"/>
+        <pc:spChg chg="add mod">
+          <ac:chgData name="Cassandra Gould Van Praag" userId="d2248499-4cc7-4575-92a4-3dec06827e7f" providerId="ADAL" clId="{F1C8B9D2-4377-2C45-B746-CF37BA7A4C1F}" dt="2025-02-07T10:13:18.520" v="355" actId="164"/>
           <ac:spMkLst>
             <pc:docMk/>
             <pc:sldMk cId="2701810344" sldId="269"/>
-            <ac:spMk id="2" creationId="{CA2ACC63-036E-A131-47D4-EFCA030AFB3D}"/>
+            <ac:spMk id="3" creationId="{FC931A71-8F07-4615-EA8F-299BB557D16C}"/>
           </ac:spMkLst>
         </pc:spChg>
-        <pc:spChg chg="del">
-          <ac:chgData name="Cassandra Gould Van Praag" userId="d2248499-4cc7-4575-92a4-3dec06827e7f" providerId="ADAL" clId="{F1C8B9D2-4377-2C45-B746-CF37BA7A4C1F}" dt="2025-01-30T21:53:22.076" v="234" actId="478"/>
-          <ac:spMkLst>
+        <pc:grpChg chg="add mod">
+          <ac:chgData name="Cassandra Gould Van Praag" userId="d2248499-4cc7-4575-92a4-3dec06827e7f" providerId="ADAL" clId="{F1C8B9D2-4377-2C45-B746-CF37BA7A4C1F}" dt="2025-02-07T10:13:18.520" v="355" actId="164"/>
+          <ac:grpSpMkLst>
             <pc:docMk/>
             <pc:sldMk cId="2701810344" sldId="269"/>
-            <ac:spMk id="3" creationId="{4F2DE65E-95E7-8A45-3E16-DAD1F46FCAE4}"/>
-          </ac:spMkLst>
-        </pc:spChg>
-        <pc:picChg chg="add">
-          <ac:chgData name="Cassandra Gould Van Praag" userId="d2248499-4cc7-4575-92a4-3dec06827e7f" providerId="ADAL" clId="{F1C8B9D2-4377-2C45-B746-CF37BA7A4C1F}" dt="2025-01-30T22:02:56.202" v="237"/>
+            <ac:grpSpMk id="5" creationId="{DF522D1C-2A32-B6AB-504D-235668705A32}"/>
+          </ac:grpSpMkLst>
+        </pc:grpChg>
+        <pc:picChg chg="add mod">
+          <ac:chgData name="Cassandra Gould Van Praag" userId="d2248499-4cc7-4575-92a4-3dec06827e7f" providerId="ADAL" clId="{F1C8B9D2-4377-2C45-B746-CF37BA7A4C1F}" dt="2025-02-07T10:13:18.520" v="355" actId="164"/>
+          <ac:picMkLst>
+            <pc:docMk/>
+            <pc:sldMk cId="2701810344" sldId="269"/>
+            <ac:picMk id="2" creationId="{293A383B-D661-097B-B5A0-DE2FA2F3E07E}"/>
+          </ac:picMkLst>
+        </pc:picChg>
+        <pc:picChg chg="add mod">
+          <ac:chgData name="Cassandra Gould Van Praag" userId="d2248499-4cc7-4575-92a4-3dec06827e7f" providerId="ADAL" clId="{F1C8B9D2-4377-2C45-B746-CF37BA7A4C1F}" dt="2025-02-07T10:11:26.852" v="337" actId="1076"/>
           <ac:picMkLst>
             <pc:docMk/>
             <pc:sldMk cId="2701810344" sldId="269"/>
             <ac:picMk id="4" creationId="{D9F51890-851B-182B-22AB-68656A8B163C}"/>
           </ac:picMkLst>
         </pc:picChg>
-        <pc:picChg chg="add del mod">
-          <ac:chgData name="Cassandra Gould Van Praag" userId="d2248499-4cc7-4575-92a4-3dec06827e7f" providerId="ADAL" clId="{F1C8B9D2-4377-2C45-B746-CF37BA7A4C1F}" dt="2025-01-30T22:02:55.269" v="236" actId="478"/>
+      </pc:sldChg>
+      <pc:sldChg chg="addSp delSp modSp new mod">
+        <pc:chgData name="Cassandra Gould Van Praag" userId="d2248499-4cc7-4575-92a4-3dec06827e7f" providerId="ADAL" clId="{F1C8B9D2-4377-2C45-B746-CF37BA7A4C1F}" dt="2025-02-05T17:09:10.041" v="336"/>
+        <pc:sldMkLst>
+          <pc:docMk/>
+          <pc:sldMk cId="193331974" sldId="270"/>
+        </pc:sldMkLst>
+        <pc:spChg chg="add mod">
+          <ac:chgData name="Cassandra Gould Van Praag" userId="d2248499-4cc7-4575-92a4-3dec06827e7f" providerId="ADAL" clId="{F1C8B9D2-4377-2C45-B746-CF37BA7A4C1F}" dt="2025-02-05T14:35:47.097" v="247" actId="14100"/>
+          <ac:spMkLst>
+            <pc:docMk/>
+            <pc:sldMk cId="193331974" sldId="270"/>
+            <ac:spMk id="7" creationId="{510AC43B-3FA6-4EDB-B4C0-D6F042277F3A}"/>
+          </ac:spMkLst>
+        </pc:spChg>
+        <pc:spChg chg="add mod">
+          <ac:chgData name="Cassandra Gould Van Praag" userId="d2248499-4cc7-4575-92a4-3dec06827e7f" providerId="ADAL" clId="{F1C8B9D2-4377-2C45-B746-CF37BA7A4C1F}" dt="2025-02-05T16:08:43.662" v="311" actId="1076"/>
+          <ac:spMkLst>
+            <pc:docMk/>
+            <pc:sldMk cId="193331974" sldId="270"/>
+            <ac:spMk id="8" creationId="{D731146C-C63B-7A41-459B-219AE4B9205B}"/>
+          </ac:spMkLst>
+        </pc:spChg>
+        <pc:spChg chg="add mod">
+          <ac:chgData name="Cassandra Gould Van Praag" userId="d2248499-4cc7-4575-92a4-3dec06827e7f" providerId="ADAL" clId="{F1C8B9D2-4377-2C45-B746-CF37BA7A4C1F}" dt="2025-02-05T16:08:43.662" v="311" actId="1076"/>
+          <ac:spMkLst>
+            <pc:docMk/>
+            <pc:sldMk cId="193331974" sldId="270"/>
+            <ac:spMk id="10" creationId="{EA6C578D-DD32-9010-B015-64E163037C15}"/>
+          </ac:spMkLst>
+        </pc:spChg>
+        <pc:spChg chg="add mod">
+          <ac:chgData name="Cassandra Gould Van Praag" userId="d2248499-4cc7-4575-92a4-3dec06827e7f" providerId="ADAL" clId="{F1C8B9D2-4377-2C45-B746-CF37BA7A4C1F}" dt="2025-02-05T16:08:43.662" v="311" actId="1076"/>
+          <ac:spMkLst>
+            <pc:docMk/>
+            <pc:sldMk cId="193331974" sldId="270"/>
+            <ac:spMk id="11" creationId="{399F9095-9C4E-6779-27EA-F30011A44430}"/>
+          </ac:spMkLst>
+        </pc:spChg>
+        <pc:spChg chg="add mod">
+          <ac:chgData name="Cassandra Gould Van Praag" userId="d2248499-4cc7-4575-92a4-3dec06827e7f" providerId="ADAL" clId="{F1C8B9D2-4377-2C45-B746-CF37BA7A4C1F}" dt="2025-02-05T16:08:43.662" v="311" actId="1076"/>
+          <ac:spMkLst>
+            <pc:docMk/>
+            <pc:sldMk cId="193331974" sldId="270"/>
+            <ac:spMk id="12" creationId="{0354E73C-E8B7-D998-2395-3D5D5C7EB90F}"/>
+          </ac:spMkLst>
+        </pc:spChg>
+        <pc:spChg chg="add mod">
+          <ac:chgData name="Cassandra Gould Van Praag" userId="d2248499-4cc7-4575-92a4-3dec06827e7f" providerId="ADAL" clId="{F1C8B9D2-4377-2C45-B746-CF37BA7A4C1F}" dt="2025-02-05T16:08:02.289" v="305"/>
+          <ac:spMkLst>
+            <pc:docMk/>
+            <pc:sldMk cId="193331974" sldId="270"/>
+            <ac:spMk id="19" creationId="{67CFF1F0-B730-DBD7-4231-E6B78C389F35}"/>
+          </ac:spMkLst>
+        </pc:spChg>
+        <pc:spChg chg="add mod">
+          <ac:chgData name="Cassandra Gould Van Praag" userId="d2248499-4cc7-4575-92a4-3dec06827e7f" providerId="ADAL" clId="{F1C8B9D2-4377-2C45-B746-CF37BA7A4C1F}" dt="2025-02-05T16:05:58.203" v="293" actId="1076"/>
+          <ac:spMkLst>
+            <pc:docMk/>
+            <pc:sldMk cId="193331974" sldId="270"/>
+            <ac:spMk id="20" creationId="{62723756-7387-2CC0-45B8-BD960162F70E}"/>
+          </ac:spMkLst>
+        </pc:spChg>
+        <pc:spChg chg="add mod">
+          <ac:chgData name="Cassandra Gould Van Praag" userId="d2248499-4cc7-4575-92a4-3dec06827e7f" providerId="ADAL" clId="{F1C8B9D2-4377-2C45-B746-CF37BA7A4C1F}" dt="2025-02-05T16:05:59.438" v="294" actId="1076"/>
+          <ac:spMkLst>
+            <pc:docMk/>
+            <pc:sldMk cId="193331974" sldId="270"/>
+            <ac:spMk id="21" creationId="{4F6CD775-0E7C-4B1D-7313-7699DBEDE16A}"/>
+          </ac:spMkLst>
+        </pc:spChg>
+        <pc:spChg chg="add mod">
+          <ac:chgData name="Cassandra Gould Van Praag" userId="d2248499-4cc7-4575-92a4-3dec06827e7f" providerId="ADAL" clId="{F1C8B9D2-4377-2C45-B746-CF37BA7A4C1F}" dt="2025-02-05T16:06:00.816" v="295" actId="1076"/>
+          <ac:spMkLst>
+            <pc:docMk/>
+            <pc:sldMk cId="193331974" sldId="270"/>
+            <ac:spMk id="22" creationId="{55307FB2-1095-59D5-7A05-77CD429EE14A}"/>
+          </ac:spMkLst>
+        </pc:spChg>
+        <pc:spChg chg="add mod">
+          <ac:chgData name="Cassandra Gould Van Praag" userId="d2248499-4cc7-4575-92a4-3dec06827e7f" providerId="ADAL" clId="{F1C8B9D2-4377-2C45-B746-CF37BA7A4C1F}" dt="2025-02-05T17:07:14.249" v="321" actId="1076"/>
+          <ac:spMkLst>
+            <pc:docMk/>
+            <pc:sldMk cId="193331974" sldId="270"/>
+            <ac:spMk id="27" creationId="{A05758C1-6D3C-DF7F-3862-FE80F28D85EA}"/>
+          </ac:spMkLst>
+        </pc:spChg>
+        <pc:spChg chg="add mod">
+          <ac:chgData name="Cassandra Gould Van Praag" userId="d2248499-4cc7-4575-92a4-3dec06827e7f" providerId="ADAL" clId="{F1C8B9D2-4377-2C45-B746-CF37BA7A4C1F}" dt="2025-02-05T17:07:26.568" v="323"/>
+          <ac:spMkLst>
+            <pc:docMk/>
+            <pc:sldMk cId="193331974" sldId="270"/>
+            <ac:spMk id="28" creationId="{84ED3B10-A81B-919C-5946-9ED0B10120E0}"/>
+          </ac:spMkLst>
+        </pc:spChg>
+        <pc:spChg chg="add mod">
+          <ac:chgData name="Cassandra Gould Van Praag" userId="d2248499-4cc7-4575-92a4-3dec06827e7f" providerId="ADAL" clId="{F1C8B9D2-4377-2C45-B746-CF37BA7A4C1F}" dt="2025-02-05T17:07:43.708" v="325"/>
+          <ac:spMkLst>
+            <pc:docMk/>
+            <pc:sldMk cId="193331974" sldId="270"/>
+            <ac:spMk id="29" creationId="{5C888941-A838-6647-5B56-AAD4727797BE}"/>
+          </ac:spMkLst>
+        </pc:spChg>
+        <pc:spChg chg="add mod">
+          <ac:chgData name="Cassandra Gould Van Praag" userId="d2248499-4cc7-4575-92a4-3dec06827e7f" providerId="ADAL" clId="{F1C8B9D2-4377-2C45-B746-CF37BA7A4C1F}" dt="2025-02-05T17:07:56.856" v="327"/>
+          <ac:spMkLst>
+            <pc:docMk/>
+            <pc:sldMk cId="193331974" sldId="270"/>
+            <ac:spMk id="30" creationId="{91F574BF-9536-31EE-C6F7-FF927D599F8D}"/>
+          </ac:spMkLst>
+        </pc:spChg>
+        <pc:spChg chg="add mod">
+          <ac:chgData name="Cassandra Gould Van Praag" userId="d2248499-4cc7-4575-92a4-3dec06827e7f" providerId="ADAL" clId="{F1C8B9D2-4377-2C45-B746-CF37BA7A4C1F}" dt="2025-02-05T17:07:12.011" v="320"/>
+          <ac:spMkLst>
+            <pc:docMk/>
+            <pc:sldMk cId="193331974" sldId="270"/>
+            <ac:spMk id="31" creationId="{E5962616-EABC-B026-FB43-68BCC3B9C5C0}"/>
+          </ac:spMkLst>
+        </pc:spChg>
+        <pc:spChg chg="add mod">
+          <ac:chgData name="Cassandra Gould Van Praag" userId="d2248499-4cc7-4575-92a4-3dec06827e7f" providerId="ADAL" clId="{F1C8B9D2-4377-2C45-B746-CF37BA7A4C1F}" dt="2025-02-05T17:09:10.041" v="336"/>
+          <ac:spMkLst>
+            <pc:docMk/>
+            <pc:sldMk cId="193331974" sldId="270"/>
+            <ac:spMk id="34" creationId="{4B729BC4-D049-E4A0-552C-42EE4ED25528}"/>
+          </ac:spMkLst>
+        </pc:spChg>
+        <pc:picChg chg="add mod">
+          <ac:chgData name="Cassandra Gould Van Praag" userId="d2248499-4cc7-4575-92a4-3dec06827e7f" providerId="ADAL" clId="{F1C8B9D2-4377-2C45-B746-CF37BA7A4C1F}" dt="2025-02-05T16:08:40.140" v="310" actId="1076"/>
           <ac:picMkLst>
             <pc:docMk/>
-            <pc:sldMk cId="2701810344" sldId="269"/>
-            <ac:picMk id="15" creationId="{F192A07C-9B3B-5B42-CF34-3ADC20E7A3FA}"/>
+            <pc:sldMk cId="193331974" sldId="270"/>
+            <ac:picMk id="5" creationId="{7E5A9474-AAEB-E8DC-616C-2E475470F26E}"/>
+          </ac:picMkLst>
+        </pc:picChg>
+        <pc:picChg chg="add mod">
+          <ac:chgData name="Cassandra Gould Van Praag" userId="d2248499-4cc7-4575-92a4-3dec06827e7f" providerId="ADAL" clId="{F1C8B9D2-4377-2C45-B746-CF37BA7A4C1F}" dt="2025-02-05T16:05:41.479" v="285" actId="1076"/>
+          <ac:picMkLst>
+            <pc:docMk/>
+            <pc:sldMk cId="193331974" sldId="270"/>
+            <ac:picMk id="14" creationId="{F3DBFCD2-210A-F719-ED83-3BB9BBD17A09}"/>
+          </ac:picMkLst>
+        </pc:picChg>
+        <pc:picChg chg="add mod">
+          <ac:chgData name="Cassandra Gould Van Praag" userId="d2248499-4cc7-4575-92a4-3dec06827e7f" providerId="ADAL" clId="{F1C8B9D2-4377-2C45-B746-CF37BA7A4C1F}" dt="2025-02-05T17:06:33.800" v="315" actId="1076"/>
+          <ac:picMkLst>
+            <pc:docMk/>
+            <pc:sldMk cId="193331974" sldId="270"/>
+            <ac:picMk id="24" creationId="{0949A77F-9F7B-411A-1A9F-42AE8411256A}"/>
+          </ac:picMkLst>
+        </pc:picChg>
+        <pc:picChg chg="add mod">
+          <ac:chgData name="Cassandra Gould Van Praag" userId="d2248499-4cc7-4575-92a4-3dec06827e7f" providerId="ADAL" clId="{F1C8B9D2-4377-2C45-B746-CF37BA7A4C1F}" dt="2025-02-05T17:08:07.702" v="328" actId="1076"/>
+          <ac:picMkLst>
+            <pc:docMk/>
+            <pc:sldMk cId="193331974" sldId="270"/>
+            <ac:picMk id="26" creationId="{D3627E63-43A5-D83E-167C-6FB3FE64E703}"/>
+          </ac:picMkLst>
+        </pc:picChg>
+        <pc:picChg chg="add mod">
+          <ac:chgData name="Cassandra Gould Van Praag" userId="d2248499-4cc7-4575-92a4-3dec06827e7f" providerId="ADAL" clId="{F1C8B9D2-4377-2C45-B746-CF37BA7A4C1F}" dt="2025-02-05T17:08:48.928" v="332" actId="1076"/>
+          <ac:picMkLst>
+            <pc:docMk/>
+            <pc:sldMk cId="193331974" sldId="270"/>
+            <ac:picMk id="33" creationId="{11FFC7B0-191E-F26D-140D-0A17CCC94590}"/>
           </ac:picMkLst>
         </pc:picChg>
       </pc:sldChg>
@@ -660,7 +652,7 @@
           <a:p>
             <a:fld id="{B9AF1358-2D8A-7743-80A8-998FCC7F2732}" type="datetimeFigureOut">
               <a:rPr lang="en-US" smtClean="0"/>
-              <a:t>1/23/25</a:t>
+              <a:t>2/5/25</a:t>
             </a:fld>
             <a:endParaRPr lang="en-US"/>
           </a:p>
@@ -860,7 +852,7 @@
           <a:p>
             <a:fld id="{B9AF1358-2D8A-7743-80A8-998FCC7F2732}" type="datetimeFigureOut">
               <a:rPr lang="en-US" smtClean="0"/>
-              <a:t>1/23/25</a:t>
+              <a:t>2/5/25</a:t>
             </a:fld>
             <a:endParaRPr lang="en-US"/>
           </a:p>
@@ -1070,7 +1062,7 @@
           <a:p>
             <a:fld id="{B9AF1358-2D8A-7743-80A8-998FCC7F2732}" type="datetimeFigureOut">
               <a:rPr lang="en-US" smtClean="0"/>
-              <a:t>1/23/25</a:t>
+              <a:t>2/5/25</a:t>
             </a:fld>
             <a:endParaRPr lang="en-US"/>
           </a:p>
@@ -1270,7 +1262,7 @@
           <a:p>
             <a:fld id="{B9AF1358-2D8A-7743-80A8-998FCC7F2732}" type="datetimeFigureOut">
               <a:rPr lang="en-US" smtClean="0"/>
-              <a:t>1/23/25</a:t>
+              <a:t>2/5/25</a:t>
             </a:fld>
             <a:endParaRPr lang="en-US"/>
           </a:p>
@@ -1546,7 +1538,7 @@
           <a:p>
             <a:fld id="{B9AF1358-2D8A-7743-80A8-998FCC7F2732}" type="datetimeFigureOut">
               <a:rPr lang="en-US" smtClean="0"/>
-              <a:t>1/23/25</a:t>
+              <a:t>2/5/25</a:t>
             </a:fld>
             <a:endParaRPr lang="en-US"/>
           </a:p>
@@ -1814,7 +1806,7 @@
           <a:p>
             <a:fld id="{B9AF1358-2D8A-7743-80A8-998FCC7F2732}" type="datetimeFigureOut">
               <a:rPr lang="en-US" smtClean="0"/>
-              <a:t>1/23/25</a:t>
+              <a:t>2/5/25</a:t>
             </a:fld>
             <a:endParaRPr lang="en-US"/>
           </a:p>
@@ -2229,7 +2221,7 @@
           <a:p>
             <a:fld id="{B9AF1358-2D8A-7743-80A8-998FCC7F2732}" type="datetimeFigureOut">
               <a:rPr lang="en-US" smtClean="0"/>
-              <a:t>1/23/25</a:t>
+              <a:t>2/5/25</a:t>
             </a:fld>
             <a:endParaRPr lang="en-US"/>
           </a:p>
@@ -2371,7 +2363,7 @@
           <a:p>
             <a:fld id="{B9AF1358-2D8A-7743-80A8-998FCC7F2732}" type="datetimeFigureOut">
               <a:rPr lang="en-US" smtClean="0"/>
-              <a:t>1/23/25</a:t>
+              <a:t>2/5/25</a:t>
             </a:fld>
             <a:endParaRPr lang="en-US"/>
           </a:p>
@@ -2484,7 +2476,7 @@
           <a:p>
             <a:fld id="{B9AF1358-2D8A-7743-80A8-998FCC7F2732}" type="datetimeFigureOut">
               <a:rPr lang="en-US" smtClean="0"/>
-              <a:t>1/23/25</a:t>
+              <a:t>2/5/25</a:t>
             </a:fld>
             <a:endParaRPr lang="en-US"/>
           </a:p>
@@ -2797,7 +2789,7 @@
           <a:p>
             <a:fld id="{B9AF1358-2D8A-7743-80A8-998FCC7F2732}" type="datetimeFigureOut">
               <a:rPr lang="en-US" smtClean="0"/>
-              <a:t>1/23/25</a:t>
+              <a:t>2/5/25</a:t>
             </a:fld>
             <a:endParaRPr lang="en-US"/>
           </a:p>
@@ -3086,7 +3078,7 @@
           <a:p>
             <a:fld id="{B9AF1358-2D8A-7743-80A8-998FCC7F2732}" type="datetimeFigureOut">
               <a:rPr lang="en-US" smtClean="0"/>
-              <a:t>1/23/25</a:t>
+              <a:t>2/5/25</a:t>
             </a:fld>
             <a:endParaRPr lang="en-US"/>
           </a:p>
@@ -3329,7 +3321,7 @@
           <a:p>
             <a:fld id="{B9AF1358-2D8A-7743-80A8-998FCC7F2732}" type="datetimeFigureOut">
               <a:rPr lang="en-US" smtClean="0"/>
-              <a:t>1/23/25</a:t>
+              <a:t>2/5/25</a:t>
             </a:fld>
             <a:endParaRPr lang="en-US"/>
           </a:p>
@@ -4707,7 +4699,7 @@
         </p:blipFill>
         <p:spPr>
           <a:xfrm>
-            <a:off x="4191000" y="1358900"/>
+            <a:off x="916172" y="1156881"/>
             <a:ext cx="3810000" cy="4140200"/>
           </a:xfrm>
           <a:prstGeom prst="rect">
@@ -4715,6 +4707,113 @@
           </a:prstGeom>
         </p:spPr>
       </p:pic>
+      <p:grpSp>
+        <p:nvGrpSpPr>
+          <p:cNvPr id="5" name="Group 4">
+            <a:extLst>
+              <a:ext uri="{FF2B5EF4-FFF2-40B4-BE49-F238E27FC236}">
+                <a16:creationId xmlns:a16="http://schemas.microsoft.com/office/drawing/2014/main" id="{DF522D1C-2A32-B6AB-504D-235668705A32}"/>
+              </a:ext>
+            </a:extLst>
+          </p:cNvPr>
+          <p:cNvGrpSpPr/>
+          <p:nvPr/>
+        </p:nvGrpSpPr>
+        <p:grpSpPr>
+          <a:xfrm>
+            <a:off x="5730949" y="1560919"/>
+            <a:ext cx="4168800" cy="4170030"/>
+            <a:chOff x="5730949" y="1560919"/>
+            <a:chExt cx="4168800" cy="4170030"/>
+          </a:xfrm>
+        </p:grpSpPr>
+        <p:sp>
+          <p:nvSpPr>
+            <p:cNvPr id="3" name="Rectangle 2">
+              <a:extLst>
+                <a:ext uri="{FF2B5EF4-FFF2-40B4-BE49-F238E27FC236}">
+                  <a16:creationId xmlns:a16="http://schemas.microsoft.com/office/drawing/2014/main" id="{FC931A71-8F07-4615-EA8F-299BB557D16C}"/>
+                </a:ext>
+              </a:extLst>
+            </p:cNvPr>
+            <p:cNvSpPr/>
+            <p:nvPr/>
+          </p:nvSpPr>
+          <p:spPr>
+            <a:xfrm>
+              <a:off x="5730949" y="1560919"/>
+              <a:ext cx="4168800" cy="4170030"/>
+            </a:xfrm>
+            <a:prstGeom prst="rect">
+              <a:avLst/>
+            </a:prstGeom>
+            <a:solidFill>
+              <a:schemeClr val="bg1"/>
+            </a:solidFill>
+            <a:ln>
+              <a:solidFill>
+                <a:schemeClr val="bg1"/>
+              </a:solidFill>
+            </a:ln>
+          </p:spPr>
+          <p:style>
+            <a:lnRef idx="2">
+              <a:schemeClr val="accent1">
+                <a:shade val="15000"/>
+              </a:schemeClr>
+            </a:lnRef>
+            <a:fillRef idx="1">
+              <a:schemeClr val="accent1"/>
+            </a:fillRef>
+            <a:effectRef idx="0">
+              <a:schemeClr val="accent1"/>
+            </a:effectRef>
+            <a:fontRef idx="minor">
+              <a:schemeClr val="lt1"/>
+            </a:fontRef>
+          </p:style>
+          <p:txBody>
+            <a:bodyPr rtlCol="0" anchor="ctr"/>
+            <a:lstStyle/>
+            <a:p>
+              <a:pPr algn="ctr"/>
+              <a:endParaRPr lang="en-US"/>
+            </a:p>
+          </p:txBody>
+        </p:sp>
+        <p:pic>
+          <p:nvPicPr>
+            <p:cNvPr id="2" name="Picture 1">
+              <a:extLst>
+                <a:ext uri="{FF2B5EF4-FFF2-40B4-BE49-F238E27FC236}">
+                  <a16:creationId xmlns:a16="http://schemas.microsoft.com/office/drawing/2014/main" id="{293A383B-D661-097B-B5A0-DE2FA2F3E07E}"/>
+                </a:ext>
+              </a:extLst>
+            </p:cNvPr>
+            <p:cNvPicPr>
+              <a:picLocks noChangeAspect="1"/>
+            </p:cNvPicPr>
+            <p:nvPr/>
+          </p:nvPicPr>
+          <p:blipFill>
+            <a:blip r:embed="rId2">
+              <a:biLevel thresh="75000"/>
+            </a:blip>
+            <a:stretch>
+              <a:fillRect/>
+            </a:stretch>
+          </p:blipFill>
+          <p:spPr>
+            <a:xfrm>
+              <a:off x="5910349" y="1590749"/>
+              <a:ext cx="3810000" cy="4140200"/>
+            </a:xfrm>
+            <a:prstGeom prst="rect">
+              <a:avLst/>
+            </a:prstGeom>
+          </p:spPr>
+        </p:pic>
+      </p:grpSp>
     </p:spTree>
     <p:extLst>
       <p:ext uri="{BB962C8B-B14F-4D97-AF65-F5344CB8AC3E}">
@@ -5066,6 +5165,957 @@
     <p:extLst>
       <p:ext uri="{BB962C8B-B14F-4D97-AF65-F5344CB8AC3E}">
         <p14:creationId xmlns:p14="http://schemas.microsoft.com/office/powerpoint/2010/main" val="608892475"/>
+      </p:ext>
+    </p:extLst>
+  </p:cSld>
+  <p:clrMapOvr>
+    <a:masterClrMapping/>
+  </p:clrMapOvr>
+</p:sld>
+</file>
+
+<file path=ppt/slides/slide8.xml><?xml version="1.0" encoding="utf-8"?>
+<p:sld xmlns:a="http://schemas.openxmlformats.org/drawingml/2006/main" xmlns:r="http://schemas.openxmlformats.org/officeDocument/2006/relationships" xmlns:p="http://schemas.openxmlformats.org/presentationml/2006/main">
+  <p:cSld>
+    <p:spTree>
+      <p:nvGrpSpPr>
+        <p:cNvPr id="1" name=""/>
+        <p:cNvGrpSpPr/>
+        <p:nvPr/>
+      </p:nvGrpSpPr>
+      <p:grpSpPr>
+        <a:xfrm>
+          <a:off x="0" y="0"/>
+          <a:ext cx="0" cy="0"/>
+          <a:chOff x="0" y="0"/>
+          <a:chExt cx="0" cy="0"/>
+        </a:xfrm>
+      </p:grpSpPr>
+      <p:pic>
+        <p:nvPicPr>
+          <p:cNvPr id="5" name="Picture 4" descr="A blue and pink rectangle&#10;&#10;AI-generated content may be incorrect.">
+            <a:extLst>
+              <a:ext uri="{FF2B5EF4-FFF2-40B4-BE49-F238E27FC236}">
+                <a16:creationId xmlns:a16="http://schemas.microsoft.com/office/drawing/2014/main" id="{7E5A9474-AAEB-E8DC-616C-2E475470F26E}"/>
+              </a:ext>
+            </a:extLst>
+          </p:cNvPr>
+          <p:cNvPicPr>
+            <a:picLocks noChangeAspect="1"/>
+          </p:cNvPicPr>
+          <p:nvPr/>
+        </p:nvPicPr>
+        <p:blipFill>
+          <a:blip r:embed="rId2"/>
+          <a:stretch>
+            <a:fillRect/>
+          </a:stretch>
+        </p:blipFill>
+        <p:spPr>
+          <a:xfrm>
+            <a:off x="47091" y="1685441"/>
+            <a:ext cx="1231900" cy="3810000"/>
+          </a:xfrm>
+          <a:prstGeom prst="rect">
+            <a:avLst/>
+          </a:prstGeom>
+        </p:spPr>
+      </p:pic>
+      <p:sp>
+        <p:nvSpPr>
+          <p:cNvPr id="7" name="TextBox 6">
+            <a:extLst>
+              <a:ext uri="{FF2B5EF4-FFF2-40B4-BE49-F238E27FC236}">
+                <a16:creationId xmlns:a16="http://schemas.microsoft.com/office/drawing/2014/main" id="{510AC43B-3FA6-4EDB-B4C0-D6F042277F3A}"/>
+              </a:ext>
+            </a:extLst>
+          </p:cNvPr>
+          <p:cNvSpPr txBox="1"/>
+          <p:nvPr/>
+        </p:nvSpPr>
+        <p:spPr>
+          <a:xfrm>
+            <a:off x="1615807" y="322196"/>
+            <a:ext cx="7572260" cy="646331"/>
+          </a:xfrm>
+          <a:prstGeom prst="rect">
+            <a:avLst/>
+          </a:prstGeom>
+          <a:noFill/>
+        </p:spPr>
+        <p:txBody>
+          <a:bodyPr wrap="square">
+            <a:spAutoFit/>
+          </a:bodyPr>
+          <a:lstStyle/>
+          <a:p>
+            <a:r>
+              <a:rPr lang="en-US" dirty="0"/>
+              <a:t>https://</a:t>
+            </a:r>
+            <a:r>
+              <a:rPr lang="en-US" dirty="0" err="1"/>
+              <a:t>davidmathlogic.com</a:t>
+            </a:r>
+            <a:r>
+              <a:rPr lang="en-US" dirty="0"/>
+              <a:t>/colorblind/#%23D81B60-%231E88E5-%23FFC107-%23004D40</a:t>
+            </a:r>
+          </a:p>
+        </p:txBody>
+      </p:sp>
+      <p:sp>
+        <p:nvSpPr>
+          <p:cNvPr id="8" name="Rectangle 7">
+            <a:extLst>
+              <a:ext uri="{FF2B5EF4-FFF2-40B4-BE49-F238E27FC236}">
+                <a16:creationId xmlns:a16="http://schemas.microsoft.com/office/drawing/2014/main" id="{D731146C-C63B-7A41-459B-219AE4B9205B}"/>
+              </a:ext>
+            </a:extLst>
+          </p:cNvPr>
+          <p:cNvSpPr/>
+          <p:nvPr/>
+        </p:nvSpPr>
+        <p:spPr>
+          <a:xfrm>
+            <a:off x="1544283" y="1704604"/>
+            <a:ext cx="1564396" cy="826265"/>
+          </a:xfrm>
+          <a:prstGeom prst="rect">
+            <a:avLst/>
+          </a:prstGeom>
+          <a:solidFill>
+            <a:srgbClr val="D53131"/>
+          </a:solidFill>
+        </p:spPr>
+        <p:style>
+          <a:lnRef idx="2">
+            <a:schemeClr val="accent1">
+              <a:shade val="15000"/>
+            </a:schemeClr>
+          </a:lnRef>
+          <a:fillRef idx="1">
+            <a:schemeClr val="accent1"/>
+          </a:fillRef>
+          <a:effectRef idx="0">
+            <a:schemeClr val="accent1"/>
+          </a:effectRef>
+          <a:fontRef idx="minor">
+            <a:schemeClr val="lt1"/>
+          </a:fontRef>
+        </p:style>
+        <p:txBody>
+          <a:bodyPr rtlCol="0" anchor="ctr"/>
+          <a:lstStyle/>
+          <a:p>
+            <a:pPr algn="ctr"/>
+            <a:r>
+              <a:rPr lang="en-US" dirty="0"/>
+              <a:t>D53131</a:t>
+            </a:r>
+          </a:p>
+        </p:txBody>
+      </p:sp>
+      <p:sp>
+        <p:nvSpPr>
+          <p:cNvPr id="10" name="Rectangle 9">
+            <a:extLst>
+              <a:ext uri="{FF2B5EF4-FFF2-40B4-BE49-F238E27FC236}">
+                <a16:creationId xmlns:a16="http://schemas.microsoft.com/office/drawing/2014/main" id="{EA6C578D-DD32-9010-B015-64E163037C15}"/>
+              </a:ext>
+            </a:extLst>
+          </p:cNvPr>
+          <p:cNvSpPr/>
+          <p:nvPr/>
+        </p:nvSpPr>
+        <p:spPr>
+          <a:xfrm>
+            <a:off x="1544283" y="2661236"/>
+            <a:ext cx="1564396" cy="826265"/>
+          </a:xfrm>
+          <a:prstGeom prst="rect">
+            <a:avLst/>
+          </a:prstGeom>
+          <a:solidFill>
+            <a:srgbClr val="00929C"/>
+          </a:solidFill>
+        </p:spPr>
+        <p:style>
+          <a:lnRef idx="2">
+            <a:schemeClr val="accent1">
+              <a:shade val="15000"/>
+            </a:schemeClr>
+          </a:lnRef>
+          <a:fillRef idx="1">
+            <a:schemeClr val="accent1"/>
+          </a:fillRef>
+          <a:effectRef idx="0">
+            <a:schemeClr val="accent1"/>
+          </a:effectRef>
+          <a:fontRef idx="minor">
+            <a:schemeClr val="lt1"/>
+          </a:fontRef>
+        </p:style>
+        <p:txBody>
+          <a:bodyPr rtlCol="0" anchor="ctr"/>
+          <a:lstStyle/>
+          <a:p>
+            <a:pPr algn="ctr"/>
+            <a:r>
+              <a:rPr lang="en-US" dirty="0"/>
+              <a:t>00929C</a:t>
+            </a:r>
+          </a:p>
+        </p:txBody>
+      </p:sp>
+      <p:sp>
+        <p:nvSpPr>
+          <p:cNvPr id="11" name="Rectangle 10">
+            <a:extLst>
+              <a:ext uri="{FF2B5EF4-FFF2-40B4-BE49-F238E27FC236}">
+                <a16:creationId xmlns:a16="http://schemas.microsoft.com/office/drawing/2014/main" id="{399F9095-9C4E-6779-27EA-F30011A44430}"/>
+              </a:ext>
+            </a:extLst>
+          </p:cNvPr>
+          <p:cNvSpPr/>
+          <p:nvPr/>
+        </p:nvSpPr>
+        <p:spPr>
+          <a:xfrm>
+            <a:off x="1544283" y="3651875"/>
+            <a:ext cx="1564396" cy="826265"/>
+          </a:xfrm>
+          <a:prstGeom prst="rect">
+            <a:avLst/>
+          </a:prstGeom>
+          <a:solidFill>
+            <a:srgbClr val="FFB6C0"/>
+          </a:solidFill>
+        </p:spPr>
+        <p:style>
+          <a:lnRef idx="2">
+            <a:schemeClr val="accent1">
+              <a:shade val="15000"/>
+            </a:schemeClr>
+          </a:lnRef>
+          <a:fillRef idx="1">
+            <a:schemeClr val="accent1"/>
+          </a:fillRef>
+          <a:effectRef idx="0">
+            <a:schemeClr val="accent1"/>
+          </a:effectRef>
+          <a:fontRef idx="minor">
+            <a:schemeClr val="lt1"/>
+          </a:fontRef>
+        </p:style>
+        <p:txBody>
+          <a:bodyPr rtlCol="0" anchor="ctr"/>
+          <a:lstStyle/>
+          <a:p>
+            <a:pPr algn="ctr"/>
+            <a:r>
+              <a:rPr lang="en-US" dirty="0"/>
+              <a:t>FFB6C0</a:t>
+            </a:r>
+          </a:p>
+        </p:txBody>
+      </p:sp>
+      <p:sp>
+        <p:nvSpPr>
+          <p:cNvPr id="12" name="Rectangle 11">
+            <a:extLst>
+              <a:ext uri="{FF2B5EF4-FFF2-40B4-BE49-F238E27FC236}">
+                <a16:creationId xmlns:a16="http://schemas.microsoft.com/office/drawing/2014/main" id="{0354E73C-E8B7-D998-2395-3D5D5C7EB90F}"/>
+              </a:ext>
+            </a:extLst>
+          </p:cNvPr>
+          <p:cNvSpPr/>
+          <p:nvPr/>
+        </p:nvSpPr>
+        <p:spPr>
+          <a:xfrm>
+            <a:off x="1544283" y="4669176"/>
+            <a:ext cx="1564396" cy="826265"/>
+          </a:xfrm>
+          <a:prstGeom prst="rect">
+            <a:avLst/>
+          </a:prstGeom>
+          <a:solidFill>
+            <a:srgbClr val="194C52"/>
+          </a:solidFill>
+        </p:spPr>
+        <p:style>
+          <a:lnRef idx="2">
+            <a:schemeClr val="accent1">
+              <a:shade val="15000"/>
+            </a:schemeClr>
+          </a:lnRef>
+          <a:fillRef idx="1">
+            <a:schemeClr val="accent1"/>
+          </a:fillRef>
+          <a:effectRef idx="0">
+            <a:schemeClr val="accent1"/>
+          </a:effectRef>
+          <a:fontRef idx="minor">
+            <a:schemeClr val="lt1"/>
+          </a:fontRef>
+        </p:style>
+        <p:txBody>
+          <a:bodyPr rtlCol="0" anchor="ctr"/>
+          <a:lstStyle/>
+          <a:p>
+            <a:pPr algn="ctr"/>
+            <a:r>
+              <a:rPr lang="en-US" dirty="0"/>
+              <a:t>194C52</a:t>
+            </a:r>
+          </a:p>
+        </p:txBody>
+      </p:sp>
+      <p:pic>
+        <p:nvPicPr>
+          <p:cNvPr id="14" name="Picture 13" descr="A close up of a white and blue object&#10;&#10;AI-generated content may be incorrect.">
+            <a:extLst>
+              <a:ext uri="{FF2B5EF4-FFF2-40B4-BE49-F238E27FC236}">
+                <a16:creationId xmlns:a16="http://schemas.microsoft.com/office/drawing/2014/main" id="{F3DBFCD2-210A-F719-ED83-3BB9BBD17A09}"/>
+              </a:ext>
+            </a:extLst>
+          </p:cNvPr>
+          <p:cNvPicPr>
+            <a:picLocks noChangeAspect="1"/>
+          </p:cNvPicPr>
+          <p:nvPr/>
+        </p:nvPicPr>
+        <p:blipFill>
+          <a:blip r:embed="rId3"/>
+          <a:stretch>
+            <a:fillRect/>
+          </a:stretch>
+        </p:blipFill>
+        <p:spPr>
+          <a:xfrm>
+            <a:off x="4766147" y="976195"/>
+            <a:ext cx="6073100" cy="1703534"/>
+          </a:xfrm>
+          <a:prstGeom prst="rect">
+            <a:avLst/>
+          </a:prstGeom>
+        </p:spPr>
+      </p:pic>
+      <p:sp>
+        <p:nvSpPr>
+          <p:cNvPr id="19" name="Rectangle 18">
+            <a:extLst>
+              <a:ext uri="{FF2B5EF4-FFF2-40B4-BE49-F238E27FC236}">
+                <a16:creationId xmlns:a16="http://schemas.microsoft.com/office/drawing/2014/main" id="{67CFF1F0-B730-DBD7-4231-E6B78C389F35}"/>
+              </a:ext>
+            </a:extLst>
+          </p:cNvPr>
+          <p:cNvSpPr/>
+          <p:nvPr/>
+        </p:nvSpPr>
+        <p:spPr>
+          <a:xfrm>
+            <a:off x="9755447" y="3103129"/>
+            <a:ext cx="1083800" cy="697793"/>
+          </a:xfrm>
+          <a:prstGeom prst="rect">
+            <a:avLst/>
+          </a:prstGeom>
+          <a:solidFill>
+            <a:srgbClr val="CE816F"/>
+          </a:solidFill>
+        </p:spPr>
+        <p:style>
+          <a:lnRef idx="2">
+            <a:schemeClr val="accent1">
+              <a:shade val="15000"/>
+            </a:schemeClr>
+          </a:lnRef>
+          <a:fillRef idx="1">
+            <a:schemeClr val="accent1"/>
+          </a:fillRef>
+          <a:effectRef idx="0">
+            <a:schemeClr val="accent1"/>
+          </a:effectRef>
+          <a:fontRef idx="minor">
+            <a:schemeClr val="lt1"/>
+          </a:fontRef>
+        </p:style>
+        <p:txBody>
+          <a:bodyPr rtlCol="0" anchor="ctr"/>
+          <a:lstStyle/>
+          <a:p>
+            <a:pPr algn="ctr"/>
+            <a:r>
+              <a:rPr lang="en-US" dirty="0"/>
+              <a:t>CE816F</a:t>
+            </a:r>
+          </a:p>
+        </p:txBody>
+      </p:sp>
+      <p:sp>
+        <p:nvSpPr>
+          <p:cNvPr id="20" name="Rectangle 19">
+            <a:extLst>
+              <a:ext uri="{FF2B5EF4-FFF2-40B4-BE49-F238E27FC236}">
+                <a16:creationId xmlns:a16="http://schemas.microsoft.com/office/drawing/2014/main" id="{62723756-7387-2CC0-45B8-BD960162F70E}"/>
+              </a:ext>
+            </a:extLst>
+          </p:cNvPr>
+          <p:cNvSpPr/>
+          <p:nvPr/>
+        </p:nvSpPr>
+        <p:spPr>
+          <a:xfrm>
+            <a:off x="8387235" y="3103129"/>
+            <a:ext cx="1083800" cy="697793"/>
+          </a:xfrm>
+          <a:prstGeom prst="rect">
+            <a:avLst/>
+          </a:prstGeom>
+          <a:solidFill>
+            <a:srgbClr val="00929C"/>
+          </a:solidFill>
+        </p:spPr>
+        <p:style>
+          <a:lnRef idx="2">
+            <a:schemeClr val="accent1">
+              <a:shade val="15000"/>
+            </a:schemeClr>
+          </a:lnRef>
+          <a:fillRef idx="1">
+            <a:schemeClr val="accent1"/>
+          </a:fillRef>
+          <a:effectRef idx="0">
+            <a:schemeClr val="accent1"/>
+          </a:effectRef>
+          <a:fontRef idx="minor">
+            <a:schemeClr val="lt1"/>
+          </a:fontRef>
+        </p:style>
+        <p:txBody>
+          <a:bodyPr rtlCol="0" anchor="ctr"/>
+          <a:lstStyle/>
+          <a:p>
+            <a:pPr algn="ctr"/>
+            <a:r>
+              <a:rPr lang="en-US" dirty="0"/>
+              <a:t>00929C</a:t>
+            </a:r>
+          </a:p>
+        </p:txBody>
+      </p:sp>
+      <p:sp>
+        <p:nvSpPr>
+          <p:cNvPr id="21" name="Rectangle 20">
+            <a:extLst>
+              <a:ext uri="{FF2B5EF4-FFF2-40B4-BE49-F238E27FC236}">
+                <a16:creationId xmlns:a16="http://schemas.microsoft.com/office/drawing/2014/main" id="{4F6CD775-0E7C-4B1D-7313-7699DBEDE16A}"/>
+              </a:ext>
+            </a:extLst>
+          </p:cNvPr>
+          <p:cNvSpPr/>
+          <p:nvPr/>
+        </p:nvSpPr>
+        <p:spPr>
+          <a:xfrm>
+            <a:off x="6887981" y="3103129"/>
+            <a:ext cx="1083800" cy="697793"/>
+          </a:xfrm>
+          <a:prstGeom prst="rect">
+            <a:avLst/>
+          </a:prstGeom>
+          <a:solidFill>
+            <a:srgbClr val="FFB6C0"/>
+          </a:solidFill>
+        </p:spPr>
+        <p:style>
+          <a:lnRef idx="2">
+            <a:schemeClr val="accent1">
+              <a:shade val="15000"/>
+            </a:schemeClr>
+          </a:lnRef>
+          <a:fillRef idx="1">
+            <a:schemeClr val="accent1"/>
+          </a:fillRef>
+          <a:effectRef idx="0">
+            <a:schemeClr val="accent1"/>
+          </a:effectRef>
+          <a:fontRef idx="minor">
+            <a:schemeClr val="lt1"/>
+          </a:fontRef>
+        </p:style>
+        <p:txBody>
+          <a:bodyPr rtlCol="0" anchor="ctr"/>
+          <a:lstStyle/>
+          <a:p>
+            <a:pPr algn="ctr"/>
+            <a:r>
+              <a:rPr lang="en-US" dirty="0"/>
+              <a:t>FFB6C0</a:t>
+            </a:r>
+          </a:p>
+        </p:txBody>
+      </p:sp>
+      <p:sp>
+        <p:nvSpPr>
+          <p:cNvPr id="22" name="Rectangle 21">
+            <a:extLst>
+              <a:ext uri="{FF2B5EF4-FFF2-40B4-BE49-F238E27FC236}">
+                <a16:creationId xmlns:a16="http://schemas.microsoft.com/office/drawing/2014/main" id="{55307FB2-1095-59D5-7A05-77CD429EE14A}"/>
+              </a:ext>
+            </a:extLst>
+          </p:cNvPr>
+          <p:cNvSpPr/>
+          <p:nvPr/>
+        </p:nvSpPr>
+        <p:spPr>
+          <a:xfrm>
+            <a:off x="5304020" y="3103129"/>
+            <a:ext cx="1083800" cy="697793"/>
+          </a:xfrm>
+          <a:prstGeom prst="rect">
+            <a:avLst/>
+          </a:prstGeom>
+          <a:solidFill>
+            <a:srgbClr val="194C52"/>
+          </a:solidFill>
+        </p:spPr>
+        <p:style>
+          <a:lnRef idx="2">
+            <a:schemeClr val="accent1">
+              <a:shade val="15000"/>
+            </a:schemeClr>
+          </a:lnRef>
+          <a:fillRef idx="1">
+            <a:schemeClr val="accent1"/>
+          </a:fillRef>
+          <a:effectRef idx="0">
+            <a:schemeClr val="accent1"/>
+          </a:effectRef>
+          <a:fontRef idx="minor">
+            <a:schemeClr val="lt1"/>
+          </a:fontRef>
+        </p:style>
+        <p:txBody>
+          <a:bodyPr rtlCol="0" anchor="ctr"/>
+          <a:lstStyle/>
+          <a:p>
+            <a:pPr algn="ctr"/>
+            <a:r>
+              <a:rPr lang="en-US" dirty="0"/>
+              <a:t>194C52</a:t>
+            </a:r>
+          </a:p>
+        </p:txBody>
+      </p:sp>
+      <p:pic>
+        <p:nvPicPr>
+          <p:cNvPr id="24" name="Picture 23" descr="A close-up of a plate&#10;&#10;AI-generated content may be incorrect.">
+            <a:extLst>
+              <a:ext uri="{FF2B5EF4-FFF2-40B4-BE49-F238E27FC236}">
+                <a16:creationId xmlns:a16="http://schemas.microsoft.com/office/drawing/2014/main" id="{0949A77F-9F7B-411A-1A9F-42AE8411256A}"/>
+              </a:ext>
+            </a:extLst>
+          </p:cNvPr>
+          <p:cNvPicPr>
+            <a:picLocks noChangeAspect="1"/>
+          </p:cNvPicPr>
+          <p:nvPr/>
+        </p:nvPicPr>
+        <p:blipFill>
+          <a:blip r:embed="rId4"/>
+          <a:stretch>
+            <a:fillRect/>
+          </a:stretch>
+        </p:blipFill>
+        <p:spPr>
+          <a:xfrm>
+            <a:off x="10412849" y="1509728"/>
+            <a:ext cx="1574800" cy="2247900"/>
+          </a:xfrm>
+          <a:prstGeom prst="rect">
+            <a:avLst/>
+          </a:prstGeom>
+        </p:spPr>
+      </p:pic>
+      <p:pic>
+        <p:nvPicPr>
+          <p:cNvPr id="26" name="Picture 25" descr="A close-up of a card&#10;&#10;AI-generated content may be incorrect.">
+            <a:extLst>
+              <a:ext uri="{FF2B5EF4-FFF2-40B4-BE49-F238E27FC236}">
+                <a16:creationId xmlns:a16="http://schemas.microsoft.com/office/drawing/2014/main" id="{D3627E63-43A5-D83E-167C-6FB3FE64E703}"/>
+              </a:ext>
+            </a:extLst>
+          </p:cNvPr>
+          <p:cNvPicPr>
+            <a:picLocks noChangeAspect="1"/>
+          </p:cNvPicPr>
+          <p:nvPr/>
+        </p:nvPicPr>
+        <p:blipFill>
+          <a:blip r:embed="rId5"/>
+          <a:stretch>
+            <a:fillRect/>
+          </a:stretch>
+        </p:blipFill>
+        <p:spPr>
+          <a:xfrm>
+            <a:off x="4000874" y="4047691"/>
+            <a:ext cx="7772400" cy="1034617"/>
+          </a:xfrm>
+          <a:prstGeom prst="rect">
+            <a:avLst/>
+          </a:prstGeom>
+        </p:spPr>
+      </p:pic>
+      <p:sp>
+        <p:nvSpPr>
+          <p:cNvPr id="27" name="Rectangle 26">
+            <a:extLst>
+              <a:ext uri="{FF2B5EF4-FFF2-40B4-BE49-F238E27FC236}">
+                <a16:creationId xmlns:a16="http://schemas.microsoft.com/office/drawing/2014/main" id="{A05758C1-6D3C-DF7F-3862-FE80F28D85EA}"/>
+              </a:ext>
+            </a:extLst>
+          </p:cNvPr>
+          <p:cNvSpPr/>
+          <p:nvPr/>
+        </p:nvSpPr>
+        <p:spPr>
+          <a:xfrm>
+            <a:off x="8844428" y="5492101"/>
+            <a:ext cx="1083800" cy="697793"/>
+          </a:xfrm>
+          <a:prstGeom prst="rect">
+            <a:avLst/>
+          </a:prstGeom>
+          <a:solidFill>
+            <a:srgbClr val="CE816F"/>
+          </a:solidFill>
+        </p:spPr>
+        <p:style>
+          <a:lnRef idx="2">
+            <a:schemeClr val="accent1">
+              <a:shade val="15000"/>
+            </a:schemeClr>
+          </a:lnRef>
+          <a:fillRef idx="1">
+            <a:schemeClr val="accent1"/>
+          </a:fillRef>
+          <a:effectRef idx="0">
+            <a:schemeClr val="accent1"/>
+          </a:effectRef>
+          <a:fontRef idx="minor">
+            <a:schemeClr val="lt1"/>
+          </a:fontRef>
+        </p:style>
+        <p:txBody>
+          <a:bodyPr rtlCol="0" anchor="ctr"/>
+          <a:lstStyle/>
+          <a:p>
+            <a:pPr algn="ctr"/>
+            <a:r>
+              <a:rPr lang="en-US" dirty="0"/>
+              <a:t>CE816F</a:t>
+            </a:r>
+          </a:p>
+        </p:txBody>
+      </p:sp>
+      <p:sp>
+        <p:nvSpPr>
+          <p:cNvPr id="28" name="Rectangle 27">
+            <a:extLst>
+              <a:ext uri="{FF2B5EF4-FFF2-40B4-BE49-F238E27FC236}">
+                <a16:creationId xmlns:a16="http://schemas.microsoft.com/office/drawing/2014/main" id="{84ED3B10-A81B-919C-5946-9ED0B10120E0}"/>
+              </a:ext>
+            </a:extLst>
+          </p:cNvPr>
+          <p:cNvSpPr/>
+          <p:nvPr/>
+        </p:nvSpPr>
+        <p:spPr>
+          <a:xfrm>
+            <a:off x="7345174" y="5492101"/>
+            <a:ext cx="1083800" cy="697793"/>
+          </a:xfrm>
+          <a:prstGeom prst="rect">
+            <a:avLst/>
+          </a:prstGeom>
+          <a:solidFill>
+            <a:srgbClr val="E4B3A9"/>
+          </a:solidFill>
+        </p:spPr>
+        <p:style>
+          <a:lnRef idx="2">
+            <a:schemeClr val="accent1">
+              <a:shade val="15000"/>
+            </a:schemeClr>
+          </a:lnRef>
+          <a:fillRef idx="1">
+            <a:schemeClr val="accent1"/>
+          </a:fillRef>
+          <a:effectRef idx="0">
+            <a:schemeClr val="accent1"/>
+          </a:effectRef>
+          <a:fontRef idx="minor">
+            <a:schemeClr val="lt1"/>
+          </a:fontRef>
+        </p:style>
+        <p:txBody>
+          <a:bodyPr rtlCol="0" anchor="ctr"/>
+          <a:lstStyle/>
+          <a:p>
+            <a:pPr algn="ctr"/>
+            <a:r>
+              <a:rPr lang="en-US" dirty="0"/>
+              <a:t>E4B3A9</a:t>
+            </a:r>
+          </a:p>
+        </p:txBody>
+      </p:sp>
+      <p:sp>
+        <p:nvSpPr>
+          <p:cNvPr id="29" name="Rectangle 28">
+            <a:extLst>
+              <a:ext uri="{FF2B5EF4-FFF2-40B4-BE49-F238E27FC236}">
+                <a16:creationId xmlns:a16="http://schemas.microsoft.com/office/drawing/2014/main" id="{5C888941-A838-6647-5B56-AAD4727797BE}"/>
+              </a:ext>
+            </a:extLst>
+          </p:cNvPr>
+          <p:cNvSpPr/>
+          <p:nvPr/>
+        </p:nvSpPr>
+        <p:spPr>
+          <a:xfrm>
+            <a:off x="5845920" y="5492101"/>
+            <a:ext cx="1083800" cy="697793"/>
+          </a:xfrm>
+          <a:prstGeom prst="rect">
+            <a:avLst/>
+          </a:prstGeom>
+          <a:solidFill>
+            <a:srgbClr val="2E7F9E"/>
+          </a:solidFill>
+        </p:spPr>
+        <p:style>
+          <a:lnRef idx="2">
+            <a:schemeClr val="accent1">
+              <a:shade val="15000"/>
+            </a:schemeClr>
+          </a:lnRef>
+          <a:fillRef idx="1">
+            <a:schemeClr val="accent1"/>
+          </a:fillRef>
+          <a:effectRef idx="0">
+            <a:schemeClr val="accent1"/>
+          </a:effectRef>
+          <a:fontRef idx="minor">
+            <a:schemeClr val="lt1"/>
+          </a:fontRef>
+        </p:style>
+        <p:txBody>
+          <a:bodyPr rtlCol="0" anchor="ctr"/>
+          <a:lstStyle/>
+          <a:p>
+            <a:pPr algn="ctr"/>
+            <a:r>
+              <a:rPr lang="en-US" dirty="0"/>
+              <a:t>2E7F9E</a:t>
+            </a:r>
+          </a:p>
+        </p:txBody>
+      </p:sp>
+      <p:sp>
+        <p:nvSpPr>
+          <p:cNvPr id="30" name="Rectangle 29">
+            <a:extLst>
+              <a:ext uri="{FF2B5EF4-FFF2-40B4-BE49-F238E27FC236}">
+                <a16:creationId xmlns:a16="http://schemas.microsoft.com/office/drawing/2014/main" id="{91F574BF-9536-31EE-C6F7-FF927D599F8D}"/>
+              </a:ext>
+            </a:extLst>
+          </p:cNvPr>
+          <p:cNvSpPr/>
+          <p:nvPr/>
+        </p:nvSpPr>
+        <p:spPr>
+          <a:xfrm>
+            <a:off x="4261959" y="5492101"/>
+            <a:ext cx="1083800" cy="697793"/>
+          </a:xfrm>
+          <a:prstGeom prst="rect">
+            <a:avLst/>
+          </a:prstGeom>
+          <a:solidFill>
+            <a:srgbClr val="165875"/>
+          </a:solidFill>
+        </p:spPr>
+        <p:style>
+          <a:lnRef idx="2">
+            <a:schemeClr val="accent1">
+              <a:shade val="15000"/>
+            </a:schemeClr>
+          </a:lnRef>
+          <a:fillRef idx="1">
+            <a:schemeClr val="accent1"/>
+          </a:fillRef>
+          <a:effectRef idx="0">
+            <a:schemeClr val="accent1"/>
+          </a:effectRef>
+          <a:fontRef idx="minor">
+            <a:schemeClr val="lt1"/>
+          </a:fontRef>
+        </p:style>
+        <p:txBody>
+          <a:bodyPr rtlCol="0" anchor="ctr"/>
+          <a:lstStyle/>
+          <a:p>
+            <a:pPr algn="ctr"/>
+            <a:r>
+              <a:rPr lang="en-US" dirty="0"/>
+              <a:t>165875</a:t>
+            </a:r>
+          </a:p>
+        </p:txBody>
+      </p:sp>
+      <p:sp>
+        <p:nvSpPr>
+          <p:cNvPr id="31" name="Rectangle 30">
+            <a:extLst>
+              <a:ext uri="{FF2B5EF4-FFF2-40B4-BE49-F238E27FC236}">
+                <a16:creationId xmlns:a16="http://schemas.microsoft.com/office/drawing/2014/main" id="{E5962616-EABC-B026-FB43-68BCC3B9C5C0}"/>
+              </a:ext>
+            </a:extLst>
+          </p:cNvPr>
+          <p:cNvSpPr/>
+          <p:nvPr/>
+        </p:nvSpPr>
+        <p:spPr>
+          <a:xfrm>
+            <a:off x="10412849" y="5532908"/>
+            <a:ext cx="1083800" cy="697793"/>
+          </a:xfrm>
+          <a:prstGeom prst="rect">
+            <a:avLst/>
+          </a:prstGeom>
+          <a:solidFill>
+            <a:srgbClr val="A15949"/>
+          </a:solidFill>
+        </p:spPr>
+        <p:style>
+          <a:lnRef idx="2">
+            <a:schemeClr val="accent1">
+              <a:shade val="15000"/>
+            </a:schemeClr>
+          </a:lnRef>
+          <a:fillRef idx="1">
+            <a:schemeClr val="accent1"/>
+          </a:fillRef>
+          <a:effectRef idx="0">
+            <a:schemeClr val="accent1"/>
+          </a:effectRef>
+          <a:fontRef idx="minor">
+            <a:schemeClr val="lt1"/>
+          </a:fontRef>
+        </p:style>
+        <p:txBody>
+          <a:bodyPr rtlCol="0" anchor="ctr"/>
+          <a:lstStyle/>
+          <a:p>
+            <a:pPr algn="ctr"/>
+            <a:r>
+              <a:rPr lang="en-US" dirty="0"/>
+              <a:t>A15949</a:t>
+            </a:r>
+          </a:p>
+        </p:txBody>
+      </p:sp>
+      <p:pic>
+        <p:nvPicPr>
+          <p:cNvPr id="33" name="Picture 32" descr="A close up of a sign&#10;&#10;AI-generated content may be incorrect.">
+            <a:extLst>
+              <a:ext uri="{FF2B5EF4-FFF2-40B4-BE49-F238E27FC236}">
+                <a16:creationId xmlns:a16="http://schemas.microsoft.com/office/drawing/2014/main" id="{11FFC7B0-191E-F26D-140D-0A17CCC94590}"/>
+              </a:ext>
+            </a:extLst>
+          </p:cNvPr>
+          <p:cNvPicPr>
+            <a:picLocks noChangeAspect="1"/>
+          </p:cNvPicPr>
+          <p:nvPr/>
+        </p:nvPicPr>
+        <p:blipFill>
+          <a:blip r:embed="rId6"/>
+          <a:stretch>
+            <a:fillRect/>
+          </a:stretch>
+        </p:blipFill>
+        <p:spPr>
+          <a:xfrm>
+            <a:off x="396632" y="5881804"/>
+            <a:ext cx="3657600" cy="1689100"/>
+          </a:xfrm>
+          <a:prstGeom prst="rect">
+            <a:avLst/>
+          </a:prstGeom>
+        </p:spPr>
+      </p:pic>
+      <p:sp>
+        <p:nvSpPr>
+          <p:cNvPr id="34" name="Rectangle 33">
+            <a:extLst>
+              <a:ext uri="{FF2B5EF4-FFF2-40B4-BE49-F238E27FC236}">
+                <a16:creationId xmlns:a16="http://schemas.microsoft.com/office/drawing/2014/main" id="{4B729BC4-D049-E4A0-552C-42EE4ED25528}"/>
+              </a:ext>
+            </a:extLst>
+          </p:cNvPr>
+          <p:cNvSpPr/>
+          <p:nvPr/>
+        </p:nvSpPr>
+        <p:spPr>
+          <a:xfrm>
+            <a:off x="4463427" y="6531189"/>
+            <a:ext cx="1083800" cy="697793"/>
+          </a:xfrm>
+          <a:prstGeom prst="rect">
+            <a:avLst/>
+          </a:prstGeom>
+          <a:solidFill>
+            <a:srgbClr val="8E4A52"/>
+          </a:solidFill>
+        </p:spPr>
+        <p:style>
+          <a:lnRef idx="2">
+            <a:schemeClr val="accent1">
+              <a:shade val="15000"/>
+            </a:schemeClr>
+          </a:lnRef>
+          <a:fillRef idx="1">
+            <a:schemeClr val="accent1"/>
+          </a:fillRef>
+          <a:effectRef idx="0">
+            <a:schemeClr val="accent1"/>
+          </a:effectRef>
+          <a:fontRef idx="minor">
+            <a:schemeClr val="lt1"/>
+          </a:fontRef>
+        </p:style>
+        <p:txBody>
+          <a:bodyPr rtlCol="0" anchor="ctr"/>
+          <a:lstStyle/>
+          <a:p>
+            <a:pPr algn="ctr"/>
+            <a:r>
+              <a:rPr lang="en-US" dirty="0"/>
+              <a:t>854E53</a:t>
+            </a:r>
+          </a:p>
+        </p:txBody>
+      </p:sp>
+    </p:spTree>
+    <p:extLst>
+      <p:ext uri="{BB962C8B-B14F-4D97-AF65-F5344CB8AC3E}">
+        <p14:creationId xmlns:p14="http://schemas.microsoft.com/office/powerpoint/2010/main" val="193331974"/>
       </p:ext>
     </p:extLst>
   </p:cSld>

</xml_diff>

<commit_message>
add new logo versions
</commit_message>
<xml_diff>
--- a/public/images/logo-RCM-coop-dev.pptx
+++ b/public/images/logo-RCM-coop-dev.pptx
@@ -8,11 +8,14 @@
     <p:sldId id="256" r:id="rId2"/>
     <p:sldId id="257" r:id="rId3"/>
     <p:sldId id="258" r:id="rId4"/>
-    <p:sldId id="262" r:id="rId5"/>
-    <p:sldId id="269" r:id="rId6"/>
-    <p:sldId id="267" r:id="rId7"/>
-    <p:sldId id="268" r:id="rId8"/>
-    <p:sldId id="270" r:id="rId9"/>
+    <p:sldId id="273" r:id="rId5"/>
+    <p:sldId id="271" r:id="rId6"/>
+    <p:sldId id="272" r:id="rId7"/>
+    <p:sldId id="262" r:id="rId8"/>
+    <p:sldId id="269" r:id="rId9"/>
+    <p:sldId id="267" r:id="rId10"/>
+    <p:sldId id="268" r:id="rId11"/>
+    <p:sldId id="270" r:id="rId12"/>
   </p:sldIdLst>
   <p:sldSz cx="12192000" cy="6858000"/>
   <p:notesSz cx="6858000" cy="9144000"/>
@@ -122,7 +125,7 @@
 <file path=ppt/revisionInfo.xml><?xml version="1.0" encoding="utf-8"?>
 <p1510:revInfo xmlns:a="http://schemas.openxmlformats.org/drawingml/2006/main" xmlns:r="http://schemas.openxmlformats.org/officeDocument/2006/relationships" xmlns:p1510="http://schemas.microsoft.com/office/powerpoint/2015/10/main">
   <p1510:revLst>
-    <p1510:client id="{F1C8B9D2-4377-2C45-B746-CF37BA7A4C1F}" v="38" dt="2025-02-07T10:13:18.520"/>
+    <p1510:client id="{F1C8B9D2-4377-2C45-B746-CF37BA7A4C1F}" v="48" dt="2025-02-10T13:22:07.152"/>
   </p1510:revLst>
 </p1510:revInfo>
 </file>
@@ -132,7 +135,7 @@
   <pc:docChgLst>
     <pc:chgData name="Cassandra Gould Van Praag" userId="d2248499-4cc7-4575-92a4-3dec06827e7f" providerId="ADAL" clId="{F1C8B9D2-4377-2C45-B746-CF37BA7A4C1F}"/>
     <pc:docChg chg="undo redo custSel addSld delSld modSld sldOrd">
-      <pc:chgData name="Cassandra Gould Van Praag" userId="d2248499-4cc7-4575-92a4-3dec06827e7f" providerId="ADAL" clId="{F1C8B9D2-4377-2C45-B746-CF37BA7A4C1F}" dt="2025-02-07T10:13:18.520" v="355" actId="164"/>
+      <pc:chgData name="Cassandra Gould Van Praag" userId="d2248499-4cc7-4575-92a4-3dec06827e7f" providerId="ADAL" clId="{F1C8B9D2-4377-2C45-B746-CF37BA7A4C1F}" dt="2025-02-10T13:22:16.820" v="379" actId="14100"/>
       <pc:docMkLst>
         <pc:docMk/>
       </pc:docMkLst>
@@ -498,6 +501,99 @@
           </ac:picMkLst>
         </pc:picChg>
       </pc:sldChg>
+      <pc:sldChg chg="addSp modSp add mod">
+        <pc:chgData name="Cassandra Gould Van Praag" userId="d2248499-4cc7-4575-92a4-3dec06827e7f" providerId="ADAL" clId="{F1C8B9D2-4377-2C45-B746-CF37BA7A4C1F}" dt="2025-02-10T13:20:02.181" v="363" actId="1367"/>
+        <pc:sldMkLst>
+          <pc:docMk/>
+          <pc:sldMk cId="3430576674" sldId="271"/>
+        </pc:sldMkLst>
+        <pc:spChg chg="add mod">
+          <ac:chgData name="Cassandra Gould Van Praag" userId="d2248499-4cc7-4575-92a4-3dec06827e7f" providerId="ADAL" clId="{F1C8B9D2-4377-2C45-B746-CF37BA7A4C1F}" dt="2025-02-10T13:19:40.330" v="360" actId="167"/>
+          <ac:spMkLst>
+            <pc:docMk/>
+            <pc:sldMk cId="3430576674" sldId="271"/>
+            <ac:spMk id="2" creationId="{81039FAB-F506-3F4F-E805-722D206CAF7A}"/>
+          </ac:spMkLst>
+        </pc:spChg>
+        <pc:spChg chg="mod">
+          <ac:chgData name="Cassandra Gould Van Praag" userId="d2248499-4cc7-4575-92a4-3dec06827e7f" providerId="ADAL" clId="{F1C8B9D2-4377-2C45-B746-CF37BA7A4C1F}" dt="2025-02-10T13:19:49.503" v="361" actId="207"/>
+          <ac:spMkLst>
+            <pc:docMk/>
+            <pc:sldMk cId="3430576674" sldId="271"/>
+            <ac:spMk id="16" creationId="{08862149-1985-77ED-FEA0-6FAE0A4584A8}"/>
+          </ac:spMkLst>
+        </pc:spChg>
+        <pc:spChg chg="mod">
+          <ac:chgData name="Cassandra Gould Van Praag" userId="d2248499-4cc7-4575-92a4-3dec06827e7f" providerId="ADAL" clId="{F1C8B9D2-4377-2C45-B746-CF37BA7A4C1F}" dt="2025-02-10T13:19:49.503" v="361" actId="207"/>
+          <ac:spMkLst>
+            <pc:docMk/>
+            <pc:sldMk cId="3430576674" sldId="271"/>
+            <ac:spMk id="17" creationId="{732FEAEB-7BE7-94FA-93E0-23EE9A4B669D}"/>
+          </ac:spMkLst>
+        </pc:spChg>
+        <pc:picChg chg="mod">
+          <ac:chgData name="Cassandra Gould Van Praag" userId="d2248499-4cc7-4575-92a4-3dec06827e7f" providerId="ADAL" clId="{F1C8B9D2-4377-2C45-B746-CF37BA7A4C1F}" dt="2025-02-10T13:20:02.181" v="363" actId="1367"/>
+          <ac:picMkLst>
+            <pc:docMk/>
+            <pc:sldMk cId="3430576674" sldId="271"/>
+            <ac:picMk id="15" creationId="{517B5364-86DB-3267-103C-89450A4F6543}"/>
+          </ac:picMkLst>
+        </pc:picChg>
+      </pc:sldChg>
+      <pc:sldChg chg="modSp add mod">
+        <pc:chgData name="Cassandra Gould Van Praag" userId="d2248499-4cc7-4575-92a4-3dec06827e7f" providerId="ADAL" clId="{F1C8B9D2-4377-2C45-B746-CF37BA7A4C1F}" dt="2025-02-10T13:20:19.553" v="367" actId="207"/>
+        <pc:sldMkLst>
+          <pc:docMk/>
+          <pc:sldMk cId="3500286002" sldId="272"/>
+        </pc:sldMkLst>
+        <pc:spChg chg="mod">
+          <ac:chgData name="Cassandra Gould Van Praag" userId="d2248499-4cc7-4575-92a4-3dec06827e7f" providerId="ADAL" clId="{F1C8B9D2-4377-2C45-B746-CF37BA7A4C1F}" dt="2025-02-10T13:20:19.553" v="367" actId="207"/>
+          <ac:spMkLst>
+            <pc:docMk/>
+            <pc:sldMk cId="3500286002" sldId="272"/>
+            <ac:spMk id="16" creationId="{72182FE0-E75A-A3B7-89F6-567FFA88B449}"/>
+          </ac:spMkLst>
+        </pc:spChg>
+        <pc:spChg chg="mod">
+          <ac:chgData name="Cassandra Gould Van Praag" userId="d2248499-4cc7-4575-92a4-3dec06827e7f" providerId="ADAL" clId="{F1C8B9D2-4377-2C45-B746-CF37BA7A4C1F}" dt="2025-02-10T13:20:19.553" v="367" actId="207"/>
+          <ac:spMkLst>
+            <pc:docMk/>
+            <pc:sldMk cId="3500286002" sldId="272"/>
+            <ac:spMk id="17" creationId="{86E711D1-89DE-5B42-EEBA-6DD6D6199BDF}"/>
+          </ac:spMkLst>
+        </pc:spChg>
+        <pc:picChg chg="mod">
+          <ac:chgData name="Cassandra Gould Van Praag" userId="d2248499-4cc7-4575-92a4-3dec06827e7f" providerId="ADAL" clId="{F1C8B9D2-4377-2C45-B746-CF37BA7A4C1F}" dt="2025-02-10T13:20:12.900" v="365" actId="1367"/>
+          <ac:picMkLst>
+            <pc:docMk/>
+            <pc:sldMk cId="3500286002" sldId="272"/>
+            <ac:picMk id="15" creationId="{43B41171-202C-D047-3CE4-B100A3E1FC1B}"/>
+          </ac:picMkLst>
+        </pc:picChg>
+      </pc:sldChg>
+      <pc:sldChg chg="addSp modSp add mod">
+        <pc:chgData name="Cassandra Gould Van Praag" userId="d2248499-4cc7-4575-92a4-3dec06827e7f" providerId="ADAL" clId="{F1C8B9D2-4377-2C45-B746-CF37BA7A4C1F}" dt="2025-02-10T13:22:16.820" v="379" actId="14100"/>
+        <pc:sldMkLst>
+          <pc:docMk/>
+          <pc:sldMk cId="326029368" sldId="273"/>
+        </pc:sldMkLst>
+        <pc:spChg chg="add mod">
+          <ac:chgData name="Cassandra Gould Van Praag" userId="d2248499-4cc7-4575-92a4-3dec06827e7f" providerId="ADAL" clId="{F1C8B9D2-4377-2C45-B746-CF37BA7A4C1F}" dt="2025-02-10T13:21:51.255" v="372" actId="14100"/>
+          <ac:spMkLst>
+            <pc:docMk/>
+            <pc:sldMk cId="326029368" sldId="273"/>
+            <ac:spMk id="2" creationId="{83C6F7FF-F1DC-376A-D845-F2CC7C06E5D1}"/>
+          </ac:spMkLst>
+        </pc:spChg>
+        <pc:spChg chg="add mod">
+          <ac:chgData name="Cassandra Gould Van Praag" userId="d2248499-4cc7-4575-92a4-3dec06827e7f" providerId="ADAL" clId="{F1C8B9D2-4377-2C45-B746-CF37BA7A4C1F}" dt="2025-02-10T13:22:16.820" v="379" actId="14100"/>
+          <ac:spMkLst>
+            <pc:docMk/>
+            <pc:sldMk cId="326029368" sldId="273"/>
+            <ac:spMk id="3" creationId="{4CDB1554-EF32-20B8-0EE3-A305089180A3}"/>
+          </ac:spMkLst>
+        </pc:spChg>
+      </pc:sldChg>
     </pc:docChg>
   </pc:docChgLst>
 </pc:chgInfo>
@@ -4027,6 +4123,1156 @@
 </p:sld>
 </file>
 
+<file path=ppt/slides/slide10.xml><?xml version="1.0" encoding="utf-8"?>
+<p:sld xmlns:a="http://schemas.openxmlformats.org/drawingml/2006/main" xmlns:r="http://schemas.openxmlformats.org/officeDocument/2006/relationships" xmlns:p="http://schemas.openxmlformats.org/presentationml/2006/main">
+  <p:cSld>
+    <p:spTree>
+      <p:nvGrpSpPr>
+        <p:cNvPr id="1" name="">
+          <a:extLst>
+            <a:ext uri="{FF2B5EF4-FFF2-40B4-BE49-F238E27FC236}">
+              <a16:creationId xmlns:a16="http://schemas.microsoft.com/office/drawing/2014/main" id="{E5D8A59F-3D34-86C7-6062-1BFC2F8FF374}"/>
+            </a:ext>
+          </a:extLst>
+        </p:cNvPr>
+        <p:cNvGrpSpPr/>
+        <p:nvPr/>
+      </p:nvGrpSpPr>
+      <p:grpSpPr>
+        <a:xfrm>
+          <a:off x="0" y="0"/>
+          <a:ext cx="0" cy="0"/>
+          <a:chOff x="0" y="0"/>
+          <a:chExt cx="0" cy="0"/>
+        </a:xfrm>
+      </p:grpSpPr>
+      <p:sp>
+        <p:nvSpPr>
+          <p:cNvPr id="3" name="Rectangle 2">
+            <a:extLst>
+              <a:ext uri="{FF2B5EF4-FFF2-40B4-BE49-F238E27FC236}">
+                <a16:creationId xmlns:a16="http://schemas.microsoft.com/office/drawing/2014/main" id="{32B25E25-AE7F-86B3-86B6-FAFF2B83B1DC}"/>
+              </a:ext>
+            </a:extLst>
+          </p:cNvPr>
+          <p:cNvSpPr/>
+          <p:nvPr/>
+        </p:nvSpPr>
+        <p:spPr>
+          <a:xfrm>
+            <a:off x="2732503" y="957244"/>
+            <a:ext cx="6224530" cy="4109291"/>
+          </a:xfrm>
+          <a:prstGeom prst="rect">
+            <a:avLst/>
+          </a:prstGeom>
+          <a:solidFill>
+            <a:srgbClr val="00B050"/>
+          </a:solidFill>
+        </p:spPr>
+        <p:style>
+          <a:lnRef idx="2">
+            <a:schemeClr val="accent1">
+              <a:shade val="15000"/>
+            </a:schemeClr>
+          </a:lnRef>
+          <a:fillRef idx="1">
+            <a:schemeClr val="accent1"/>
+          </a:fillRef>
+          <a:effectRef idx="0">
+            <a:schemeClr val="accent1"/>
+          </a:effectRef>
+          <a:fontRef idx="minor">
+            <a:schemeClr val="lt1"/>
+          </a:fontRef>
+        </p:style>
+        <p:txBody>
+          <a:bodyPr rtlCol="0" anchor="ctr"/>
+          <a:lstStyle/>
+          <a:p>
+            <a:pPr algn="ctr"/>
+            <a:endParaRPr lang="en-US"/>
+          </a:p>
+        </p:txBody>
+      </p:sp>
+      <p:pic>
+        <p:nvPicPr>
+          <p:cNvPr id="15" name="Picture 14">
+            <a:extLst>
+              <a:ext uri="{FF2B5EF4-FFF2-40B4-BE49-F238E27FC236}">
+                <a16:creationId xmlns:a16="http://schemas.microsoft.com/office/drawing/2014/main" id="{C3080791-AC69-70D5-79AF-E34FF3690D4A}"/>
+              </a:ext>
+            </a:extLst>
+          </p:cNvPr>
+          <p:cNvPicPr>
+            <a:picLocks noChangeAspect="1"/>
+          </p:cNvPicPr>
+          <p:nvPr/>
+        </p:nvPicPr>
+        <p:blipFill>
+          <a:blip r:embed="rId2">
+            <a:biLevel thresh="25000"/>
+          </a:blip>
+          <a:stretch>
+            <a:fillRect/>
+          </a:stretch>
+        </p:blipFill>
+        <p:spPr>
+          <a:xfrm>
+            <a:off x="3327465" y="1947221"/>
+            <a:ext cx="1956690" cy="2129339"/>
+          </a:xfrm>
+          <a:prstGeom prst="rect">
+            <a:avLst/>
+          </a:prstGeom>
+        </p:spPr>
+      </p:pic>
+      <p:sp>
+        <p:nvSpPr>
+          <p:cNvPr id="16" name="TextBox 15">
+            <a:extLst>
+              <a:ext uri="{FF2B5EF4-FFF2-40B4-BE49-F238E27FC236}">
+                <a16:creationId xmlns:a16="http://schemas.microsoft.com/office/drawing/2014/main" id="{2CD93FA1-7B75-EA99-8F78-F16664E56BC3}"/>
+              </a:ext>
+            </a:extLst>
+          </p:cNvPr>
+          <p:cNvSpPr txBox="1"/>
+          <p:nvPr/>
+        </p:nvSpPr>
+        <p:spPr>
+          <a:xfrm>
+            <a:off x="5225241" y="2064923"/>
+            <a:ext cx="2931944" cy="1477328"/>
+          </a:xfrm>
+          <a:prstGeom prst="rect">
+            <a:avLst/>
+          </a:prstGeom>
+          <a:noFill/>
+        </p:spPr>
+        <p:txBody>
+          <a:bodyPr wrap="square" rtlCol="0">
+            <a:spAutoFit/>
+          </a:bodyPr>
+          <a:lstStyle/>
+          <a:p>
+            <a:pPr algn="ctr"/>
+            <a:r>
+              <a:rPr lang="en-US" sz="9000" b="1" dirty="0">
+                <a:solidFill>
+                  <a:schemeClr val="bg1"/>
+                </a:solidFill>
+                <a:latin typeface="SF Orson Casual Medium" pitchFamily="2" charset="0"/>
+              </a:rPr>
+              <a:t>RCM</a:t>
+            </a:r>
+          </a:p>
+        </p:txBody>
+      </p:sp>
+      <p:sp>
+        <p:nvSpPr>
+          <p:cNvPr id="2" name="TextBox 1">
+            <a:extLst>
+              <a:ext uri="{FF2B5EF4-FFF2-40B4-BE49-F238E27FC236}">
+                <a16:creationId xmlns:a16="http://schemas.microsoft.com/office/drawing/2014/main" id="{3F5082BF-04F0-90DB-4DC0-3BAF974CD0E2}"/>
+              </a:ext>
+            </a:extLst>
+          </p:cNvPr>
+          <p:cNvSpPr txBox="1"/>
+          <p:nvPr/>
+        </p:nvSpPr>
+        <p:spPr>
+          <a:xfrm>
+            <a:off x="5082215" y="3368674"/>
+            <a:ext cx="3217997" cy="707886"/>
+          </a:xfrm>
+          <a:prstGeom prst="rect">
+            <a:avLst/>
+          </a:prstGeom>
+          <a:noFill/>
+        </p:spPr>
+        <p:txBody>
+          <a:bodyPr wrap="none" rtlCol="0">
+            <a:spAutoFit/>
+          </a:bodyPr>
+          <a:lstStyle/>
+          <a:p>
+            <a:pPr algn="ctr"/>
+            <a:r>
+              <a:rPr lang="en-US" sz="4000" b="1" dirty="0">
+                <a:solidFill>
+                  <a:schemeClr val="bg1"/>
+                </a:solidFill>
+                <a:latin typeface="SF Orson Casual Medium" pitchFamily="2" charset="0"/>
+              </a:rPr>
+              <a:t>Cooperative</a:t>
+            </a:r>
+          </a:p>
+        </p:txBody>
+      </p:sp>
+    </p:spTree>
+    <p:extLst>
+      <p:ext uri="{BB962C8B-B14F-4D97-AF65-F5344CB8AC3E}">
+        <p14:creationId xmlns:p14="http://schemas.microsoft.com/office/powerpoint/2010/main" val="608892475"/>
+      </p:ext>
+    </p:extLst>
+  </p:cSld>
+  <p:clrMapOvr>
+    <a:masterClrMapping/>
+  </p:clrMapOvr>
+</p:sld>
+</file>
+
+<file path=ppt/slides/slide11.xml><?xml version="1.0" encoding="utf-8"?>
+<p:sld xmlns:a="http://schemas.openxmlformats.org/drawingml/2006/main" xmlns:r="http://schemas.openxmlformats.org/officeDocument/2006/relationships" xmlns:p="http://schemas.openxmlformats.org/presentationml/2006/main">
+  <p:cSld>
+    <p:spTree>
+      <p:nvGrpSpPr>
+        <p:cNvPr id="1" name=""/>
+        <p:cNvGrpSpPr/>
+        <p:nvPr/>
+      </p:nvGrpSpPr>
+      <p:grpSpPr>
+        <a:xfrm>
+          <a:off x="0" y="0"/>
+          <a:ext cx="0" cy="0"/>
+          <a:chOff x="0" y="0"/>
+          <a:chExt cx="0" cy="0"/>
+        </a:xfrm>
+      </p:grpSpPr>
+      <p:pic>
+        <p:nvPicPr>
+          <p:cNvPr id="5" name="Picture 4" descr="A blue and pink rectangle&#10;&#10;AI-generated content may be incorrect.">
+            <a:extLst>
+              <a:ext uri="{FF2B5EF4-FFF2-40B4-BE49-F238E27FC236}">
+                <a16:creationId xmlns:a16="http://schemas.microsoft.com/office/drawing/2014/main" id="{7E5A9474-AAEB-E8DC-616C-2E475470F26E}"/>
+              </a:ext>
+            </a:extLst>
+          </p:cNvPr>
+          <p:cNvPicPr>
+            <a:picLocks noChangeAspect="1"/>
+          </p:cNvPicPr>
+          <p:nvPr/>
+        </p:nvPicPr>
+        <p:blipFill>
+          <a:blip r:embed="rId2"/>
+          <a:stretch>
+            <a:fillRect/>
+          </a:stretch>
+        </p:blipFill>
+        <p:spPr>
+          <a:xfrm>
+            <a:off x="47091" y="1685441"/>
+            <a:ext cx="1231900" cy="3810000"/>
+          </a:xfrm>
+          <a:prstGeom prst="rect">
+            <a:avLst/>
+          </a:prstGeom>
+        </p:spPr>
+      </p:pic>
+      <p:sp>
+        <p:nvSpPr>
+          <p:cNvPr id="7" name="TextBox 6">
+            <a:extLst>
+              <a:ext uri="{FF2B5EF4-FFF2-40B4-BE49-F238E27FC236}">
+                <a16:creationId xmlns:a16="http://schemas.microsoft.com/office/drawing/2014/main" id="{510AC43B-3FA6-4EDB-B4C0-D6F042277F3A}"/>
+              </a:ext>
+            </a:extLst>
+          </p:cNvPr>
+          <p:cNvSpPr txBox="1"/>
+          <p:nvPr/>
+        </p:nvSpPr>
+        <p:spPr>
+          <a:xfrm>
+            <a:off x="1615807" y="322196"/>
+            <a:ext cx="7572260" cy="646331"/>
+          </a:xfrm>
+          <a:prstGeom prst="rect">
+            <a:avLst/>
+          </a:prstGeom>
+          <a:noFill/>
+        </p:spPr>
+        <p:txBody>
+          <a:bodyPr wrap="square">
+            <a:spAutoFit/>
+          </a:bodyPr>
+          <a:lstStyle/>
+          <a:p>
+            <a:r>
+              <a:rPr lang="en-US" dirty="0"/>
+              <a:t>https://</a:t>
+            </a:r>
+            <a:r>
+              <a:rPr lang="en-US" dirty="0" err="1"/>
+              <a:t>davidmathlogic.com</a:t>
+            </a:r>
+            <a:r>
+              <a:rPr lang="en-US" dirty="0"/>
+              <a:t>/colorblind/#%23D81B60-%231E88E5-%23FFC107-%23004D40</a:t>
+            </a:r>
+          </a:p>
+        </p:txBody>
+      </p:sp>
+      <p:sp>
+        <p:nvSpPr>
+          <p:cNvPr id="8" name="Rectangle 7">
+            <a:extLst>
+              <a:ext uri="{FF2B5EF4-FFF2-40B4-BE49-F238E27FC236}">
+                <a16:creationId xmlns:a16="http://schemas.microsoft.com/office/drawing/2014/main" id="{D731146C-C63B-7A41-459B-219AE4B9205B}"/>
+              </a:ext>
+            </a:extLst>
+          </p:cNvPr>
+          <p:cNvSpPr/>
+          <p:nvPr/>
+        </p:nvSpPr>
+        <p:spPr>
+          <a:xfrm>
+            <a:off x="1544283" y="1704604"/>
+            <a:ext cx="1564396" cy="826265"/>
+          </a:xfrm>
+          <a:prstGeom prst="rect">
+            <a:avLst/>
+          </a:prstGeom>
+          <a:solidFill>
+            <a:srgbClr val="D53131"/>
+          </a:solidFill>
+        </p:spPr>
+        <p:style>
+          <a:lnRef idx="2">
+            <a:schemeClr val="accent1">
+              <a:shade val="15000"/>
+            </a:schemeClr>
+          </a:lnRef>
+          <a:fillRef idx="1">
+            <a:schemeClr val="accent1"/>
+          </a:fillRef>
+          <a:effectRef idx="0">
+            <a:schemeClr val="accent1"/>
+          </a:effectRef>
+          <a:fontRef idx="minor">
+            <a:schemeClr val="lt1"/>
+          </a:fontRef>
+        </p:style>
+        <p:txBody>
+          <a:bodyPr rtlCol="0" anchor="ctr"/>
+          <a:lstStyle/>
+          <a:p>
+            <a:pPr algn="ctr"/>
+            <a:r>
+              <a:rPr lang="en-US" dirty="0"/>
+              <a:t>D53131</a:t>
+            </a:r>
+          </a:p>
+        </p:txBody>
+      </p:sp>
+      <p:sp>
+        <p:nvSpPr>
+          <p:cNvPr id="10" name="Rectangle 9">
+            <a:extLst>
+              <a:ext uri="{FF2B5EF4-FFF2-40B4-BE49-F238E27FC236}">
+                <a16:creationId xmlns:a16="http://schemas.microsoft.com/office/drawing/2014/main" id="{EA6C578D-DD32-9010-B015-64E163037C15}"/>
+              </a:ext>
+            </a:extLst>
+          </p:cNvPr>
+          <p:cNvSpPr/>
+          <p:nvPr/>
+        </p:nvSpPr>
+        <p:spPr>
+          <a:xfrm>
+            <a:off x="1544283" y="2661236"/>
+            <a:ext cx="1564396" cy="826265"/>
+          </a:xfrm>
+          <a:prstGeom prst="rect">
+            <a:avLst/>
+          </a:prstGeom>
+          <a:solidFill>
+            <a:srgbClr val="00929C"/>
+          </a:solidFill>
+        </p:spPr>
+        <p:style>
+          <a:lnRef idx="2">
+            <a:schemeClr val="accent1">
+              <a:shade val="15000"/>
+            </a:schemeClr>
+          </a:lnRef>
+          <a:fillRef idx="1">
+            <a:schemeClr val="accent1"/>
+          </a:fillRef>
+          <a:effectRef idx="0">
+            <a:schemeClr val="accent1"/>
+          </a:effectRef>
+          <a:fontRef idx="minor">
+            <a:schemeClr val="lt1"/>
+          </a:fontRef>
+        </p:style>
+        <p:txBody>
+          <a:bodyPr rtlCol="0" anchor="ctr"/>
+          <a:lstStyle/>
+          <a:p>
+            <a:pPr algn="ctr"/>
+            <a:r>
+              <a:rPr lang="en-US" dirty="0"/>
+              <a:t>00929C</a:t>
+            </a:r>
+          </a:p>
+        </p:txBody>
+      </p:sp>
+      <p:sp>
+        <p:nvSpPr>
+          <p:cNvPr id="11" name="Rectangle 10">
+            <a:extLst>
+              <a:ext uri="{FF2B5EF4-FFF2-40B4-BE49-F238E27FC236}">
+                <a16:creationId xmlns:a16="http://schemas.microsoft.com/office/drawing/2014/main" id="{399F9095-9C4E-6779-27EA-F30011A44430}"/>
+              </a:ext>
+            </a:extLst>
+          </p:cNvPr>
+          <p:cNvSpPr/>
+          <p:nvPr/>
+        </p:nvSpPr>
+        <p:spPr>
+          <a:xfrm>
+            <a:off x="1544283" y="3651875"/>
+            <a:ext cx="1564396" cy="826265"/>
+          </a:xfrm>
+          <a:prstGeom prst="rect">
+            <a:avLst/>
+          </a:prstGeom>
+          <a:solidFill>
+            <a:srgbClr val="FFB6C0"/>
+          </a:solidFill>
+        </p:spPr>
+        <p:style>
+          <a:lnRef idx="2">
+            <a:schemeClr val="accent1">
+              <a:shade val="15000"/>
+            </a:schemeClr>
+          </a:lnRef>
+          <a:fillRef idx="1">
+            <a:schemeClr val="accent1"/>
+          </a:fillRef>
+          <a:effectRef idx="0">
+            <a:schemeClr val="accent1"/>
+          </a:effectRef>
+          <a:fontRef idx="minor">
+            <a:schemeClr val="lt1"/>
+          </a:fontRef>
+        </p:style>
+        <p:txBody>
+          <a:bodyPr rtlCol="0" anchor="ctr"/>
+          <a:lstStyle/>
+          <a:p>
+            <a:pPr algn="ctr"/>
+            <a:r>
+              <a:rPr lang="en-US" dirty="0"/>
+              <a:t>FFB6C0</a:t>
+            </a:r>
+          </a:p>
+        </p:txBody>
+      </p:sp>
+      <p:sp>
+        <p:nvSpPr>
+          <p:cNvPr id="12" name="Rectangle 11">
+            <a:extLst>
+              <a:ext uri="{FF2B5EF4-FFF2-40B4-BE49-F238E27FC236}">
+                <a16:creationId xmlns:a16="http://schemas.microsoft.com/office/drawing/2014/main" id="{0354E73C-E8B7-D998-2395-3D5D5C7EB90F}"/>
+              </a:ext>
+            </a:extLst>
+          </p:cNvPr>
+          <p:cNvSpPr/>
+          <p:nvPr/>
+        </p:nvSpPr>
+        <p:spPr>
+          <a:xfrm>
+            <a:off x="1544283" y="4669176"/>
+            <a:ext cx="1564396" cy="826265"/>
+          </a:xfrm>
+          <a:prstGeom prst="rect">
+            <a:avLst/>
+          </a:prstGeom>
+          <a:solidFill>
+            <a:srgbClr val="194C52"/>
+          </a:solidFill>
+        </p:spPr>
+        <p:style>
+          <a:lnRef idx="2">
+            <a:schemeClr val="accent1">
+              <a:shade val="15000"/>
+            </a:schemeClr>
+          </a:lnRef>
+          <a:fillRef idx="1">
+            <a:schemeClr val="accent1"/>
+          </a:fillRef>
+          <a:effectRef idx="0">
+            <a:schemeClr val="accent1"/>
+          </a:effectRef>
+          <a:fontRef idx="minor">
+            <a:schemeClr val="lt1"/>
+          </a:fontRef>
+        </p:style>
+        <p:txBody>
+          <a:bodyPr rtlCol="0" anchor="ctr"/>
+          <a:lstStyle/>
+          <a:p>
+            <a:pPr algn="ctr"/>
+            <a:r>
+              <a:rPr lang="en-US" dirty="0"/>
+              <a:t>194C52</a:t>
+            </a:r>
+          </a:p>
+        </p:txBody>
+      </p:sp>
+      <p:pic>
+        <p:nvPicPr>
+          <p:cNvPr id="14" name="Picture 13" descr="A close up of a white and blue object&#10;&#10;AI-generated content may be incorrect.">
+            <a:extLst>
+              <a:ext uri="{FF2B5EF4-FFF2-40B4-BE49-F238E27FC236}">
+                <a16:creationId xmlns:a16="http://schemas.microsoft.com/office/drawing/2014/main" id="{F3DBFCD2-210A-F719-ED83-3BB9BBD17A09}"/>
+              </a:ext>
+            </a:extLst>
+          </p:cNvPr>
+          <p:cNvPicPr>
+            <a:picLocks noChangeAspect="1"/>
+          </p:cNvPicPr>
+          <p:nvPr/>
+        </p:nvPicPr>
+        <p:blipFill>
+          <a:blip r:embed="rId3"/>
+          <a:stretch>
+            <a:fillRect/>
+          </a:stretch>
+        </p:blipFill>
+        <p:spPr>
+          <a:xfrm>
+            <a:off x="4766147" y="976195"/>
+            <a:ext cx="6073100" cy="1703534"/>
+          </a:xfrm>
+          <a:prstGeom prst="rect">
+            <a:avLst/>
+          </a:prstGeom>
+        </p:spPr>
+      </p:pic>
+      <p:sp>
+        <p:nvSpPr>
+          <p:cNvPr id="19" name="Rectangle 18">
+            <a:extLst>
+              <a:ext uri="{FF2B5EF4-FFF2-40B4-BE49-F238E27FC236}">
+                <a16:creationId xmlns:a16="http://schemas.microsoft.com/office/drawing/2014/main" id="{67CFF1F0-B730-DBD7-4231-E6B78C389F35}"/>
+              </a:ext>
+            </a:extLst>
+          </p:cNvPr>
+          <p:cNvSpPr/>
+          <p:nvPr/>
+        </p:nvSpPr>
+        <p:spPr>
+          <a:xfrm>
+            <a:off x="9755447" y="3103129"/>
+            <a:ext cx="1083800" cy="697793"/>
+          </a:xfrm>
+          <a:prstGeom prst="rect">
+            <a:avLst/>
+          </a:prstGeom>
+          <a:solidFill>
+            <a:srgbClr val="CE816F"/>
+          </a:solidFill>
+        </p:spPr>
+        <p:style>
+          <a:lnRef idx="2">
+            <a:schemeClr val="accent1">
+              <a:shade val="15000"/>
+            </a:schemeClr>
+          </a:lnRef>
+          <a:fillRef idx="1">
+            <a:schemeClr val="accent1"/>
+          </a:fillRef>
+          <a:effectRef idx="0">
+            <a:schemeClr val="accent1"/>
+          </a:effectRef>
+          <a:fontRef idx="minor">
+            <a:schemeClr val="lt1"/>
+          </a:fontRef>
+        </p:style>
+        <p:txBody>
+          <a:bodyPr rtlCol="0" anchor="ctr"/>
+          <a:lstStyle/>
+          <a:p>
+            <a:pPr algn="ctr"/>
+            <a:r>
+              <a:rPr lang="en-US" dirty="0"/>
+              <a:t>CE816F</a:t>
+            </a:r>
+          </a:p>
+        </p:txBody>
+      </p:sp>
+      <p:sp>
+        <p:nvSpPr>
+          <p:cNvPr id="20" name="Rectangle 19">
+            <a:extLst>
+              <a:ext uri="{FF2B5EF4-FFF2-40B4-BE49-F238E27FC236}">
+                <a16:creationId xmlns:a16="http://schemas.microsoft.com/office/drawing/2014/main" id="{62723756-7387-2CC0-45B8-BD960162F70E}"/>
+              </a:ext>
+            </a:extLst>
+          </p:cNvPr>
+          <p:cNvSpPr/>
+          <p:nvPr/>
+        </p:nvSpPr>
+        <p:spPr>
+          <a:xfrm>
+            <a:off x="8387235" y="3103129"/>
+            <a:ext cx="1083800" cy="697793"/>
+          </a:xfrm>
+          <a:prstGeom prst="rect">
+            <a:avLst/>
+          </a:prstGeom>
+          <a:solidFill>
+            <a:srgbClr val="00929C"/>
+          </a:solidFill>
+        </p:spPr>
+        <p:style>
+          <a:lnRef idx="2">
+            <a:schemeClr val="accent1">
+              <a:shade val="15000"/>
+            </a:schemeClr>
+          </a:lnRef>
+          <a:fillRef idx="1">
+            <a:schemeClr val="accent1"/>
+          </a:fillRef>
+          <a:effectRef idx="0">
+            <a:schemeClr val="accent1"/>
+          </a:effectRef>
+          <a:fontRef idx="minor">
+            <a:schemeClr val="lt1"/>
+          </a:fontRef>
+        </p:style>
+        <p:txBody>
+          <a:bodyPr rtlCol="0" anchor="ctr"/>
+          <a:lstStyle/>
+          <a:p>
+            <a:pPr algn="ctr"/>
+            <a:r>
+              <a:rPr lang="en-US" dirty="0"/>
+              <a:t>00929C</a:t>
+            </a:r>
+          </a:p>
+        </p:txBody>
+      </p:sp>
+      <p:sp>
+        <p:nvSpPr>
+          <p:cNvPr id="21" name="Rectangle 20">
+            <a:extLst>
+              <a:ext uri="{FF2B5EF4-FFF2-40B4-BE49-F238E27FC236}">
+                <a16:creationId xmlns:a16="http://schemas.microsoft.com/office/drawing/2014/main" id="{4F6CD775-0E7C-4B1D-7313-7699DBEDE16A}"/>
+              </a:ext>
+            </a:extLst>
+          </p:cNvPr>
+          <p:cNvSpPr/>
+          <p:nvPr/>
+        </p:nvSpPr>
+        <p:spPr>
+          <a:xfrm>
+            <a:off x="6887981" y="3103129"/>
+            <a:ext cx="1083800" cy="697793"/>
+          </a:xfrm>
+          <a:prstGeom prst="rect">
+            <a:avLst/>
+          </a:prstGeom>
+          <a:solidFill>
+            <a:srgbClr val="FFB6C0"/>
+          </a:solidFill>
+        </p:spPr>
+        <p:style>
+          <a:lnRef idx="2">
+            <a:schemeClr val="accent1">
+              <a:shade val="15000"/>
+            </a:schemeClr>
+          </a:lnRef>
+          <a:fillRef idx="1">
+            <a:schemeClr val="accent1"/>
+          </a:fillRef>
+          <a:effectRef idx="0">
+            <a:schemeClr val="accent1"/>
+          </a:effectRef>
+          <a:fontRef idx="minor">
+            <a:schemeClr val="lt1"/>
+          </a:fontRef>
+        </p:style>
+        <p:txBody>
+          <a:bodyPr rtlCol="0" anchor="ctr"/>
+          <a:lstStyle/>
+          <a:p>
+            <a:pPr algn="ctr"/>
+            <a:r>
+              <a:rPr lang="en-US" dirty="0"/>
+              <a:t>FFB6C0</a:t>
+            </a:r>
+          </a:p>
+        </p:txBody>
+      </p:sp>
+      <p:sp>
+        <p:nvSpPr>
+          <p:cNvPr id="22" name="Rectangle 21">
+            <a:extLst>
+              <a:ext uri="{FF2B5EF4-FFF2-40B4-BE49-F238E27FC236}">
+                <a16:creationId xmlns:a16="http://schemas.microsoft.com/office/drawing/2014/main" id="{55307FB2-1095-59D5-7A05-77CD429EE14A}"/>
+              </a:ext>
+            </a:extLst>
+          </p:cNvPr>
+          <p:cNvSpPr/>
+          <p:nvPr/>
+        </p:nvSpPr>
+        <p:spPr>
+          <a:xfrm>
+            <a:off x="5304020" y="3103129"/>
+            <a:ext cx="1083800" cy="697793"/>
+          </a:xfrm>
+          <a:prstGeom prst="rect">
+            <a:avLst/>
+          </a:prstGeom>
+          <a:solidFill>
+            <a:srgbClr val="194C52"/>
+          </a:solidFill>
+        </p:spPr>
+        <p:style>
+          <a:lnRef idx="2">
+            <a:schemeClr val="accent1">
+              <a:shade val="15000"/>
+            </a:schemeClr>
+          </a:lnRef>
+          <a:fillRef idx="1">
+            <a:schemeClr val="accent1"/>
+          </a:fillRef>
+          <a:effectRef idx="0">
+            <a:schemeClr val="accent1"/>
+          </a:effectRef>
+          <a:fontRef idx="minor">
+            <a:schemeClr val="lt1"/>
+          </a:fontRef>
+        </p:style>
+        <p:txBody>
+          <a:bodyPr rtlCol="0" anchor="ctr"/>
+          <a:lstStyle/>
+          <a:p>
+            <a:pPr algn="ctr"/>
+            <a:r>
+              <a:rPr lang="en-US" dirty="0"/>
+              <a:t>194C52</a:t>
+            </a:r>
+          </a:p>
+        </p:txBody>
+      </p:sp>
+      <p:pic>
+        <p:nvPicPr>
+          <p:cNvPr id="24" name="Picture 23" descr="A close-up of a plate&#10;&#10;AI-generated content may be incorrect.">
+            <a:extLst>
+              <a:ext uri="{FF2B5EF4-FFF2-40B4-BE49-F238E27FC236}">
+                <a16:creationId xmlns:a16="http://schemas.microsoft.com/office/drawing/2014/main" id="{0949A77F-9F7B-411A-1A9F-42AE8411256A}"/>
+              </a:ext>
+            </a:extLst>
+          </p:cNvPr>
+          <p:cNvPicPr>
+            <a:picLocks noChangeAspect="1"/>
+          </p:cNvPicPr>
+          <p:nvPr/>
+        </p:nvPicPr>
+        <p:blipFill>
+          <a:blip r:embed="rId4"/>
+          <a:stretch>
+            <a:fillRect/>
+          </a:stretch>
+        </p:blipFill>
+        <p:spPr>
+          <a:xfrm>
+            <a:off x="10412849" y="1509728"/>
+            <a:ext cx="1574800" cy="2247900"/>
+          </a:xfrm>
+          <a:prstGeom prst="rect">
+            <a:avLst/>
+          </a:prstGeom>
+        </p:spPr>
+      </p:pic>
+      <p:pic>
+        <p:nvPicPr>
+          <p:cNvPr id="26" name="Picture 25" descr="A close-up of a card&#10;&#10;AI-generated content may be incorrect.">
+            <a:extLst>
+              <a:ext uri="{FF2B5EF4-FFF2-40B4-BE49-F238E27FC236}">
+                <a16:creationId xmlns:a16="http://schemas.microsoft.com/office/drawing/2014/main" id="{D3627E63-43A5-D83E-167C-6FB3FE64E703}"/>
+              </a:ext>
+            </a:extLst>
+          </p:cNvPr>
+          <p:cNvPicPr>
+            <a:picLocks noChangeAspect="1"/>
+          </p:cNvPicPr>
+          <p:nvPr/>
+        </p:nvPicPr>
+        <p:blipFill>
+          <a:blip r:embed="rId5"/>
+          <a:stretch>
+            <a:fillRect/>
+          </a:stretch>
+        </p:blipFill>
+        <p:spPr>
+          <a:xfrm>
+            <a:off x="4000874" y="4047691"/>
+            <a:ext cx="7772400" cy="1034617"/>
+          </a:xfrm>
+          <a:prstGeom prst="rect">
+            <a:avLst/>
+          </a:prstGeom>
+        </p:spPr>
+      </p:pic>
+      <p:sp>
+        <p:nvSpPr>
+          <p:cNvPr id="27" name="Rectangle 26">
+            <a:extLst>
+              <a:ext uri="{FF2B5EF4-FFF2-40B4-BE49-F238E27FC236}">
+                <a16:creationId xmlns:a16="http://schemas.microsoft.com/office/drawing/2014/main" id="{A05758C1-6D3C-DF7F-3862-FE80F28D85EA}"/>
+              </a:ext>
+            </a:extLst>
+          </p:cNvPr>
+          <p:cNvSpPr/>
+          <p:nvPr/>
+        </p:nvSpPr>
+        <p:spPr>
+          <a:xfrm>
+            <a:off x="8844428" y="5492101"/>
+            <a:ext cx="1083800" cy="697793"/>
+          </a:xfrm>
+          <a:prstGeom prst="rect">
+            <a:avLst/>
+          </a:prstGeom>
+          <a:solidFill>
+            <a:srgbClr val="CE816F"/>
+          </a:solidFill>
+        </p:spPr>
+        <p:style>
+          <a:lnRef idx="2">
+            <a:schemeClr val="accent1">
+              <a:shade val="15000"/>
+            </a:schemeClr>
+          </a:lnRef>
+          <a:fillRef idx="1">
+            <a:schemeClr val="accent1"/>
+          </a:fillRef>
+          <a:effectRef idx="0">
+            <a:schemeClr val="accent1"/>
+          </a:effectRef>
+          <a:fontRef idx="minor">
+            <a:schemeClr val="lt1"/>
+          </a:fontRef>
+        </p:style>
+        <p:txBody>
+          <a:bodyPr rtlCol="0" anchor="ctr"/>
+          <a:lstStyle/>
+          <a:p>
+            <a:pPr algn="ctr"/>
+            <a:r>
+              <a:rPr lang="en-US" dirty="0"/>
+              <a:t>CE816F</a:t>
+            </a:r>
+          </a:p>
+        </p:txBody>
+      </p:sp>
+      <p:sp>
+        <p:nvSpPr>
+          <p:cNvPr id="28" name="Rectangle 27">
+            <a:extLst>
+              <a:ext uri="{FF2B5EF4-FFF2-40B4-BE49-F238E27FC236}">
+                <a16:creationId xmlns:a16="http://schemas.microsoft.com/office/drawing/2014/main" id="{84ED3B10-A81B-919C-5946-9ED0B10120E0}"/>
+              </a:ext>
+            </a:extLst>
+          </p:cNvPr>
+          <p:cNvSpPr/>
+          <p:nvPr/>
+        </p:nvSpPr>
+        <p:spPr>
+          <a:xfrm>
+            <a:off x="7345174" y="5492101"/>
+            <a:ext cx="1083800" cy="697793"/>
+          </a:xfrm>
+          <a:prstGeom prst="rect">
+            <a:avLst/>
+          </a:prstGeom>
+          <a:solidFill>
+            <a:srgbClr val="E4B3A9"/>
+          </a:solidFill>
+        </p:spPr>
+        <p:style>
+          <a:lnRef idx="2">
+            <a:schemeClr val="accent1">
+              <a:shade val="15000"/>
+            </a:schemeClr>
+          </a:lnRef>
+          <a:fillRef idx="1">
+            <a:schemeClr val="accent1"/>
+          </a:fillRef>
+          <a:effectRef idx="0">
+            <a:schemeClr val="accent1"/>
+          </a:effectRef>
+          <a:fontRef idx="minor">
+            <a:schemeClr val="lt1"/>
+          </a:fontRef>
+        </p:style>
+        <p:txBody>
+          <a:bodyPr rtlCol="0" anchor="ctr"/>
+          <a:lstStyle/>
+          <a:p>
+            <a:pPr algn="ctr"/>
+            <a:r>
+              <a:rPr lang="en-US" dirty="0"/>
+              <a:t>E4B3A9</a:t>
+            </a:r>
+          </a:p>
+        </p:txBody>
+      </p:sp>
+      <p:sp>
+        <p:nvSpPr>
+          <p:cNvPr id="29" name="Rectangle 28">
+            <a:extLst>
+              <a:ext uri="{FF2B5EF4-FFF2-40B4-BE49-F238E27FC236}">
+                <a16:creationId xmlns:a16="http://schemas.microsoft.com/office/drawing/2014/main" id="{5C888941-A838-6647-5B56-AAD4727797BE}"/>
+              </a:ext>
+            </a:extLst>
+          </p:cNvPr>
+          <p:cNvSpPr/>
+          <p:nvPr/>
+        </p:nvSpPr>
+        <p:spPr>
+          <a:xfrm>
+            <a:off x="5845920" y="5492101"/>
+            <a:ext cx="1083800" cy="697793"/>
+          </a:xfrm>
+          <a:prstGeom prst="rect">
+            <a:avLst/>
+          </a:prstGeom>
+          <a:solidFill>
+            <a:srgbClr val="2E7F9E"/>
+          </a:solidFill>
+        </p:spPr>
+        <p:style>
+          <a:lnRef idx="2">
+            <a:schemeClr val="accent1">
+              <a:shade val="15000"/>
+            </a:schemeClr>
+          </a:lnRef>
+          <a:fillRef idx="1">
+            <a:schemeClr val="accent1"/>
+          </a:fillRef>
+          <a:effectRef idx="0">
+            <a:schemeClr val="accent1"/>
+          </a:effectRef>
+          <a:fontRef idx="minor">
+            <a:schemeClr val="lt1"/>
+          </a:fontRef>
+        </p:style>
+        <p:txBody>
+          <a:bodyPr rtlCol="0" anchor="ctr"/>
+          <a:lstStyle/>
+          <a:p>
+            <a:pPr algn="ctr"/>
+            <a:r>
+              <a:rPr lang="en-US" dirty="0"/>
+              <a:t>2E7F9E</a:t>
+            </a:r>
+          </a:p>
+        </p:txBody>
+      </p:sp>
+      <p:sp>
+        <p:nvSpPr>
+          <p:cNvPr id="30" name="Rectangle 29">
+            <a:extLst>
+              <a:ext uri="{FF2B5EF4-FFF2-40B4-BE49-F238E27FC236}">
+                <a16:creationId xmlns:a16="http://schemas.microsoft.com/office/drawing/2014/main" id="{91F574BF-9536-31EE-C6F7-FF927D599F8D}"/>
+              </a:ext>
+            </a:extLst>
+          </p:cNvPr>
+          <p:cNvSpPr/>
+          <p:nvPr/>
+        </p:nvSpPr>
+        <p:spPr>
+          <a:xfrm>
+            <a:off x="4261959" y="5492101"/>
+            <a:ext cx="1083800" cy="697793"/>
+          </a:xfrm>
+          <a:prstGeom prst="rect">
+            <a:avLst/>
+          </a:prstGeom>
+          <a:solidFill>
+            <a:srgbClr val="165875"/>
+          </a:solidFill>
+        </p:spPr>
+        <p:style>
+          <a:lnRef idx="2">
+            <a:schemeClr val="accent1">
+              <a:shade val="15000"/>
+            </a:schemeClr>
+          </a:lnRef>
+          <a:fillRef idx="1">
+            <a:schemeClr val="accent1"/>
+          </a:fillRef>
+          <a:effectRef idx="0">
+            <a:schemeClr val="accent1"/>
+          </a:effectRef>
+          <a:fontRef idx="minor">
+            <a:schemeClr val="lt1"/>
+          </a:fontRef>
+        </p:style>
+        <p:txBody>
+          <a:bodyPr rtlCol="0" anchor="ctr"/>
+          <a:lstStyle/>
+          <a:p>
+            <a:pPr algn="ctr"/>
+            <a:r>
+              <a:rPr lang="en-US" dirty="0"/>
+              <a:t>165875</a:t>
+            </a:r>
+          </a:p>
+        </p:txBody>
+      </p:sp>
+      <p:sp>
+        <p:nvSpPr>
+          <p:cNvPr id="31" name="Rectangle 30">
+            <a:extLst>
+              <a:ext uri="{FF2B5EF4-FFF2-40B4-BE49-F238E27FC236}">
+                <a16:creationId xmlns:a16="http://schemas.microsoft.com/office/drawing/2014/main" id="{E5962616-EABC-B026-FB43-68BCC3B9C5C0}"/>
+              </a:ext>
+            </a:extLst>
+          </p:cNvPr>
+          <p:cNvSpPr/>
+          <p:nvPr/>
+        </p:nvSpPr>
+        <p:spPr>
+          <a:xfrm>
+            <a:off x="10412849" y="5532908"/>
+            <a:ext cx="1083800" cy="697793"/>
+          </a:xfrm>
+          <a:prstGeom prst="rect">
+            <a:avLst/>
+          </a:prstGeom>
+          <a:solidFill>
+            <a:srgbClr val="A15949"/>
+          </a:solidFill>
+        </p:spPr>
+        <p:style>
+          <a:lnRef idx="2">
+            <a:schemeClr val="accent1">
+              <a:shade val="15000"/>
+            </a:schemeClr>
+          </a:lnRef>
+          <a:fillRef idx="1">
+            <a:schemeClr val="accent1"/>
+          </a:fillRef>
+          <a:effectRef idx="0">
+            <a:schemeClr val="accent1"/>
+          </a:effectRef>
+          <a:fontRef idx="minor">
+            <a:schemeClr val="lt1"/>
+          </a:fontRef>
+        </p:style>
+        <p:txBody>
+          <a:bodyPr rtlCol="0" anchor="ctr"/>
+          <a:lstStyle/>
+          <a:p>
+            <a:pPr algn="ctr"/>
+            <a:r>
+              <a:rPr lang="en-US" dirty="0"/>
+              <a:t>A15949</a:t>
+            </a:r>
+          </a:p>
+        </p:txBody>
+      </p:sp>
+      <p:pic>
+        <p:nvPicPr>
+          <p:cNvPr id="33" name="Picture 32" descr="A close up of a sign&#10;&#10;AI-generated content may be incorrect.">
+            <a:extLst>
+              <a:ext uri="{FF2B5EF4-FFF2-40B4-BE49-F238E27FC236}">
+                <a16:creationId xmlns:a16="http://schemas.microsoft.com/office/drawing/2014/main" id="{11FFC7B0-191E-F26D-140D-0A17CCC94590}"/>
+              </a:ext>
+            </a:extLst>
+          </p:cNvPr>
+          <p:cNvPicPr>
+            <a:picLocks noChangeAspect="1"/>
+          </p:cNvPicPr>
+          <p:nvPr/>
+        </p:nvPicPr>
+        <p:blipFill>
+          <a:blip r:embed="rId6"/>
+          <a:stretch>
+            <a:fillRect/>
+          </a:stretch>
+        </p:blipFill>
+        <p:spPr>
+          <a:xfrm>
+            <a:off x="396632" y="5881804"/>
+            <a:ext cx="3657600" cy="1689100"/>
+          </a:xfrm>
+          <a:prstGeom prst="rect">
+            <a:avLst/>
+          </a:prstGeom>
+        </p:spPr>
+      </p:pic>
+      <p:sp>
+        <p:nvSpPr>
+          <p:cNvPr id="34" name="Rectangle 33">
+            <a:extLst>
+              <a:ext uri="{FF2B5EF4-FFF2-40B4-BE49-F238E27FC236}">
+                <a16:creationId xmlns:a16="http://schemas.microsoft.com/office/drawing/2014/main" id="{4B729BC4-D049-E4A0-552C-42EE4ED25528}"/>
+              </a:ext>
+            </a:extLst>
+          </p:cNvPr>
+          <p:cNvSpPr/>
+          <p:nvPr/>
+        </p:nvSpPr>
+        <p:spPr>
+          <a:xfrm>
+            <a:off x="4463427" y="6531189"/>
+            <a:ext cx="1083800" cy="697793"/>
+          </a:xfrm>
+          <a:prstGeom prst="rect">
+            <a:avLst/>
+          </a:prstGeom>
+          <a:solidFill>
+            <a:srgbClr val="8E4A52"/>
+          </a:solidFill>
+        </p:spPr>
+        <p:style>
+          <a:lnRef idx="2">
+            <a:schemeClr val="accent1">
+              <a:shade val="15000"/>
+            </a:schemeClr>
+          </a:lnRef>
+          <a:fillRef idx="1">
+            <a:schemeClr val="accent1"/>
+          </a:fillRef>
+          <a:effectRef idx="0">
+            <a:schemeClr val="accent1"/>
+          </a:effectRef>
+          <a:fontRef idx="minor">
+            <a:schemeClr val="lt1"/>
+          </a:fontRef>
+        </p:style>
+        <p:txBody>
+          <a:bodyPr rtlCol="0" anchor="ctr"/>
+          <a:lstStyle/>
+          <a:p>
+            <a:pPr algn="ctr"/>
+            <a:r>
+              <a:rPr lang="en-US" dirty="0"/>
+              <a:t>854E53</a:t>
+            </a:r>
+          </a:p>
+        </p:txBody>
+      </p:sp>
+    </p:spTree>
+    <p:extLst>
+      <p:ext uri="{BB962C8B-B14F-4D97-AF65-F5344CB8AC3E}">
+        <p14:creationId xmlns:p14="http://schemas.microsoft.com/office/powerpoint/2010/main" val="193331974"/>
+      </p:ext>
+    </p:extLst>
+  </p:cSld>
+  <p:clrMapOvr>
+    <a:masterClrMapping/>
+  </p:clrMapOvr>
+</p:sld>
+</file>
+
 <file path=ppt/slides/slide2.xml><?xml version="1.0" encoding="utf-8"?>
 <p:sld xmlns:a="http://schemas.openxmlformats.org/drawingml/2006/main" xmlns:r="http://schemas.openxmlformats.org/officeDocument/2006/relationships" xmlns:p="http://schemas.openxmlformats.org/presentationml/2006/main">
   <p:cSld>
@@ -4472,6 +5718,641 @@
 <file path=ppt/slides/slide4.xml><?xml version="1.0" encoding="utf-8"?>
 <p:sld xmlns:a="http://schemas.openxmlformats.org/drawingml/2006/main" xmlns:r="http://schemas.openxmlformats.org/officeDocument/2006/relationships" xmlns:p="http://schemas.openxmlformats.org/presentationml/2006/main">
   <p:cSld>
+    <p:spTree>
+      <p:nvGrpSpPr>
+        <p:cNvPr id="1" name="">
+          <a:extLst>
+            <a:ext uri="{FF2B5EF4-FFF2-40B4-BE49-F238E27FC236}">
+              <a16:creationId xmlns:a16="http://schemas.microsoft.com/office/drawing/2014/main" id="{772587CF-3659-8A6A-EB44-D8817F60EAB9}"/>
+            </a:ext>
+          </a:extLst>
+        </p:cNvPr>
+        <p:cNvGrpSpPr/>
+        <p:nvPr/>
+      </p:nvGrpSpPr>
+      <p:grpSpPr>
+        <a:xfrm>
+          <a:off x="0" y="0"/>
+          <a:ext cx="0" cy="0"/>
+          <a:chOff x="0" y="0"/>
+          <a:chExt cx="0" cy="0"/>
+        </a:xfrm>
+      </p:grpSpPr>
+      <p:sp>
+        <p:nvSpPr>
+          <p:cNvPr id="2" name="Rectangle 1">
+            <a:extLst>
+              <a:ext uri="{FF2B5EF4-FFF2-40B4-BE49-F238E27FC236}">
+                <a16:creationId xmlns:a16="http://schemas.microsoft.com/office/drawing/2014/main" id="{83C6F7FF-F1DC-376A-D845-F2CC7C06E5D1}"/>
+              </a:ext>
+            </a:extLst>
+          </p:cNvPr>
+          <p:cNvSpPr/>
+          <p:nvPr/>
+        </p:nvSpPr>
+        <p:spPr>
+          <a:xfrm>
+            <a:off x="111961" y="195331"/>
+            <a:ext cx="11977257" cy="4823236"/>
+          </a:xfrm>
+          <a:prstGeom prst="rect">
+            <a:avLst/>
+          </a:prstGeom>
+          <a:solidFill>
+            <a:srgbClr val="00B050"/>
+          </a:solidFill>
+        </p:spPr>
+        <p:style>
+          <a:lnRef idx="2">
+            <a:schemeClr val="accent1">
+              <a:shade val="15000"/>
+            </a:schemeClr>
+          </a:lnRef>
+          <a:fillRef idx="1">
+            <a:schemeClr val="accent1"/>
+          </a:fillRef>
+          <a:effectRef idx="0">
+            <a:schemeClr val="accent1"/>
+          </a:effectRef>
+          <a:fontRef idx="minor">
+            <a:schemeClr val="lt1"/>
+          </a:fontRef>
+        </p:style>
+        <p:txBody>
+          <a:bodyPr rtlCol="0" anchor="ctr"/>
+          <a:lstStyle/>
+          <a:p>
+            <a:pPr algn="ctr"/>
+            <a:endParaRPr lang="en-US"/>
+          </a:p>
+        </p:txBody>
+      </p:sp>
+      <p:sp>
+        <p:nvSpPr>
+          <p:cNvPr id="3" name="Rectangle 2">
+            <a:extLst>
+              <a:ext uri="{FF2B5EF4-FFF2-40B4-BE49-F238E27FC236}">
+                <a16:creationId xmlns:a16="http://schemas.microsoft.com/office/drawing/2014/main" id="{4CDB1554-EF32-20B8-0EE3-A305089180A3}"/>
+              </a:ext>
+            </a:extLst>
+          </p:cNvPr>
+          <p:cNvSpPr/>
+          <p:nvPr/>
+        </p:nvSpPr>
+        <p:spPr>
+          <a:xfrm>
+            <a:off x="457200" y="935665"/>
+            <a:ext cx="11632018" cy="2945219"/>
+          </a:xfrm>
+          <a:prstGeom prst="rect">
+            <a:avLst/>
+          </a:prstGeom>
+          <a:solidFill>
+            <a:schemeClr val="bg1"/>
+          </a:solidFill>
+          <a:ln>
+            <a:noFill/>
+          </a:ln>
+        </p:spPr>
+        <p:style>
+          <a:lnRef idx="2">
+            <a:schemeClr val="accent1">
+              <a:shade val="15000"/>
+            </a:schemeClr>
+          </a:lnRef>
+          <a:fillRef idx="1">
+            <a:schemeClr val="accent1"/>
+          </a:fillRef>
+          <a:effectRef idx="0">
+            <a:schemeClr val="accent1"/>
+          </a:effectRef>
+          <a:fontRef idx="minor">
+            <a:schemeClr val="lt1"/>
+          </a:fontRef>
+        </p:style>
+        <p:txBody>
+          <a:bodyPr rtlCol="0" anchor="ctr"/>
+          <a:lstStyle/>
+          <a:p>
+            <a:pPr algn="ctr"/>
+            <a:endParaRPr lang="en-US"/>
+          </a:p>
+        </p:txBody>
+      </p:sp>
+      <p:pic>
+        <p:nvPicPr>
+          <p:cNvPr id="15" name="Picture 14">
+            <a:extLst>
+              <a:ext uri="{FF2B5EF4-FFF2-40B4-BE49-F238E27FC236}">
+                <a16:creationId xmlns:a16="http://schemas.microsoft.com/office/drawing/2014/main" id="{D907C32C-5DA3-5A36-5D25-DF178CB7FC6F}"/>
+              </a:ext>
+            </a:extLst>
+          </p:cNvPr>
+          <p:cNvPicPr>
+            <a:picLocks noChangeAspect="1"/>
+          </p:cNvPicPr>
+          <p:nvPr/>
+        </p:nvPicPr>
+        <p:blipFill>
+          <a:blip r:embed="rId2"/>
+          <a:stretch>
+            <a:fillRect/>
+          </a:stretch>
+        </p:blipFill>
+        <p:spPr>
+          <a:xfrm>
+            <a:off x="1167789" y="1256294"/>
+            <a:ext cx="1996540" cy="2172706"/>
+          </a:xfrm>
+          <a:prstGeom prst="rect">
+            <a:avLst/>
+          </a:prstGeom>
+        </p:spPr>
+      </p:pic>
+      <p:sp>
+        <p:nvSpPr>
+          <p:cNvPr id="16" name="TextBox 15">
+            <a:extLst>
+              <a:ext uri="{FF2B5EF4-FFF2-40B4-BE49-F238E27FC236}">
+                <a16:creationId xmlns:a16="http://schemas.microsoft.com/office/drawing/2014/main" id="{6961E527-BD65-C8A3-58D2-F509801E7D16}"/>
+              </a:ext>
+            </a:extLst>
+          </p:cNvPr>
+          <p:cNvSpPr txBox="1"/>
+          <p:nvPr/>
+        </p:nvSpPr>
+        <p:spPr>
+          <a:xfrm>
+            <a:off x="3323082" y="1551684"/>
+            <a:ext cx="8141909" cy="1246495"/>
+          </a:xfrm>
+          <a:prstGeom prst="rect">
+            <a:avLst/>
+          </a:prstGeom>
+          <a:noFill/>
+        </p:spPr>
+        <p:txBody>
+          <a:bodyPr wrap="none" rtlCol="0">
+            <a:spAutoFit/>
+          </a:bodyPr>
+          <a:lstStyle/>
+          <a:p>
+            <a:r>
+              <a:rPr lang="en-US" sz="7500" b="1" dirty="0">
+                <a:solidFill>
+                  <a:srgbClr val="545455"/>
+                </a:solidFill>
+                <a:latin typeface="SF Orson Casual Medium" pitchFamily="2" charset="0"/>
+              </a:rPr>
+              <a:t>RCM Cooperative</a:t>
+            </a:r>
+          </a:p>
+        </p:txBody>
+      </p:sp>
+      <p:sp>
+        <p:nvSpPr>
+          <p:cNvPr id="17" name="TextBox 16">
+            <a:extLst>
+              <a:ext uri="{FF2B5EF4-FFF2-40B4-BE49-F238E27FC236}">
+                <a16:creationId xmlns:a16="http://schemas.microsoft.com/office/drawing/2014/main" id="{793AA4A8-A397-9D56-B9B4-0BCBF9C858CD}"/>
+              </a:ext>
+            </a:extLst>
+          </p:cNvPr>
+          <p:cNvSpPr txBox="1"/>
+          <p:nvPr/>
+        </p:nvSpPr>
+        <p:spPr>
+          <a:xfrm>
+            <a:off x="3323082" y="2798179"/>
+            <a:ext cx="7858241" cy="500778"/>
+          </a:xfrm>
+          <a:prstGeom prst="rect">
+            <a:avLst/>
+          </a:prstGeom>
+          <a:noFill/>
+        </p:spPr>
+        <p:txBody>
+          <a:bodyPr wrap="none" rtlCol="0">
+            <a:spAutoFit/>
+          </a:bodyPr>
+          <a:lstStyle/>
+          <a:p>
+            <a:r>
+              <a:rPr lang="en-US" sz="2600" dirty="0">
+                <a:solidFill>
+                  <a:srgbClr val="545455"/>
+                </a:solidFill>
+                <a:latin typeface="Montserrat" panose="02000505000000020004" pitchFamily="2" charset="77"/>
+              </a:rPr>
+              <a:t>equitable research community management</a:t>
+            </a:r>
+          </a:p>
+        </p:txBody>
+      </p:sp>
+    </p:spTree>
+    <p:extLst>
+      <p:ext uri="{BB962C8B-B14F-4D97-AF65-F5344CB8AC3E}">
+        <p14:creationId xmlns:p14="http://schemas.microsoft.com/office/powerpoint/2010/main" val="326029368"/>
+      </p:ext>
+    </p:extLst>
+  </p:cSld>
+  <p:clrMapOvr>
+    <a:masterClrMapping/>
+  </p:clrMapOvr>
+</p:sld>
+</file>
+
+<file path=ppt/slides/slide5.xml><?xml version="1.0" encoding="utf-8"?>
+<p:sld xmlns:a="http://schemas.openxmlformats.org/drawingml/2006/main" xmlns:r="http://schemas.openxmlformats.org/officeDocument/2006/relationships" xmlns:p="http://schemas.openxmlformats.org/presentationml/2006/main">
+  <p:cSld>
+    <p:spTree>
+      <p:nvGrpSpPr>
+        <p:cNvPr id="1" name="">
+          <a:extLst>
+            <a:ext uri="{FF2B5EF4-FFF2-40B4-BE49-F238E27FC236}">
+              <a16:creationId xmlns:a16="http://schemas.microsoft.com/office/drawing/2014/main" id="{152B4F87-B8C3-BE5A-0F8E-788D3C849320}"/>
+            </a:ext>
+          </a:extLst>
+        </p:cNvPr>
+        <p:cNvGrpSpPr/>
+        <p:nvPr/>
+      </p:nvGrpSpPr>
+      <p:grpSpPr>
+        <a:xfrm>
+          <a:off x="0" y="0"/>
+          <a:ext cx="0" cy="0"/>
+          <a:chOff x="0" y="0"/>
+          <a:chExt cx="0" cy="0"/>
+        </a:xfrm>
+      </p:grpSpPr>
+      <p:sp>
+        <p:nvSpPr>
+          <p:cNvPr id="2" name="Rectangle 1">
+            <a:extLst>
+              <a:ext uri="{FF2B5EF4-FFF2-40B4-BE49-F238E27FC236}">
+                <a16:creationId xmlns:a16="http://schemas.microsoft.com/office/drawing/2014/main" id="{81039FAB-F506-3F4F-E805-722D206CAF7A}"/>
+              </a:ext>
+            </a:extLst>
+          </p:cNvPr>
+          <p:cNvSpPr/>
+          <p:nvPr/>
+        </p:nvSpPr>
+        <p:spPr>
+          <a:xfrm>
+            <a:off x="484102" y="288001"/>
+            <a:ext cx="11243610" cy="4294632"/>
+          </a:xfrm>
+          <a:prstGeom prst="rect">
+            <a:avLst/>
+          </a:prstGeom>
+          <a:solidFill>
+            <a:srgbClr val="00B050"/>
+          </a:solidFill>
+        </p:spPr>
+        <p:style>
+          <a:lnRef idx="2">
+            <a:schemeClr val="accent1">
+              <a:shade val="15000"/>
+            </a:schemeClr>
+          </a:lnRef>
+          <a:fillRef idx="1">
+            <a:schemeClr val="accent1"/>
+          </a:fillRef>
+          <a:effectRef idx="0">
+            <a:schemeClr val="accent1"/>
+          </a:effectRef>
+          <a:fontRef idx="minor">
+            <a:schemeClr val="lt1"/>
+          </a:fontRef>
+        </p:style>
+        <p:txBody>
+          <a:bodyPr rtlCol="0" anchor="ctr"/>
+          <a:lstStyle/>
+          <a:p>
+            <a:pPr algn="ctr"/>
+            <a:endParaRPr lang="en-US"/>
+          </a:p>
+        </p:txBody>
+      </p:sp>
+      <p:pic>
+        <p:nvPicPr>
+          <p:cNvPr id="15" name="Picture 14">
+            <a:extLst>
+              <a:ext uri="{FF2B5EF4-FFF2-40B4-BE49-F238E27FC236}">
+                <a16:creationId xmlns:a16="http://schemas.microsoft.com/office/drawing/2014/main" id="{517B5364-86DB-3267-103C-89450A4F6543}"/>
+              </a:ext>
+            </a:extLst>
+          </p:cNvPr>
+          <p:cNvPicPr>
+            <a:picLocks noChangeAspect="1"/>
+          </p:cNvPicPr>
+          <p:nvPr/>
+        </p:nvPicPr>
+        <p:blipFill>
+          <a:blip r:embed="rId2">
+            <a:biLevel thresh="75000"/>
+          </a:blip>
+          <a:stretch>
+            <a:fillRect/>
+          </a:stretch>
+        </p:blipFill>
+        <p:spPr>
+          <a:xfrm>
+            <a:off x="1167789" y="1256294"/>
+            <a:ext cx="1996540" cy="2172706"/>
+          </a:xfrm>
+          <a:prstGeom prst="rect">
+            <a:avLst/>
+          </a:prstGeom>
+        </p:spPr>
+      </p:pic>
+      <p:sp>
+        <p:nvSpPr>
+          <p:cNvPr id="16" name="TextBox 15">
+            <a:extLst>
+              <a:ext uri="{FF2B5EF4-FFF2-40B4-BE49-F238E27FC236}">
+                <a16:creationId xmlns:a16="http://schemas.microsoft.com/office/drawing/2014/main" id="{08862149-1985-77ED-FEA0-6FAE0A4584A8}"/>
+              </a:ext>
+            </a:extLst>
+          </p:cNvPr>
+          <p:cNvSpPr txBox="1"/>
+          <p:nvPr/>
+        </p:nvSpPr>
+        <p:spPr>
+          <a:xfrm>
+            <a:off x="3323082" y="1551684"/>
+            <a:ext cx="8141909" cy="1246495"/>
+          </a:xfrm>
+          <a:prstGeom prst="rect">
+            <a:avLst/>
+          </a:prstGeom>
+          <a:noFill/>
+        </p:spPr>
+        <p:txBody>
+          <a:bodyPr wrap="none" rtlCol="0">
+            <a:spAutoFit/>
+          </a:bodyPr>
+          <a:lstStyle/>
+          <a:p>
+            <a:r>
+              <a:rPr lang="en-US" sz="7500" b="1" dirty="0">
+                <a:latin typeface="SF Orson Casual Medium" pitchFamily="2" charset="0"/>
+              </a:rPr>
+              <a:t>RCM Cooperative</a:t>
+            </a:r>
+          </a:p>
+        </p:txBody>
+      </p:sp>
+      <p:sp>
+        <p:nvSpPr>
+          <p:cNvPr id="17" name="TextBox 16">
+            <a:extLst>
+              <a:ext uri="{FF2B5EF4-FFF2-40B4-BE49-F238E27FC236}">
+                <a16:creationId xmlns:a16="http://schemas.microsoft.com/office/drawing/2014/main" id="{732FEAEB-7BE7-94FA-93E0-23EE9A4B669D}"/>
+              </a:ext>
+            </a:extLst>
+          </p:cNvPr>
+          <p:cNvSpPr txBox="1"/>
+          <p:nvPr/>
+        </p:nvSpPr>
+        <p:spPr>
+          <a:xfrm>
+            <a:off x="3323082" y="2798179"/>
+            <a:ext cx="7858241" cy="500778"/>
+          </a:xfrm>
+          <a:prstGeom prst="rect">
+            <a:avLst/>
+          </a:prstGeom>
+          <a:noFill/>
+        </p:spPr>
+        <p:txBody>
+          <a:bodyPr wrap="none" rtlCol="0">
+            <a:spAutoFit/>
+          </a:bodyPr>
+          <a:lstStyle/>
+          <a:p>
+            <a:r>
+              <a:rPr lang="en-US" sz="2600" dirty="0">
+                <a:latin typeface="Montserrat" panose="02000505000000020004" pitchFamily="2" charset="77"/>
+              </a:rPr>
+              <a:t>equitable research community management</a:t>
+            </a:r>
+          </a:p>
+        </p:txBody>
+      </p:sp>
+    </p:spTree>
+    <p:extLst>
+      <p:ext uri="{BB962C8B-B14F-4D97-AF65-F5344CB8AC3E}">
+        <p14:creationId xmlns:p14="http://schemas.microsoft.com/office/powerpoint/2010/main" val="3430576674"/>
+      </p:ext>
+    </p:extLst>
+  </p:cSld>
+  <p:clrMapOvr>
+    <a:masterClrMapping/>
+  </p:clrMapOvr>
+</p:sld>
+</file>
+
+<file path=ppt/slides/slide6.xml><?xml version="1.0" encoding="utf-8"?>
+<p:sld xmlns:a="http://schemas.openxmlformats.org/drawingml/2006/main" xmlns:r="http://schemas.openxmlformats.org/officeDocument/2006/relationships" xmlns:p="http://schemas.openxmlformats.org/presentationml/2006/main">
+  <p:cSld>
+    <p:spTree>
+      <p:nvGrpSpPr>
+        <p:cNvPr id="1" name="">
+          <a:extLst>
+            <a:ext uri="{FF2B5EF4-FFF2-40B4-BE49-F238E27FC236}">
+              <a16:creationId xmlns:a16="http://schemas.microsoft.com/office/drawing/2014/main" id="{2BA07ED8-D8C4-4236-4AF5-D7F87A2D2423}"/>
+            </a:ext>
+          </a:extLst>
+        </p:cNvPr>
+        <p:cNvGrpSpPr/>
+        <p:nvPr/>
+      </p:nvGrpSpPr>
+      <p:grpSpPr>
+        <a:xfrm>
+          <a:off x="0" y="0"/>
+          <a:ext cx="0" cy="0"/>
+          <a:chOff x="0" y="0"/>
+          <a:chExt cx="0" cy="0"/>
+        </a:xfrm>
+      </p:grpSpPr>
+      <p:sp>
+        <p:nvSpPr>
+          <p:cNvPr id="2" name="Rectangle 1">
+            <a:extLst>
+              <a:ext uri="{FF2B5EF4-FFF2-40B4-BE49-F238E27FC236}">
+                <a16:creationId xmlns:a16="http://schemas.microsoft.com/office/drawing/2014/main" id="{BFBBAB72-32E1-27AC-AE36-EAEEB633416C}"/>
+              </a:ext>
+            </a:extLst>
+          </p:cNvPr>
+          <p:cNvSpPr/>
+          <p:nvPr/>
+        </p:nvSpPr>
+        <p:spPr>
+          <a:xfrm>
+            <a:off x="484102" y="288001"/>
+            <a:ext cx="11243610" cy="4294632"/>
+          </a:xfrm>
+          <a:prstGeom prst="rect">
+            <a:avLst/>
+          </a:prstGeom>
+          <a:solidFill>
+            <a:srgbClr val="00B050"/>
+          </a:solidFill>
+        </p:spPr>
+        <p:style>
+          <a:lnRef idx="2">
+            <a:schemeClr val="accent1">
+              <a:shade val="15000"/>
+            </a:schemeClr>
+          </a:lnRef>
+          <a:fillRef idx="1">
+            <a:schemeClr val="accent1"/>
+          </a:fillRef>
+          <a:effectRef idx="0">
+            <a:schemeClr val="accent1"/>
+          </a:effectRef>
+          <a:fontRef idx="minor">
+            <a:schemeClr val="lt1"/>
+          </a:fontRef>
+        </p:style>
+        <p:txBody>
+          <a:bodyPr rtlCol="0" anchor="ctr"/>
+          <a:lstStyle/>
+          <a:p>
+            <a:pPr algn="ctr"/>
+            <a:endParaRPr lang="en-US"/>
+          </a:p>
+        </p:txBody>
+      </p:sp>
+      <p:pic>
+        <p:nvPicPr>
+          <p:cNvPr id="15" name="Picture 14">
+            <a:extLst>
+              <a:ext uri="{FF2B5EF4-FFF2-40B4-BE49-F238E27FC236}">
+                <a16:creationId xmlns:a16="http://schemas.microsoft.com/office/drawing/2014/main" id="{43B41171-202C-D047-3CE4-B100A3E1FC1B}"/>
+              </a:ext>
+            </a:extLst>
+          </p:cNvPr>
+          <p:cNvPicPr>
+            <a:picLocks noChangeAspect="1"/>
+          </p:cNvPicPr>
+          <p:nvPr/>
+        </p:nvPicPr>
+        <p:blipFill>
+          <a:blip r:embed="rId2">
+            <a:biLevel thresh="25000"/>
+          </a:blip>
+          <a:stretch>
+            <a:fillRect/>
+          </a:stretch>
+        </p:blipFill>
+        <p:spPr>
+          <a:xfrm>
+            <a:off x="1167789" y="1256294"/>
+            <a:ext cx="1996540" cy="2172706"/>
+          </a:xfrm>
+          <a:prstGeom prst="rect">
+            <a:avLst/>
+          </a:prstGeom>
+        </p:spPr>
+      </p:pic>
+      <p:sp>
+        <p:nvSpPr>
+          <p:cNvPr id="16" name="TextBox 15">
+            <a:extLst>
+              <a:ext uri="{FF2B5EF4-FFF2-40B4-BE49-F238E27FC236}">
+                <a16:creationId xmlns:a16="http://schemas.microsoft.com/office/drawing/2014/main" id="{72182FE0-E75A-A3B7-89F6-567FFA88B449}"/>
+              </a:ext>
+            </a:extLst>
+          </p:cNvPr>
+          <p:cNvSpPr txBox="1"/>
+          <p:nvPr/>
+        </p:nvSpPr>
+        <p:spPr>
+          <a:xfrm>
+            <a:off x="3323082" y="1551684"/>
+            <a:ext cx="8141909" cy="1246495"/>
+          </a:xfrm>
+          <a:prstGeom prst="rect">
+            <a:avLst/>
+          </a:prstGeom>
+          <a:noFill/>
+        </p:spPr>
+        <p:txBody>
+          <a:bodyPr wrap="none" rtlCol="0">
+            <a:spAutoFit/>
+          </a:bodyPr>
+          <a:lstStyle/>
+          <a:p>
+            <a:r>
+              <a:rPr lang="en-US" sz="7500" b="1" dirty="0">
+                <a:solidFill>
+                  <a:schemeClr val="bg1"/>
+                </a:solidFill>
+                <a:latin typeface="SF Orson Casual Medium" pitchFamily="2" charset="0"/>
+              </a:rPr>
+              <a:t>RCM Cooperative</a:t>
+            </a:r>
+          </a:p>
+        </p:txBody>
+      </p:sp>
+      <p:sp>
+        <p:nvSpPr>
+          <p:cNvPr id="17" name="TextBox 16">
+            <a:extLst>
+              <a:ext uri="{FF2B5EF4-FFF2-40B4-BE49-F238E27FC236}">
+                <a16:creationId xmlns:a16="http://schemas.microsoft.com/office/drawing/2014/main" id="{86E711D1-89DE-5B42-EEBA-6DD6D6199BDF}"/>
+              </a:ext>
+            </a:extLst>
+          </p:cNvPr>
+          <p:cNvSpPr txBox="1"/>
+          <p:nvPr/>
+        </p:nvSpPr>
+        <p:spPr>
+          <a:xfrm>
+            <a:off x="3323082" y="2798179"/>
+            <a:ext cx="7858241" cy="500778"/>
+          </a:xfrm>
+          <a:prstGeom prst="rect">
+            <a:avLst/>
+          </a:prstGeom>
+          <a:noFill/>
+        </p:spPr>
+        <p:txBody>
+          <a:bodyPr wrap="none" rtlCol="0">
+            <a:spAutoFit/>
+          </a:bodyPr>
+          <a:lstStyle/>
+          <a:p>
+            <a:r>
+              <a:rPr lang="en-US" sz="2600" dirty="0">
+                <a:solidFill>
+                  <a:schemeClr val="bg1"/>
+                </a:solidFill>
+                <a:latin typeface="Montserrat" panose="02000505000000020004" pitchFamily="2" charset="77"/>
+              </a:rPr>
+              <a:t>equitable research community management</a:t>
+            </a:r>
+          </a:p>
+        </p:txBody>
+      </p:sp>
+    </p:spTree>
+    <p:extLst>
+      <p:ext uri="{BB962C8B-B14F-4D97-AF65-F5344CB8AC3E}">
+        <p14:creationId xmlns:p14="http://schemas.microsoft.com/office/powerpoint/2010/main" val="3500286002"/>
+      </p:ext>
+    </p:extLst>
+  </p:cSld>
+  <p:clrMapOvr>
+    <a:masterClrMapping/>
+  </p:clrMapOvr>
+</p:sld>
+</file>
+
+<file path=ppt/slides/slide7.xml><?xml version="1.0" encoding="utf-8"?>
+<p:sld xmlns:a="http://schemas.openxmlformats.org/drawingml/2006/main" xmlns:r="http://schemas.openxmlformats.org/officeDocument/2006/relationships" xmlns:p="http://schemas.openxmlformats.org/presentationml/2006/main">
+  <p:cSld>
     <p:bg>
       <p:bgPr>
         <a:solidFill>
@@ -4646,7 +6527,7 @@
 </p:sld>
 </file>
 
-<file path=ppt/slides/slide5.xml><?xml version="1.0" encoding="utf-8"?>
+<file path=ppt/slides/slide8.xml><?xml version="1.0" encoding="utf-8"?>
 <p:sld xmlns:a="http://schemas.openxmlformats.org/drawingml/2006/main" xmlns:r="http://schemas.openxmlformats.org/officeDocument/2006/relationships" xmlns:p="http://schemas.openxmlformats.org/presentationml/2006/main">
   <p:cSld>
     <p:bg>
@@ -4827,7 +6708,7 @@
 </p:sld>
 </file>
 
-<file path=ppt/slides/slide6.xml><?xml version="1.0" encoding="utf-8"?>
+<file path=ppt/slides/slide9.xml><?xml version="1.0" encoding="utf-8"?>
 <p:sld xmlns:a="http://schemas.openxmlformats.org/drawingml/2006/main" xmlns:r="http://schemas.openxmlformats.org/officeDocument/2006/relationships" xmlns:p="http://schemas.openxmlformats.org/presentationml/2006/main">
   <p:cSld>
     <p:spTree>
@@ -4966,1156 +6847,6 @@
     <p:extLst>
       <p:ext uri="{BB962C8B-B14F-4D97-AF65-F5344CB8AC3E}">
         <p14:creationId xmlns:p14="http://schemas.microsoft.com/office/powerpoint/2010/main" val="991837179"/>
-      </p:ext>
-    </p:extLst>
-  </p:cSld>
-  <p:clrMapOvr>
-    <a:masterClrMapping/>
-  </p:clrMapOvr>
-</p:sld>
-</file>
-
-<file path=ppt/slides/slide7.xml><?xml version="1.0" encoding="utf-8"?>
-<p:sld xmlns:a="http://schemas.openxmlformats.org/drawingml/2006/main" xmlns:r="http://schemas.openxmlformats.org/officeDocument/2006/relationships" xmlns:p="http://schemas.openxmlformats.org/presentationml/2006/main">
-  <p:cSld>
-    <p:spTree>
-      <p:nvGrpSpPr>
-        <p:cNvPr id="1" name="">
-          <a:extLst>
-            <a:ext uri="{FF2B5EF4-FFF2-40B4-BE49-F238E27FC236}">
-              <a16:creationId xmlns:a16="http://schemas.microsoft.com/office/drawing/2014/main" id="{E5D8A59F-3D34-86C7-6062-1BFC2F8FF374}"/>
-            </a:ext>
-          </a:extLst>
-        </p:cNvPr>
-        <p:cNvGrpSpPr/>
-        <p:nvPr/>
-      </p:nvGrpSpPr>
-      <p:grpSpPr>
-        <a:xfrm>
-          <a:off x="0" y="0"/>
-          <a:ext cx="0" cy="0"/>
-          <a:chOff x="0" y="0"/>
-          <a:chExt cx="0" cy="0"/>
-        </a:xfrm>
-      </p:grpSpPr>
-      <p:sp>
-        <p:nvSpPr>
-          <p:cNvPr id="3" name="Rectangle 2">
-            <a:extLst>
-              <a:ext uri="{FF2B5EF4-FFF2-40B4-BE49-F238E27FC236}">
-                <a16:creationId xmlns:a16="http://schemas.microsoft.com/office/drawing/2014/main" id="{32B25E25-AE7F-86B3-86B6-FAFF2B83B1DC}"/>
-              </a:ext>
-            </a:extLst>
-          </p:cNvPr>
-          <p:cNvSpPr/>
-          <p:nvPr/>
-        </p:nvSpPr>
-        <p:spPr>
-          <a:xfrm>
-            <a:off x="2732503" y="957244"/>
-            <a:ext cx="6224530" cy="4109291"/>
-          </a:xfrm>
-          <a:prstGeom prst="rect">
-            <a:avLst/>
-          </a:prstGeom>
-          <a:solidFill>
-            <a:srgbClr val="00B050"/>
-          </a:solidFill>
-        </p:spPr>
-        <p:style>
-          <a:lnRef idx="2">
-            <a:schemeClr val="accent1">
-              <a:shade val="15000"/>
-            </a:schemeClr>
-          </a:lnRef>
-          <a:fillRef idx="1">
-            <a:schemeClr val="accent1"/>
-          </a:fillRef>
-          <a:effectRef idx="0">
-            <a:schemeClr val="accent1"/>
-          </a:effectRef>
-          <a:fontRef idx="minor">
-            <a:schemeClr val="lt1"/>
-          </a:fontRef>
-        </p:style>
-        <p:txBody>
-          <a:bodyPr rtlCol="0" anchor="ctr"/>
-          <a:lstStyle/>
-          <a:p>
-            <a:pPr algn="ctr"/>
-            <a:endParaRPr lang="en-US"/>
-          </a:p>
-        </p:txBody>
-      </p:sp>
-      <p:pic>
-        <p:nvPicPr>
-          <p:cNvPr id="15" name="Picture 14">
-            <a:extLst>
-              <a:ext uri="{FF2B5EF4-FFF2-40B4-BE49-F238E27FC236}">
-                <a16:creationId xmlns:a16="http://schemas.microsoft.com/office/drawing/2014/main" id="{C3080791-AC69-70D5-79AF-E34FF3690D4A}"/>
-              </a:ext>
-            </a:extLst>
-          </p:cNvPr>
-          <p:cNvPicPr>
-            <a:picLocks noChangeAspect="1"/>
-          </p:cNvPicPr>
-          <p:nvPr/>
-        </p:nvPicPr>
-        <p:blipFill>
-          <a:blip r:embed="rId2">
-            <a:biLevel thresh="25000"/>
-          </a:blip>
-          <a:stretch>
-            <a:fillRect/>
-          </a:stretch>
-        </p:blipFill>
-        <p:spPr>
-          <a:xfrm>
-            <a:off x="3327465" y="1947221"/>
-            <a:ext cx="1956690" cy="2129339"/>
-          </a:xfrm>
-          <a:prstGeom prst="rect">
-            <a:avLst/>
-          </a:prstGeom>
-        </p:spPr>
-      </p:pic>
-      <p:sp>
-        <p:nvSpPr>
-          <p:cNvPr id="16" name="TextBox 15">
-            <a:extLst>
-              <a:ext uri="{FF2B5EF4-FFF2-40B4-BE49-F238E27FC236}">
-                <a16:creationId xmlns:a16="http://schemas.microsoft.com/office/drawing/2014/main" id="{2CD93FA1-7B75-EA99-8F78-F16664E56BC3}"/>
-              </a:ext>
-            </a:extLst>
-          </p:cNvPr>
-          <p:cNvSpPr txBox="1"/>
-          <p:nvPr/>
-        </p:nvSpPr>
-        <p:spPr>
-          <a:xfrm>
-            <a:off x="5225241" y="2064923"/>
-            <a:ext cx="2931944" cy="1477328"/>
-          </a:xfrm>
-          <a:prstGeom prst="rect">
-            <a:avLst/>
-          </a:prstGeom>
-          <a:noFill/>
-        </p:spPr>
-        <p:txBody>
-          <a:bodyPr wrap="square" rtlCol="0">
-            <a:spAutoFit/>
-          </a:bodyPr>
-          <a:lstStyle/>
-          <a:p>
-            <a:pPr algn="ctr"/>
-            <a:r>
-              <a:rPr lang="en-US" sz="9000" b="1" dirty="0">
-                <a:solidFill>
-                  <a:schemeClr val="bg1"/>
-                </a:solidFill>
-                <a:latin typeface="SF Orson Casual Medium" pitchFamily="2" charset="0"/>
-              </a:rPr>
-              <a:t>RCM</a:t>
-            </a:r>
-          </a:p>
-        </p:txBody>
-      </p:sp>
-      <p:sp>
-        <p:nvSpPr>
-          <p:cNvPr id="2" name="TextBox 1">
-            <a:extLst>
-              <a:ext uri="{FF2B5EF4-FFF2-40B4-BE49-F238E27FC236}">
-                <a16:creationId xmlns:a16="http://schemas.microsoft.com/office/drawing/2014/main" id="{3F5082BF-04F0-90DB-4DC0-3BAF974CD0E2}"/>
-              </a:ext>
-            </a:extLst>
-          </p:cNvPr>
-          <p:cNvSpPr txBox="1"/>
-          <p:nvPr/>
-        </p:nvSpPr>
-        <p:spPr>
-          <a:xfrm>
-            <a:off x="5082215" y="3368674"/>
-            <a:ext cx="3217997" cy="707886"/>
-          </a:xfrm>
-          <a:prstGeom prst="rect">
-            <a:avLst/>
-          </a:prstGeom>
-          <a:noFill/>
-        </p:spPr>
-        <p:txBody>
-          <a:bodyPr wrap="none" rtlCol="0">
-            <a:spAutoFit/>
-          </a:bodyPr>
-          <a:lstStyle/>
-          <a:p>
-            <a:pPr algn="ctr"/>
-            <a:r>
-              <a:rPr lang="en-US" sz="4000" b="1" dirty="0">
-                <a:solidFill>
-                  <a:schemeClr val="bg1"/>
-                </a:solidFill>
-                <a:latin typeface="SF Orson Casual Medium" pitchFamily="2" charset="0"/>
-              </a:rPr>
-              <a:t>Cooperative</a:t>
-            </a:r>
-          </a:p>
-        </p:txBody>
-      </p:sp>
-    </p:spTree>
-    <p:extLst>
-      <p:ext uri="{BB962C8B-B14F-4D97-AF65-F5344CB8AC3E}">
-        <p14:creationId xmlns:p14="http://schemas.microsoft.com/office/powerpoint/2010/main" val="608892475"/>
-      </p:ext>
-    </p:extLst>
-  </p:cSld>
-  <p:clrMapOvr>
-    <a:masterClrMapping/>
-  </p:clrMapOvr>
-</p:sld>
-</file>
-
-<file path=ppt/slides/slide8.xml><?xml version="1.0" encoding="utf-8"?>
-<p:sld xmlns:a="http://schemas.openxmlformats.org/drawingml/2006/main" xmlns:r="http://schemas.openxmlformats.org/officeDocument/2006/relationships" xmlns:p="http://schemas.openxmlformats.org/presentationml/2006/main">
-  <p:cSld>
-    <p:spTree>
-      <p:nvGrpSpPr>
-        <p:cNvPr id="1" name=""/>
-        <p:cNvGrpSpPr/>
-        <p:nvPr/>
-      </p:nvGrpSpPr>
-      <p:grpSpPr>
-        <a:xfrm>
-          <a:off x="0" y="0"/>
-          <a:ext cx="0" cy="0"/>
-          <a:chOff x="0" y="0"/>
-          <a:chExt cx="0" cy="0"/>
-        </a:xfrm>
-      </p:grpSpPr>
-      <p:pic>
-        <p:nvPicPr>
-          <p:cNvPr id="5" name="Picture 4" descr="A blue and pink rectangle&#10;&#10;AI-generated content may be incorrect.">
-            <a:extLst>
-              <a:ext uri="{FF2B5EF4-FFF2-40B4-BE49-F238E27FC236}">
-                <a16:creationId xmlns:a16="http://schemas.microsoft.com/office/drawing/2014/main" id="{7E5A9474-AAEB-E8DC-616C-2E475470F26E}"/>
-              </a:ext>
-            </a:extLst>
-          </p:cNvPr>
-          <p:cNvPicPr>
-            <a:picLocks noChangeAspect="1"/>
-          </p:cNvPicPr>
-          <p:nvPr/>
-        </p:nvPicPr>
-        <p:blipFill>
-          <a:blip r:embed="rId2"/>
-          <a:stretch>
-            <a:fillRect/>
-          </a:stretch>
-        </p:blipFill>
-        <p:spPr>
-          <a:xfrm>
-            <a:off x="47091" y="1685441"/>
-            <a:ext cx="1231900" cy="3810000"/>
-          </a:xfrm>
-          <a:prstGeom prst="rect">
-            <a:avLst/>
-          </a:prstGeom>
-        </p:spPr>
-      </p:pic>
-      <p:sp>
-        <p:nvSpPr>
-          <p:cNvPr id="7" name="TextBox 6">
-            <a:extLst>
-              <a:ext uri="{FF2B5EF4-FFF2-40B4-BE49-F238E27FC236}">
-                <a16:creationId xmlns:a16="http://schemas.microsoft.com/office/drawing/2014/main" id="{510AC43B-3FA6-4EDB-B4C0-D6F042277F3A}"/>
-              </a:ext>
-            </a:extLst>
-          </p:cNvPr>
-          <p:cNvSpPr txBox="1"/>
-          <p:nvPr/>
-        </p:nvSpPr>
-        <p:spPr>
-          <a:xfrm>
-            <a:off x="1615807" y="322196"/>
-            <a:ext cx="7572260" cy="646331"/>
-          </a:xfrm>
-          <a:prstGeom prst="rect">
-            <a:avLst/>
-          </a:prstGeom>
-          <a:noFill/>
-        </p:spPr>
-        <p:txBody>
-          <a:bodyPr wrap="square">
-            <a:spAutoFit/>
-          </a:bodyPr>
-          <a:lstStyle/>
-          <a:p>
-            <a:r>
-              <a:rPr lang="en-US" dirty="0"/>
-              <a:t>https://</a:t>
-            </a:r>
-            <a:r>
-              <a:rPr lang="en-US" dirty="0" err="1"/>
-              <a:t>davidmathlogic.com</a:t>
-            </a:r>
-            <a:r>
-              <a:rPr lang="en-US" dirty="0"/>
-              <a:t>/colorblind/#%23D81B60-%231E88E5-%23FFC107-%23004D40</a:t>
-            </a:r>
-          </a:p>
-        </p:txBody>
-      </p:sp>
-      <p:sp>
-        <p:nvSpPr>
-          <p:cNvPr id="8" name="Rectangle 7">
-            <a:extLst>
-              <a:ext uri="{FF2B5EF4-FFF2-40B4-BE49-F238E27FC236}">
-                <a16:creationId xmlns:a16="http://schemas.microsoft.com/office/drawing/2014/main" id="{D731146C-C63B-7A41-459B-219AE4B9205B}"/>
-              </a:ext>
-            </a:extLst>
-          </p:cNvPr>
-          <p:cNvSpPr/>
-          <p:nvPr/>
-        </p:nvSpPr>
-        <p:spPr>
-          <a:xfrm>
-            <a:off x="1544283" y="1704604"/>
-            <a:ext cx="1564396" cy="826265"/>
-          </a:xfrm>
-          <a:prstGeom prst="rect">
-            <a:avLst/>
-          </a:prstGeom>
-          <a:solidFill>
-            <a:srgbClr val="D53131"/>
-          </a:solidFill>
-        </p:spPr>
-        <p:style>
-          <a:lnRef idx="2">
-            <a:schemeClr val="accent1">
-              <a:shade val="15000"/>
-            </a:schemeClr>
-          </a:lnRef>
-          <a:fillRef idx="1">
-            <a:schemeClr val="accent1"/>
-          </a:fillRef>
-          <a:effectRef idx="0">
-            <a:schemeClr val="accent1"/>
-          </a:effectRef>
-          <a:fontRef idx="minor">
-            <a:schemeClr val="lt1"/>
-          </a:fontRef>
-        </p:style>
-        <p:txBody>
-          <a:bodyPr rtlCol="0" anchor="ctr"/>
-          <a:lstStyle/>
-          <a:p>
-            <a:pPr algn="ctr"/>
-            <a:r>
-              <a:rPr lang="en-US" dirty="0"/>
-              <a:t>D53131</a:t>
-            </a:r>
-          </a:p>
-        </p:txBody>
-      </p:sp>
-      <p:sp>
-        <p:nvSpPr>
-          <p:cNvPr id="10" name="Rectangle 9">
-            <a:extLst>
-              <a:ext uri="{FF2B5EF4-FFF2-40B4-BE49-F238E27FC236}">
-                <a16:creationId xmlns:a16="http://schemas.microsoft.com/office/drawing/2014/main" id="{EA6C578D-DD32-9010-B015-64E163037C15}"/>
-              </a:ext>
-            </a:extLst>
-          </p:cNvPr>
-          <p:cNvSpPr/>
-          <p:nvPr/>
-        </p:nvSpPr>
-        <p:spPr>
-          <a:xfrm>
-            <a:off x="1544283" y="2661236"/>
-            <a:ext cx="1564396" cy="826265"/>
-          </a:xfrm>
-          <a:prstGeom prst="rect">
-            <a:avLst/>
-          </a:prstGeom>
-          <a:solidFill>
-            <a:srgbClr val="00929C"/>
-          </a:solidFill>
-        </p:spPr>
-        <p:style>
-          <a:lnRef idx="2">
-            <a:schemeClr val="accent1">
-              <a:shade val="15000"/>
-            </a:schemeClr>
-          </a:lnRef>
-          <a:fillRef idx="1">
-            <a:schemeClr val="accent1"/>
-          </a:fillRef>
-          <a:effectRef idx="0">
-            <a:schemeClr val="accent1"/>
-          </a:effectRef>
-          <a:fontRef idx="minor">
-            <a:schemeClr val="lt1"/>
-          </a:fontRef>
-        </p:style>
-        <p:txBody>
-          <a:bodyPr rtlCol="0" anchor="ctr"/>
-          <a:lstStyle/>
-          <a:p>
-            <a:pPr algn="ctr"/>
-            <a:r>
-              <a:rPr lang="en-US" dirty="0"/>
-              <a:t>00929C</a:t>
-            </a:r>
-          </a:p>
-        </p:txBody>
-      </p:sp>
-      <p:sp>
-        <p:nvSpPr>
-          <p:cNvPr id="11" name="Rectangle 10">
-            <a:extLst>
-              <a:ext uri="{FF2B5EF4-FFF2-40B4-BE49-F238E27FC236}">
-                <a16:creationId xmlns:a16="http://schemas.microsoft.com/office/drawing/2014/main" id="{399F9095-9C4E-6779-27EA-F30011A44430}"/>
-              </a:ext>
-            </a:extLst>
-          </p:cNvPr>
-          <p:cNvSpPr/>
-          <p:nvPr/>
-        </p:nvSpPr>
-        <p:spPr>
-          <a:xfrm>
-            <a:off x="1544283" y="3651875"/>
-            <a:ext cx="1564396" cy="826265"/>
-          </a:xfrm>
-          <a:prstGeom prst="rect">
-            <a:avLst/>
-          </a:prstGeom>
-          <a:solidFill>
-            <a:srgbClr val="FFB6C0"/>
-          </a:solidFill>
-        </p:spPr>
-        <p:style>
-          <a:lnRef idx="2">
-            <a:schemeClr val="accent1">
-              <a:shade val="15000"/>
-            </a:schemeClr>
-          </a:lnRef>
-          <a:fillRef idx="1">
-            <a:schemeClr val="accent1"/>
-          </a:fillRef>
-          <a:effectRef idx="0">
-            <a:schemeClr val="accent1"/>
-          </a:effectRef>
-          <a:fontRef idx="minor">
-            <a:schemeClr val="lt1"/>
-          </a:fontRef>
-        </p:style>
-        <p:txBody>
-          <a:bodyPr rtlCol="0" anchor="ctr"/>
-          <a:lstStyle/>
-          <a:p>
-            <a:pPr algn="ctr"/>
-            <a:r>
-              <a:rPr lang="en-US" dirty="0"/>
-              <a:t>FFB6C0</a:t>
-            </a:r>
-          </a:p>
-        </p:txBody>
-      </p:sp>
-      <p:sp>
-        <p:nvSpPr>
-          <p:cNvPr id="12" name="Rectangle 11">
-            <a:extLst>
-              <a:ext uri="{FF2B5EF4-FFF2-40B4-BE49-F238E27FC236}">
-                <a16:creationId xmlns:a16="http://schemas.microsoft.com/office/drawing/2014/main" id="{0354E73C-E8B7-D998-2395-3D5D5C7EB90F}"/>
-              </a:ext>
-            </a:extLst>
-          </p:cNvPr>
-          <p:cNvSpPr/>
-          <p:nvPr/>
-        </p:nvSpPr>
-        <p:spPr>
-          <a:xfrm>
-            <a:off x="1544283" y="4669176"/>
-            <a:ext cx="1564396" cy="826265"/>
-          </a:xfrm>
-          <a:prstGeom prst="rect">
-            <a:avLst/>
-          </a:prstGeom>
-          <a:solidFill>
-            <a:srgbClr val="194C52"/>
-          </a:solidFill>
-        </p:spPr>
-        <p:style>
-          <a:lnRef idx="2">
-            <a:schemeClr val="accent1">
-              <a:shade val="15000"/>
-            </a:schemeClr>
-          </a:lnRef>
-          <a:fillRef idx="1">
-            <a:schemeClr val="accent1"/>
-          </a:fillRef>
-          <a:effectRef idx="0">
-            <a:schemeClr val="accent1"/>
-          </a:effectRef>
-          <a:fontRef idx="minor">
-            <a:schemeClr val="lt1"/>
-          </a:fontRef>
-        </p:style>
-        <p:txBody>
-          <a:bodyPr rtlCol="0" anchor="ctr"/>
-          <a:lstStyle/>
-          <a:p>
-            <a:pPr algn="ctr"/>
-            <a:r>
-              <a:rPr lang="en-US" dirty="0"/>
-              <a:t>194C52</a:t>
-            </a:r>
-          </a:p>
-        </p:txBody>
-      </p:sp>
-      <p:pic>
-        <p:nvPicPr>
-          <p:cNvPr id="14" name="Picture 13" descr="A close up of a white and blue object&#10;&#10;AI-generated content may be incorrect.">
-            <a:extLst>
-              <a:ext uri="{FF2B5EF4-FFF2-40B4-BE49-F238E27FC236}">
-                <a16:creationId xmlns:a16="http://schemas.microsoft.com/office/drawing/2014/main" id="{F3DBFCD2-210A-F719-ED83-3BB9BBD17A09}"/>
-              </a:ext>
-            </a:extLst>
-          </p:cNvPr>
-          <p:cNvPicPr>
-            <a:picLocks noChangeAspect="1"/>
-          </p:cNvPicPr>
-          <p:nvPr/>
-        </p:nvPicPr>
-        <p:blipFill>
-          <a:blip r:embed="rId3"/>
-          <a:stretch>
-            <a:fillRect/>
-          </a:stretch>
-        </p:blipFill>
-        <p:spPr>
-          <a:xfrm>
-            <a:off x="4766147" y="976195"/>
-            <a:ext cx="6073100" cy="1703534"/>
-          </a:xfrm>
-          <a:prstGeom prst="rect">
-            <a:avLst/>
-          </a:prstGeom>
-        </p:spPr>
-      </p:pic>
-      <p:sp>
-        <p:nvSpPr>
-          <p:cNvPr id="19" name="Rectangle 18">
-            <a:extLst>
-              <a:ext uri="{FF2B5EF4-FFF2-40B4-BE49-F238E27FC236}">
-                <a16:creationId xmlns:a16="http://schemas.microsoft.com/office/drawing/2014/main" id="{67CFF1F0-B730-DBD7-4231-E6B78C389F35}"/>
-              </a:ext>
-            </a:extLst>
-          </p:cNvPr>
-          <p:cNvSpPr/>
-          <p:nvPr/>
-        </p:nvSpPr>
-        <p:spPr>
-          <a:xfrm>
-            <a:off x="9755447" y="3103129"/>
-            <a:ext cx="1083800" cy="697793"/>
-          </a:xfrm>
-          <a:prstGeom prst="rect">
-            <a:avLst/>
-          </a:prstGeom>
-          <a:solidFill>
-            <a:srgbClr val="CE816F"/>
-          </a:solidFill>
-        </p:spPr>
-        <p:style>
-          <a:lnRef idx="2">
-            <a:schemeClr val="accent1">
-              <a:shade val="15000"/>
-            </a:schemeClr>
-          </a:lnRef>
-          <a:fillRef idx="1">
-            <a:schemeClr val="accent1"/>
-          </a:fillRef>
-          <a:effectRef idx="0">
-            <a:schemeClr val="accent1"/>
-          </a:effectRef>
-          <a:fontRef idx="minor">
-            <a:schemeClr val="lt1"/>
-          </a:fontRef>
-        </p:style>
-        <p:txBody>
-          <a:bodyPr rtlCol="0" anchor="ctr"/>
-          <a:lstStyle/>
-          <a:p>
-            <a:pPr algn="ctr"/>
-            <a:r>
-              <a:rPr lang="en-US" dirty="0"/>
-              <a:t>CE816F</a:t>
-            </a:r>
-          </a:p>
-        </p:txBody>
-      </p:sp>
-      <p:sp>
-        <p:nvSpPr>
-          <p:cNvPr id="20" name="Rectangle 19">
-            <a:extLst>
-              <a:ext uri="{FF2B5EF4-FFF2-40B4-BE49-F238E27FC236}">
-                <a16:creationId xmlns:a16="http://schemas.microsoft.com/office/drawing/2014/main" id="{62723756-7387-2CC0-45B8-BD960162F70E}"/>
-              </a:ext>
-            </a:extLst>
-          </p:cNvPr>
-          <p:cNvSpPr/>
-          <p:nvPr/>
-        </p:nvSpPr>
-        <p:spPr>
-          <a:xfrm>
-            <a:off x="8387235" y="3103129"/>
-            <a:ext cx="1083800" cy="697793"/>
-          </a:xfrm>
-          <a:prstGeom prst="rect">
-            <a:avLst/>
-          </a:prstGeom>
-          <a:solidFill>
-            <a:srgbClr val="00929C"/>
-          </a:solidFill>
-        </p:spPr>
-        <p:style>
-          <a:lnRef idx="2">
-            <a:schemeClr val="accent1">
-              <a:shade val="15000"/>
-            </a:schemeClr>
-          </a:lnRef>
-          <a:fillRef idx="1">
-            <a:schemeClr val="accent1"/>
-          </a:fillRef>
-          <a:effectRef idx="0">
-            <a:schemeClr val="accent1"/>
-          </a:effectRef>
-          <a:fontRef idx="minor">
-            <a:schemeClr val="lt1"/>
-          </a:fontRef>
-        </p:style>
-        <p:txBody>
-          <a:bodyPr rtlCol="0" anchor="ctr"/>
-          <a:lstStyle/>
-          <a:p>
-            <a:pPr algn="ctr"/>
-            <a:r>
-              <a:rPr lang="en-US" dirty="0"/>
-              <a:t>00929C</a:t>
-            </a:r>
-          </a:p>
-        </p:txBody>
-      </p:sp>
-      <p:sp>
-        <p:nvSpPr>
-          <p:cNvPr id="21" name="Rectangle 20">
-            <a:extLst>
-              <a:ext uri="{FF2B5EF4-FFF2-40B4-BE49-F238E27FC236}">
-                <a16:creationId xmlns:a16="http://schemas.microsoft.com/office/drawing/2014/main" id="{4F6CD775-0E7C-4B1D-7313-7699DBEDE16A}"/>
-              </a:ext>
-            </a:extLst>
-          </p:cNvPr>
-          <p:cNvSpPr/>
-          <p:nvPr/>
-        </p:nvSpPr>
-        <p:spPr>
-          <a:xfrm>
-            <a:off x="6887981" y="3103129"/>
-            <a:ext cx="1083800" cy="697793"/>
-          </a:xfrm>
-          <a:prstGeom prst="rect">
-            <a:avLst/>
-          </a:prstGeom>
-          <a:solidFill>
-            <a:srgbClr val="FFB6C0"/>
-          </a:solidFill>
-        </p:spPr>
-        <p:style>
-          <a:lnRef idx="2">
-            <a:schemeClr val="accent1">
-              <a:shade val="15000"/>
-            </a:schemeClr>
-          </a:lnRef>
-          <a:fillRef idx="1">
-            <a:schemeClr val="accent1"/>
-          </a:fillRef>
-          <a:effectRef idx="0">
-            <a:schemeClr val="accent1"/>
-          </a:effectRef>
-          <a:fontRef idx="minor">
-            <a:schemeClr val="lt1"/>
-          </a:fontRef>
-        </p:style>
-        <p:txBody>
-          <a:bodyPr rtlCol="0" anchor="ctr"/>
-          <a:lstStyle/>
-          <a:p>
-            <a:pPr algn="ctr"/>
-            <a:r>
-              <a:rPr lang="en-US" dirty="0"/>
-              <a:t>FFB6C0</a:t>
-            </a:r>
-          </a:p>
-        </p:txBody>
-      </p:sp>
-      <p:sp>
-        <p:nvSpPr>
-          <p:cNvPr id="22" name="Rectangle 21">
-            <a:extLst>
-              <a:ext uri="{FF2B5EF4-FFF2-40B4-BE49-F238E27FC236}">
-                <a16:creationId xmlns:a16="http://schemas.microsoft.com/office/drawing/2014/main" id="{55307FB2-1095-59D5-7A05-77CD429EE14A}"/>
-              </a:ext>
-            </a:extLst>
-          </p:cNvPr>
-          <p:cNvSpPr/>
-          <p:nvPr/>
-        </p:nvSpPr>
-        <p:spPr>
-          <a:xfrm>
-            <a:off x="5304020" y="3103129"/>
-            <a:ext cx="1083800" cy="697793"/>
-          </a:xfrm>
-          <a:prstGeom prst="rect">
-            <a:avLst/>
-          </a:prstGeom>
-          <a:solidFill>
-            <a:srgbClr val="194C52"/>
-          </a:solidFill>
-        </p:spPr>
-        <p:style>
-          <a:lnRef idx="2">
-            <a:schemeClr val="accent1">
-              <a:shade val="15000"/>
-            </a:schemeClr>
-          </a:lnRef>
-          <a:fillRef idx="1">
-            <a:schemeClr val="accent1"/>
-          </a:fillRef>
-          <a:effectRef idx="0">
-            <a:schemeClr val="accent1"/>
-          </a:effectRef>
-          <a:fontRef idx="minor">
-            <a:schemeClr val="lt1"/>
-          </a:fontRef>
-        </p:style>
-        <p:txBody>
-          <a:bodyPr rtlCol="0" anchor="ctr"/>
-          <a:lstStyle/>
-          <a:p>
-            <a:pPr algn="ctr"/>
-            <a:r>
-              <a:rPr lang="en-US" dirty="0"/>
-              <a:t>194C52</a:t>
-            </a:r>
-          </a:p>
-        </p:txBody>
-      </p:sp>
-      <p:pic>
-        <p:nvPicPr>
-          <p:cNvPr id="24" name="Picture 23" descr="A close-up of a plate&#10;&#10;AI-generated content may be incorrect.">
-            <a:extLst>
-              <a:ext uri="{FF2B5EF4-FFF2-40B4-BE49-F238E27FC236}">
-                <a16:creationId xmlns:a16="http://schemas.microsoft.com/office/drawing/2014/main" id="{0949A77F-9F7B-411A-1A9F-42AE8411256A}"/>
-              </a:ext>
-            </a:extLst>
-          </p:cNvPr>
-          <p:cNvPicPr>
-            <a:picLocks noChangeAspect="1"/>
-          </p:cNvPicPr>
-          <p:nvPr/>
-        </p:nvPicPr>
-        <p:blipFill>
-          <a:blip r:embed="rId4"/>
-          <a:stretch>
-            <a:fillRect/>
-          </a:stretch>
-        </p:blipFill>
-        <p:spPr>
-          <a:xfrm>
-            <a:off x="10412849" y="1509728"/>
-            <a:ext cx="1574800" cy="2247900"/>
-          </a:xfrm>
-          <a:prstGeom prst="rect">
-            <a:avLst/>
-          </a:prstGeom>
-        </p:spPr>
-      </p:pic>
-      <p:pic>
-        <p:nvPicPr>
-          <p:cNvPr id="26" name="Picture 25" descr="A close-up of a card&#10;&#10;AI-generated content may be incorrect.">
-            <a:extLst>
-              <a:ext uri="{FF2B5EF4-FFF2-40B4-BE49-F238E27FC236}">
-                <a16:creationId xmlns:a16="http://schemas.microsoft.com/office/drawing/2014/main" id="{D3627E63-43A5-D83E-167C-6FB3FE64E703}"/>
-              </a:ext>
-            </a:extLst>
-          </p:cNvPr>
-          <p:cNvPicPr>
-            <a:picLocks noChangeAspect="1"/>
-          </p:cNvPicPr>
-          <p:nvPr/>
-        </p:nvPicPr>
-        <p:blipFill>
-          <a:blip r:embed="rId5"/>
-          <a:stretch>
-            <a:fillRect/>
-          </a:stretch>
-        </p:blipFill>
-        <p:spPr>
-          <a:xfrm>
-            <a:off x="4000874" y="4047691"/>
-            <a:ext cx="7772400" cy="1034617"/>
-          </a:xfrm>
-          <a:prstGeom prst="rect">
-            <a:avLst/>
-          </a:prstGeom>
-        </p:spPr>
-      </p:pic>
-      <p:sp>
-        <p:nvSpPr>
-          <p:cNvPr id="27" name="Rectangle 26">
-            <a:extLst>
-              <a:ext uri="{FF2B5EF4-FFF2-40B4-BE49-F238E27FC236}">
-                <a16:creationId xmlns:a16="http://schemas.microsoft.com/office/drawing/2014/main" id="{A05758C1-6D3C-DF7F-3862-FE80F28D85EA}"/>
-              </a:ext>
-            </a:extLst>
-          </p:cNvPr>
-          <p:cNvSpPr/>
-          <p:nvPr/>
-        </p:nvSpPr>
-        <p:spPr>
-          <a:xfrm>
-            <a:off x="8844428" y="5492101"/>
-            <a:ext cx="1083800" cy="697793"/>
-          </a:xfrm>
-          <a:prstGeom prst="rect">
-            <a:avLst/>
-          </a:prstGeom>
-          <a:solidFill>
-            <a:srgbClr val="CE816F"/>
-          </a:solidFill>
-        </p:spPr>
-        <p:style>
-          <a:lnRef idx="2">
-            <a:schemeClr val="accent1">
-              <a:shade val="15000"/>
-            </a:schemeClr>
-          </a:lnRef>
-          <a:fillRef idx="1">
-            <a:schemeClr val="accent1"/>
-          </a:fillRef>
-          <a:effectRef idx="0">
-            <a:schemeClr val="accent1"/>
-          </a:effectRef>
-          <a:fontRef idx="minor">
-            <a:schemeClr val="lt1"/>
-          </a:fontRef>
-        </p:style>
-        <p:txBody>
-          <a:bodyPr rtlCol="0" anchor="ctr"/>
-          <a:lstStyle/>
-          <a:p>
-            <a:pPr algn="ctr"/>
-            <a:r>
-              <a:rPr lang="en-US" dirty="0"/>
-              <a:t>CE816F</a:t>
-            </a:r>
-          </a:p>
-        </p:txBody>
-      </p:sp>
-      <p:sp>
-        <p:nvSpPr>
-          <p:cNvPr id="28" name="Rectangle 27">
-            <a:extLst>
-              <a:ext uri="{FF2B5EF4-FFF2-40B4-BE49-F238E27FC236}">
-                <a16:creationId xmlns:a16="http://schemas.microsoft.com/office/drawing/2014/main" id="{84ED3B10-A81B-919C-5946-9ED0B10120E0}"/>
-              </a:ext>
-            </a:extLst>
-          </p:cNvPr>
-          <p:cNvSpPr/>
-          <p:nvPr/>
-        </p:nvSpPr>
-        <p:spPr>
-          <a:xfrm>
-            <a:off x="7345174" y="5492101"/>
-            <a:ext cx="1083800" cy="697793"/>
-          </a:xfrm>
-          <a:prstGeom prst="rect">
-            <a:avLst/>
-          </a:prstGeom>
-          <a:solidFill>
-            <a:srgbClr val="E4B3A9"/>
-          </a:solidFill>
-        </p:spPr>
-        <p:style>
-          <a:lnRef idx="2">
-            <a:schemeClr val="accent1">
-              <a:shade val="15000"/>
-            </a:schemeClr>
-          </a:lnRef>
-          <a:fillRef idx="1">
-            <a:schemeClr val="accent1"/>
-          </a:fillRef>
-          <a:effectRef idx="0">
-            <a:schemeClr val="accent1"/>
-          </a:effectRef>
-          <a:fontRef idx="minor">
-            <a:schemeClr val="lt1"/>
-          </a:fontRef>
-        </p:style>
-        <p:txBody>
-          <a:bodyPr rtlCol="0" anchor="ctr"/>
-          <a:lstStyle/>
-          <a:p>
-            <a:pPr algn="ctr"/>
-            <a:r>
-              <a:rPr lang="en-US" dirty="0"/>
-              <a:t>E4B3A9</a:t>
-            </a:r>
-          </a:p>
-        </p:txBody>
-      </p:sp>
-      <p:sp>
-        <p:nvSpPr>
-          <p:cNvPr id="29" name="Rectangle 28">
-            <a:extLst>
-              <a:ext uri="{FF2B5EF4-FFF2-40B4-BE49-F238E27FC236}">
-                <a16:creationId xmlns:a16="http://schemas.microsoft.com/office/drawing/2014/main" id="{5C888941-A838-6647-5B56-AAD4727797BE}"/>
-              </a:ext>
-            </a:extLst>
-          </p:cNvPr>
-          <p:cNvSpPr/>
-          <p:nvPr/>
-        </p:nvSpPr>
-        <p:spPr>
-          <a:xfrm>
-            <a:off x="5845920" y="5492101"/>
-            <a:ext cx="1083800" cy="697793"/>
-          </a:xfrm>
-          <a:prstGeom prst="rect">
-            <a:avLst/>
-          </a:prstGeom>
-          <a:solidFill>
-            <a:srgbClr val="2E7F9E"/>
-          </a:solidFill>
-        </p:spPr>
-        <p:style>
-          <a:lnRef idx="2">
-            <a:schemeClr val="accent1">
-              <a:shade val="15000"/>
-            </a:schemeClr>
-          </a:lnRef>
-          <a:fillRef idx="1">
-            <a:schemeClr val="accent1"/>
-          </a:fillRef>
-          <a:effectRef idx="0">
-            <a:schemeClr val="accent1"/>
-          </a:effectRef>
-          <a:fontRef idx="minor">
-            <a:schemeClr val="lt1"/>
-          </a:fontRef>
-        </p:style>
-        <p:txBody>
-          <a:bodyPr rtlCol="0" anchor="ctr"/>
-          <a:lstStyle/>
-          <a:p>
-            <a:pPr algn="ctr"/>
-            <a:r>
-              <a:rPr lang="en-US" dirty="0"/>
-              <a:t>2E7F9E</a:t>
-            </a:r>
-          </a:p>
-        </p:txBody>
-      </p:sp>
-      <p:sp>
-        <p:nvSpPr>
-          <p:cNvPr id="30" name="Rectangle 29">
-            <a:extLst>
-              <a:ext uri="{FF2B5EF4-FFF2-40B4-BE49-F238E27FC236}">
-                <a16:creationId xmlns:a16="http://schemas.microsoft.com/office/drawing/2014/main" id="{91F574BF-9536-31EE-C6F7-FF927D599F8D}"/>
-              </a:ext>
-            </a:extLst>
-          </p:cNvPr>
-          <p:cNvSpPr/>
-          <p:nvPr/>
-        </p:nvSpPr>
-        <p:spPr>
-          <a:xfrm>
-            <a:off x="4261959" y="5492101"/>
-            <a:ext cx="1083800" cy="697793"/>
-          </a:xfrm>
-          <a:prstGeom prst="rect">
-            <a:avLst/>
-          </a:prstGeom>
-          <a:solidFill>
-            <a:srgbClr val="165875"/>
-          </a:solidFill>
-        </p:spPr>
-        <p:style>
-          <a:lnRef idx="2">
-            <a:schemeClr val="accent1">
-              <a:shade val="15000"/>
-            </a:schemeClr>
-          </a:lnRef>
-          <a:fillRef idx="1">
-            <a:schemeClr val="accent1"/>
-          </a:fillRef>
-          <a:effectRef idx="0">
-            <a:schemeClr val="accent1"/>
-          </a:effectRef>
-          <a:fontRef idx="minor">
-            <a:schemeClr val="lt1"/>
-          </a:fontRef>
-        </p:style>
-        <p:txBody>
-          <a:bodyPr rtlCol="0" anchor="ctr"/>
-          <a:lstStyle/>
-          <a:p>
-            <a:pPr algn="ctr"/>
-            <a:r>
-              <a:rPr lang="en-US" dirty="0"/>
-              <a:t>165875</a:t>
-            </a:r>
-          </a:p>
-        </p:txBody>
-      </p:sp>
-      <p:sp>
-        <p:nvSpPr>
-          <p:cNvPr id="31" name="Rectangle 30">
-            <a:extLst>
-              <a:ext uri="{FF2B5EF4-FFF2-40B4-BE49-F238E27FC236}">
-                <a16:creationId xmlns:a16="http://schemas.microsoft.com/office/drawing/2014/main" id="{E5962616-EABC-B026-FB43-68BCC3B9C5C0}"/>
-              </a:ext>
-            </a:extLst>
-          </p:cNvPr>
-          <p:cNvSpPr/>
-          <p:nvPr/>
-        </p:nvSpPr>
-        <p:spPr>
-          <a:xfrm>
-            <a:off x="10412849" y="5532908"/>
-            <a:ext cx="1083800" cy="697793"/>
-          </a:xfrm>
-          <a:prstGeom prst="rect">
-            <a:avLst/>
-          </a:prstGeom>
-          <a:solidFill>
-            <a:srgbClr val="A15949"/>
-          </a:solidFill>
-        </p:spPr>
-        <p:style>
-          <a:lnRef idx="2">
-            <a:schemeClr val="accent1">
-              <a:shade val="15000"/>
-            </a:schemeClr>
-          </a:lnRef>
-          <a:fillRef idx="1">
-            <a:schemeClr val="accent1"/>
-          </a:fillRef>
-          <a:effectRef idx="0">
-            <a:schemeClr val="accent1"/>
-          </a:effectRef>
-          <a:fontRef idx="minor">
-            <a:schemeClr val="lt1"/>
-          </a:fontRef>
-        </p:style>
-        <p:txBody>
-          <a:bodyPr rtlCol="0" anchor="ctr"/>
-          <a:lstStyle/>
-          <a:p>
-            <a:pPr algn="ctr"/>
-            <a:r>
-              <a:rPr lang="en-US" dirty="0"/>
-              <a:t>A15949</a:t>
-            </a:r>
-          </a:p>
-        </p:txBody>
-      </p:sp>
-      <p:pic>
-        <p:nvPicPr>
-          <p:cNvPr id="33" name="Picture 32" descr="A close up of a sign&#10;&#10;AI-generated content may be incorrect.">
-            <a:extLst>
-              <a:ext uri="{FF2B5EF4-FFF2-40B4-BE49-F238E27FC236}">
-                <a16:creationId xmlns:a16="http://schemas.microsoft.com/office/drawing/2014/main" id="{11FFC7B0-191E-F26D-140D-0A17CCC94590}"/>
-              </a:ext>
-            </a:extLst>
-          </p:cNvPr>
-          <p:cNvPicPr>
-            <a:picLocks noChangeAspect="1"/>
-          </p:cNvPicPr>
-          <p:nvPr/>
-        </p:nvPicPr>
-        <p:blipFill>
-          <a:blip r:embed="rId6"/>
-          <a:stretch>
-            <a:fillRect/>
-          </a:stretch>
-        </p:blipFill>
-        <p:spPr>
-          <a:xfrm>
-            <a:off x="396632" y="5881804"/>
-            <a:ext cx="3657600" cy="1689100"/>
-          </a:xfrm>
-          <a:prstGeom prst="rect">
-            <a:avLst/>
-          </a:prstGeom>
-        </p:spPr>
-      </p:pic>
-      <p:sp>
-        <p:nvSpPr>
-          <p:cNvPr id="34" name="Rectangle 33">
-            <a:extLst>
-              <a:ext uri="{FF2B5EF4-FFF2-40B4-BE49-F238E27FC236}">
-                <a16:creationId xmlns:a16="http://schemas.microsoft.com/office/drawing/2014/main" id="{4B729BC4-D049-E4A0-552C-42EE4ED25528}"/>
-              </a:ext>
-            </a:extLst>
-          </p:cNvPr>
-          <p:cNvSpPr/>
-          <p:nvPr/>
-        </p:nvSpPr>
-        <p:spPr>
-          <a:xfrm>
-            <a:off x="4463427" y="6531189"/>
-            <a:ext cx="1083800" cy="697793"/>
-          </a:xfrm>
-          <a:prstGeom prst="rect">
-            <a:avLst/>
-          </a:prstGeom>
-          <a:solidFill>
-            <a:srgbClr val="8E4A52"/>
-          </a:solidFill>
-        </p:spPr>
-        <p:style>
-          <a:lnRef idx="2">
-            <a:schemeClr val="accent1">
-              <a:shade val="15000"/>
-            </a:schemeClr>
-          </a:lnRef>
-          <a:fillRef idx="1">
-            <a:schemeClr val="accent1"/>
-          </a:fillRef>
-          <a:effectRef idx="0">
-            <a:schemeClr val="accent1"/>
-          </a:effectRef>
-          <a:fontRef idx="minor">
-            <a:schemeClr val="lt1"/>
-          </a:fontRef>
-        </p:style>
-        <p:txBody>
-          <a:bodyPr rtlCol="0" anchor="ctr"/>
-          <a:lstStyle/>
-          <a:p>
-            <a:pPr algn="ctr"/>
-            <a:r>
-              <a:rPr lang="en-US" dirty="0"/>
-              <a:t>854E53</a:t>
-            </a:r>
-          </a:p>
-        </p:txBody>
-      </p:sp>
-    </p:spTree>
-    <p:extLst>
-      <p:ext uri="{BB962C8B-B14F-4D97-AF65-F5344CB8AC3E}">
-        <p14:creationId xmlns:p14="http://schemas.microsoft.com/office/powerpoint/2010/main" val="193331974"/>
       </p:ext>
     </p:extLst>
   </p:cSld>

</xml_diff>

<commit_message>
update colours and background
</commit_message>
<xml_diff>
--- a/public/images/logo-RCM-coop-dev.pptx
+++ b/public/images/logo-RCM-coop-dev.pptx
@@ -8,14 +8,16 @@
     <p:sldId id="256" r:id="rId2"/>
     <p:sldId id="257" r:id="rId3"/>
     <p:sldId id="258" r:id="rId4"/>
-    <p:sldId id="273" r:id="rId5"/>
-    <p:sldId id="271" r:id="rId6"/>
-    <p:sldId id="272" r:id="rId7"/>
-    <p:sldId id="262" r:id="rId8"/>
-    <p:sldId id="269" r:id="rId9"/>
-    <p:sldId id="267" r:id="rId10"/>
-    <p:sldId id="268" r:id="rId11"/>
-    <p:sldId id="270" r:id="rId12"/>
+    <p:sldId id="274" r:id="rId5"/>
+    <p:sldId id="273" r:id="rId6"/>
+    <p:sldId id="271" r:id="rId7"/>
+    <p:sldId id="272" r:id="rId8"/>
+    <p:sldId id="262" r:id="rId9"/>
+    <p:sldId id="269" r:id="rId10"/>
+    <p:sldId id="267" r:id="rId11"/>
+    <p:sldId id="268" r:id="rId12"/>
+    <p:sldId id="270" r:id="rId13"/>
+    <p:sldId id="275" r:id="rId14"/>
   </p:sldIdLst>
   <p:sldSz cx="12192000" cy="6858000"/>
   <p:notesSz cx="6858000" cy="9144000"/>
@@ -122,20 +124,75 @@
 </p:presentation>
 </file>
 
-<file path=ppt/revisionInfo.xml><?xml version="1.0" encoding="utf-8"?>
-<p1510:revInfo xmlns:a="http://schemas.openxmlformats.org/drawingml/2006/main" xmlns:r="http://schemas.openxmlformats.org/officeDocument/2006/relationships" xmlns:p1510="http://schemas.microsoft.com/office/powerpoint/2015/10/main">
-  <p1510:revLst>
-    <p1510:client id="{F1C8B9D2-4377-2C45-B746-CF37BA7A4C1F}" v="48" dt="2025-02-10T13:22:07.152"/>
-  </p1510:revLst>
-</p1510:revInfo>
-</file>
-
 <file path=ppt/changesInfos/changesInfo1.xml><?xml version="1.0" encoding="utf-8"?>
 <pc:chgInfo xmlns:a="http://schemas.openxmlformats.org/drawingml/2006/main" xmlns:r="http://schemas.openxmlformats.org/officeDocument/2006/relationships" xmlns:ac="http://schemas.microsoft.com/office/drawing/2013/main/command" xmlns:pc="http://schemas.microsoft.com/office/powerpoint/2013/main/command">
   <pc:docChgLst>
+    <pc:chgData name="Cassandra Gould Van Praag" userId="d2248499-4cc7-4575-92a4-3dec06827e7f" providerId="ADAL" clId="{F52208EF-5CD1-B344-9B72-B3D57CC512E2}"/>
+    <pc:docChg chg="modSld">
+      <pc:chgData name="Cassandra Gould Van Praag" userId="d2248499-4cc7-4575-92a4-3dec06827e7f" providerId="ADAL" clId="{F52208EF-5CD1-B344-9B72-B3D57CC512E2}" dt="2025-04-28T15:54:37.375" v="1" actId="1036"/>
+      <pc:docMkLst>
+        <pc:docMk/>
+      </pc:docMkLst>
+      <pc:sldChg chg="modSp mod">
+        <pc:chgData name="Cassandra Gould Van Praag" userId="d2248499-4cc7-4575-92a4-3dec06827e7f" providerId="ADAL" clId="{F52208EF-5CD1-B344-9B72-B3D57CC512E2}" dt="2025-04-28T15:54:37.375" v="1" actId="1036"/>
+        <pc:sldMkLst>
+          <pc:docMk/>
+          <pc:sldMk cId="3067319856" sldId="274"/>
+        </pc:sldMkLst>
+        <pc:grpChg chg="mod">
+          <ac:chgData name="Cassandra Gould Van Praag" userId="d2248499-4cc7-4575-92a4-3dec06827e7f" providerId="ADAL" clId="{F52208EF-5CD1-B344-9B72-B3D57CC512E2}" dt="2025-04-28T15:54:37.375" v="1" actId="1036"/>
+          <ac:grpSpMkLst>
+            <pc:docMk/>
+            <pc:sldMk cId="3067319856" sldId="274"/>
+            <ac:grpSpMk id="2" creationId="{9D9AE90F-3401-8BC1-BA6B-B1EE0CB4064E}"/>
+          </ac:grpSpMkLst>
+        </pc:grpChg>
+      </pc:sldChg>
+    </pc:docChg>
+  </pc:docChgLst>
+  <pc:docChgLst>
+    <pc:chgData name="Cassandra Gould Van Praag" userId="d2248499-4cc7-4575-92a4-3dec06827e7f" providerId="ADAL" clId="{D02E31F4-74D5-B14A-83E5-B7100460409E}"/>
+    <pc:docChg chg="custSel addSld modSld">
+      <pc:chgData name="Cassandra Gould Van Praag" userId="d2248499-4cc7-4575-92a4-3dec06827e7f" providerId="ADAL" clId="{D02E31F4-74D5-B14A-83E5-B7100460409E}" dt="2025-02-26T16:51:31.058" v="35" actId="12789"/>
+      <pc:docMkLst>
+        <pc:docMk/>
+      </pc:docMkLst>
+      <pc:sldChg chg="addSp delSp modSp mod">
+        <pc:chgData name="Cassandra Gould Van Praag" userId="d2248499-4cc7-4575-92a4-3dec06827e7f" providerId="ADAL" clId="{D02E31F4-74D5-B14A-83E5-B7100460409E}" dt="2025-02-26T16:50:11.642" v="9" actId="478"/>
+        <pc:sldMkLst>
+          <pc:docMk/>
+          <pc:sldMk cId="364564612" sldId="258"/>
+        </pc:sldMkLst>
+      </pc:sldChg>
+      <pc:sldChg chg="addSp delSp modSp add mod">
+        <pc:chgData name="Cassandra Gould Van Praag" userId="d2248499-4cc7-4575-92a4-3dec06827e7f" providerId="ADAL" clId="{D02E31F4-74D5-B14A-83E5-B7100460409E}" dt="2025-02-26T16:51:31.058" v="35" actId="12789"/>
+        <pc:sldMkLst>
+          <pc:docMk/>
+          <pc:sldMk cId="3067319856" sldId="274"/>
+        </pc:sldMkLst>
+        <pc:spChg chg="add mod">
+          <ac:chgData name="Cassandra Gould Van Praag" userId="d2248499-4cc7-4575-92a4-3dec06827e7f" providerId="ADAL" clId="{D02E31F4-74D5-B14A-83E5-B7100460409E}" dt="2025-02-26T16:51:31.058" v="35" actId="12789"/>
+          <ac:spMkLst>
+            <pc:docMk/>
+            <pc:sldMk cId="3067319856" sldId="274"/>
+            <ac:spMk id="8" creationId="{742DB6F1-2973-D97D-F806-FF0D30E91F1F}"/>
+          </ac:spMkLst>
+        </pc:spChg>
+        <pc:grpChg chg="mod">
+          <ac:chgData name="Cassandra Gould Van Praag" userId="d2248499-4cc7-4575-92a4-3dec06827e7f" providerId="ADAL" clId="{D02E31F4-74D5-B14A-83E5-B7100460409E}" dt="2025-02-26T16:51:31.058" v="35" actId="12789"/>
+          <ac:grpSpMkLst>
+            <pc:docMk/>
+            <pc:sldMk cId="3067319856" sldId="274"/>
+            <ac:grpSpMk id="2" creationId="{9D9AE90F-3401-8BC1-BA6B-B1EE0CB4064E}"/>
+          </ac:grpSpMkLst>
+        </pc:grpChg>
+      </pc:sldChg>
+    </pc:docChg>
+  </pc:docChgLst>
+  <pc:docChgLst>
     <pc:chgData name="Cassandra Gould Van Praag" userId="d2248499-4cc7-4575-92a4-3dec06827e7f" providerId="ADAL" clId="{F1C8B9D2-4377-2C45-B746-CF37BA7A4C1F}"/>
     <pc:docChg chg="undo redo custSel addSld delSld modSld sldOrd">
-      <pc:chgData name="Cassandra Gould Van Praag" userId="d2248499-4cc7-4575-92a4-3dec06827e7f" providerId="ADAL" clId="{F1C8B9D2-4377-2C45-B746-CF37BA7A4C1F}" dt="2025-02-10T13:22:16.820" v="379" actId="14100"/>
+      <pc:chgData name="Cassandra Gould Van Praag" userId="d2248499-4cc7-4575-92a4-3dec06827e7f" providerId="ADAL" clId="{F1C8B9D2-4377-2C45-B746-CF37BA7A4C1F}" dt="2025-02-13T01:19:24.053" v="390" actId="164"/>
       <pc:docMkLst>
         <pc:docMk/>
       </pc:docMkLst>
@@ -153,23 +210,15 @@
             <ac:spMk id="16" creationId="{6771B0C7-8D26-2470-446B-3B77F44788C8}"/>
           </ac:spMkLst>
         </pc:spChg>
-        <pc:spChg chg="mod">
-          <ac:chgData name="Cassandra Gould Van Praag" userId="d2248499-4cc7-4575-92a4-3dec06827e7f" providerId="ADAL" clId="{F1C8B9D2-4377-2C45-B746-CF37BA7A4C1F}" dt="2025-01-23T18:14:43.275" v="12" actId="207"/>
-          <ac:spMkLst>
-            <pc:docMk/>
-            <pc:sldMk cId="2559353360" sldId="257"/>
-            <ac:spMk id="17" creationId="{F22AB369-BD75-6503-D37B-4851BC14857A}"/>
-          </ac:spMkLst>
-        </pc:spChg>
       </pc:sldChg>
       <pc:sldChg chg="addSp delSp modSp add mod">
-        <pc:chgData name="Cassandra Gould Van Praag" userId="d2248499-4cc7-4575-92a4-3dec06827e7f" providerId="ADAL" clId="{F1C8B9D2-4377-2C45-B746-CF37BA7A4C1F}" dt="2025-01-23T18:23:37.256" v="51"/>
+        <pc:chgData name="Cassandra Gould Van Praag" userId="d2248499-4cc7-4575-92a4-3dec06827e7f" providerId="ADAL" clId="{F1C8B9D2-4377-2C45-B746-CF37BA7A4C1F}" dt="2025-02-13T01:19:24.053" v="390" actId="164"/>
         <pc:sldMkLst>
           <pc:docMk/>
           <pc:sldMk cId="364564612" sldId="258"/>
         </pc:sldMkLst>
         <pc:spChg chg="mod">
-          <ac:chgData name="Cassandra Gould Van Praag" userId="d2248499-4cc7-4575-92a4-3dec06827e7f" providerId="ADAL" clId="{F1C8B9D2-4377-2C45-B746-CF37BA7A4C1F}" dt="2025-01-23T18:17:56.947" v="48" actId="207"/>
+          <ac:chgData name="Cassandra Gould Van Praag" userId="d2248499-4cc7-4575-92a4-3dec06827e7f" providerId="ADAL" clId="{F1C8B9D2-4377-2C45-B746-CF37BA7A4C1F}" dt="2025-02-13T01:19:24.053" v="390" actId="164"/>
           <ac:spMkLst>
             <pc:docMk/>
             <pc:sldMk cId="364564612" sldId="258"/>
@@ -177,15 +226,23 @@
           </ac:spMkLst>
         </pc:spChg>
         <pc:spChg chg="mod">
-          <ac:chgData name="Cassandra Gould Van Praag" userId="d2248499-4cc7-4575-92a4-3dec06827e7f" providerId="ADAL" clId="{F1C8B9D2-4377-2C45-B746-CF37BA7A4C1F}" dt="2025-01-23T18:18:06.487" v="49" actId="207"/>
+          <ac:chgData name="Cassandra Gould Van Praag" userId="d2248499-4cc7-4575-92a4-3dec06827e7f" providerId="ADAL" clId="{F1C8B9D2-4377-2C45-B746-CF37BA7A4C1F}" dt="2025-02-13T01:19:24.053" v="390" actId="164"/>
           <ac:spMkLst>
             <pc:docMk/>
             <pc:sldMk cId="364564612" sldId="258"/>
             <ac:spMk id="17" creationId="{1DAA92DE-3F47-D461-4A54-D721976E6B3D}"/>
           </ac:spMkLst>
         </pc:spChg>
+        <pc:grpChg chg="add mod">
+          <ac:chgData name="Cassandra Gould Van Praag" userId="d2248499-4cc7-4575-92a4-3dec06827e7f" providerId="ADAL" clId="{F1C8B9D2-4377-2C45-B746-CF37BA7A4C1F}" dt="2025-02-13T01:19:24.053" v="390" actId="164"/>
+          <ac:grpSpMkLst>
+            <pc:docMk/>
+            <pc:sldMk cId="364564612" sldId="258"/>
+            <ac:grpSpMk id="2" creationId="{D09EFF0C-069A-F548-A200-428A26541F1B}"/>
+          </ac:grpSpMkLst>
+        </pc:grpChg>
         <pc:picChg chg="mod">
-          <ac:chgData name="Cassandra Gould Van Praag" userId="d2248499-4cc7-4575-92a4-3dec06827e7f" providerId="ADAL" clId="{F1C8B9D2-4377-2C45-B746-CF37BA7A4C1F}" dt="2025-01-23T18:18:20.324" v="50" actId="1076"/>
+          <ac:chgData name="Cassandra Gould Van Praag" userId="d2248499-4cc7-4575-92a4-3dec06827e7f" providerId="ADAL" clId="{F1C8B9D2-4377-2C45-B746-CF37BA7A4C1F}" dt="2025-02-13T01:19:24.053" v="390" actId="164"/>
           <ac:picMkLst>
             <pc:docMk/>
             <pc:sldMk cId="364564612" sldId="258"/>
@@ -335,7 +392,7 @@
         </pc:picChg>
       </pc:sldChg>
       <pc:sldChg chg="addSp delSp modSp new mod">
-        <pc:chgData name="Cassandra Gould Van Praag" userId="d2248499-4cc7-4575-92a4-3dec06827e7f" providerId="ADAL" clId="{F1C8B9D2-4377-2C45-B746-CF37BA7A4C1F}" dt="2025-02-05T17:09:10.041" v="336"/>
+        <pc:chgData name="Cassandra Gould Van Praag" userId="d2248499-4cc7-4575-92a4-3dec06827e7f" providerId="ADAL" clId="{F1C8B9D2-4377-2C45-B746-CF37BA7A4C1F}" dt="2025-02-13T01:13:03.216" v="389" actId="478"/>
         <pc:sldMkLst>
           <pc:docMk/>
           <pc:sldMk cId="193331974" sldId="270"/>
@@ -485,7 +542,7 @@
           </ac:picMkLst>
         </pc:picChg>
         <pc:picChg chg="add mod">
-          <ac:chgData name="Cassandra Gould Van Praag" userId="d2248499-4cc7-4575-92a4-3dec06827e7f" providerId="ADAL" clId="{F1C8B9D2-4377-2C45-B746-CF37BA7A4C1F}" dt="2025-02-05T17:08:07.702" v="328" actId="1076"/>
+          <ac:chgData name="Cassandra Gould Van Praag" userId="d2248499-4cc7-4575-92a4-3dec06827e7f" providerId="ADAL" clId="{F1C8B9D2-4377-2C45-B746-CF37BA7A4C1F}" dt="2025-02-13T01:10:36.377" v="380" actId="1076"/>
           <ac:picMkLst>
             <pc:docMk/>
             <pc:sldMk cId="193331974" sldId="270"/>
@@ -748,7 +805,7 @@
           <a:p>
             <a:fld id="{B9AF1358-2D8A-7743-80A8-998FCC7F2732}" type="datetimeFigureOut">
               <a:rPr lang="en-US" smtClean="0"/>
-              <a:t>2/5/25</a:t>
+              <a:t>6/18/25</a:t>
             </a:fld>
             <a:endParaRPr lang="en-US"/>
           </a:p>
@@ -948,7 +1005,7 @@
           <a:p>
             <a:fld id="{B9AF1358-2D8A-7743-80A8-998FCC7F2732}" type="datetimeFigureOut">
               <a:rPr lang="en-US" smtClean="0"/>
-              <a:t>2/5/25</a:t>
+              <a:t>6/18/25</a:t>
             </a:fld>
             <a:endParaRPr lang="en-US"/>
           </a:p>
@@ -1158,7 +1215,7 @@
           <a:p>
             <a:fld id="{B9AF1358-2D8A-7743-80A8-998FCC7F2732}" type="datetimeFigureOut">
               <a:rPr lang="en-US" smtClean="0"/>
-              <a:t>2/5/25</a:t>
+              <a:t>6/18/25</a:t>
             </a:fld>
             <a:endParaRPr lang="en-US"/>
           </a:p>
@@ -1358,7 +1415,7 @@
           <a:p>
             <a:fld id="{B9AF1358-2D8A-7743-80A8-998FCC7F2732}" type="datetimeFigureOut">
               <a:rPr lang="en-US" smtClean="0"/>
-              <a:t>2/5/25</a:t>
+              <a:t>6/18/25</a:t>
             </a:fld>
             <a:endParaRPr lang="en-US"/>
           </a:p>
@@ -1634,7 +1691,7 @@
           <a:p>
             <a:fld id="{B9AF1358-2D8A-7743-80A8-998FCC7F2732}" type="datetimeFigureOut">
               <a:rPr lang="en-US" smtClean="0"/>
-              <a:t>2/5/25</a:t>
+              <a:t>6/18/25</a:t>
             </a:fld>
             <a:endParaRPr lang="en-US"/>
           </a:p>
@@ -1902,7 +1959,7 @@
           <a:p>
             <a:fld id="{B9AF1358-2D8A-7743-80A8-998FCC7F2732}" type="datetimeFigureOut">
               <a:rPr lang="en-US" smtClean="0"/>
-              <a:t>2/5/25</a:t>
+              <a:t>6/18/25</a:t>
             </a:fld>
             <a:endParaRPr lang="en-US"/>
           </a:p>
@@ -2317,7 +2374,7 @@
           <a:p>
             <a:fld id="{B9AF1358-2D8A-7743-80A8-998FCC7F2732}" type="datetimeFigureOut">
               <a:rPr lang="en-US" smtClean="0"/>
-              <a:t>2/5/25</a:t>
+              <a:t>6/18/25</a:t>
             </a:fld>
             <a:endParaRPr lang="en-US"/>
           </a:p>
@@ -2459,7 +2516,7 @@
           <a:p>
             <a:fld id="{B9AF1358-2D8A-7743-80A8-998FCC7F2732}" type="datetimeFigureOut">
               <a:rPr lang="en-US" smtClean="0"/>
-              <a:t>2/5/25</a:t>
+              <a:t>6/18/25</a:t>
             </a:fld>
             <a:endParaRPr lang="en-US"/>
           </a:p>
@@ -2572,7 +2629,7 @@
           <a:p>
             <a:fld id="{B9AF1358-2D8A-7743-80A8-998FCC7F2732}" type="datetimeFigureOut">
               <a:rPr lang="en-US" smtClean="0"/>
-              <a:t>2/5/25</a:t>
+              <a:t>6/18/25</a:t>
             </a:fld>
             <a:endParaRPr lang="en-US"/>
           </a:p>
@@ -2885,7 +2942,7 @@
           <a:p>
             <a:fld id="{B9AF1358-2D8A-7743-80A8-998FCC7F2732}" type="datetimeFigureOut">
               <a:rPr lang="en-US" smtClean="0"/>
-              <a:t>2/5/25</a:t>
+              <a:t>6/18/25</a:t>
             </a:fld>
             <a:endParaRPr lang="en-US"/>
           </a:p>
@@ -3174,7 +3231,7 @@
           <a:p>
             <a:fld id="{B9AF1358-2D8A-7743-80A8-998FCC7F2732}" type="datetimeFigureOut">
               <a:rPr lang="en-US" smtClean="0"/>
-              <a:t>2/5/25</a:t>
+              <a:t>6/18/25</a:t>
             </a:fld>
             <a:endParaRPr lang="en-US"/>
           </a:p>
@@ -3417,7 +3474,7 @@
           <a:p>
             <a:fld id="{B9AF1358-2D8A-7743-80A8-998FCC7F2732}" type="datetimeFigureOut">
               <a:rPr lang="en-US" smtClean="0"/>
-              <a:t>2/5/25</a:t>
+              <a:t>6/18/25</a:t>
             </a:fld>
             <a:endParaRPr lang="en-US"/>
           </a:p>
@@ -4131,6 +4188,154 @@
         <p:cNvPr id="1" name="">
           <a:extLst>
             <a:ext uri="{FF2B5EF4-FFF2-40B4-BE49-F238E27FC236}">
+              <a16:creationId xmlns:a16="http://schemas.microsoft.com/office/drawing/2014/main" id="{57C506CE-72FA-30BE-B8B9-67E1E6B584BF}"/>
+            </a:ext>
+          </a:extLst>
+        </p:cNvPr>
+        <p:cNvGrpSpPr/>
+        <p:nvPr/>
+      </p:nvGrpSpPr>
+      <p:grpSpPr>
+        <a:xfrm>
+          <a:off x="0" y="0"/>
+          <a:ext cx="0" cy="0"/>
+          <a:chOff x="0" y="0"/>
+          <a:chExt cx="0" cy="0"/>
+        </a:xfrm>
+      </p:grpSpPr>
+      <p:pic>
+        <p:nvPicPr>
+          <p:cNvPr id="15" name="Picture 14">
+            <a:extLst>
+              <a:ext uri="{FF2B5EF4-FFF2-40B4-BE49-F238E27FC236}">
+                <a16:creationId xmlns:a16="http://schemas.microsoft.com/office/drawing/2014/main" id="{6FA9B8AC-39F3-952B-3524-296BE5929308}"/>
+              </a:ext>
+            </a:extLst>
+          </p:cNvPr>
+          <p:cNvPicPr>
+            <a:picLocks noChangeAspect="1"/>
+          </p:cNvPicPr>
+          <p:nvPr/>
+        </p:nvPicPr>
+        <p:blipFill>
+          <a:blip r:embed="rId2"/>
+          <a:stretch>
+            <a:fillRect/>
+          </a:stretch>
+        </p:blipFill>
+        <p:spPr>
+          <a:xfrm>
+            <a:off x="3327465" y="1947221"/>
+            <a:ext cx="1956690" cy="2129339"/>
+          </a:xfrm>
+          <a:prstGeom prst="rect">
+            <a:avLst/>
+          </a:prstGeom>
+        </p:spPr>
+      </p:pic>
+      <p:sp>
+        <p:nvSpPr>
+          <p:cNvPr id="16" name="TextBox 15">
+            <a:extLst>
+              <a:ext uri="{FF2B5EF4-FFF2-40B4-BE49-F238E27FC236}">
+                <a16:creationId xmlns:a16="http://schemas.microsoft.com/office/drawing/2014/main" id="{3850E132-CE44-4FA8-12B2-AB69839EF53D}"/>
+              </a:ext>
+            </a:extLst>
+          </p:cNvPr>
+          <p:cNvSpPr txBox="1"/>
+          <p:nvPr/>
+        </p:nvSpPr>
+        <p:spPr>
+          <a:xfrm>
+            <a:off x="5225241" y="2064923"/>
+            <a:ext cx="2931944" cy="1477328"/>
+          </a:xfrm>
+          <a:prstGeom prst="rect">
+            <a:avLst/>
+          </a:prstGeom>
+          <a:noFill/>
+        </p:spPr>
+        <p:txBody>
+          <a:bodyPr wrap="square" rtlCol="0">
+            <a:spAutoFit/>
+          </a:bodyPr>
+          <a:lstStyle/>
+          <a:p>
+            <a:pPr algn="ctr"/>
+            <a:r>
+              <a:rPr lang="en-US" sz="9000" b="1" dirty="0">
+                <a:solidFill>
+                  <a:srgbClr val="545455"/>
+                </a:solidFill>
+                <a:latin typeface="SF Orson Casual Medium" pitchFamily="2" charset="0"/>
+              </a:rPr>
+              <a:t>RCM</a:t>
+            </a:r>
+          </a:p>
+        </p:txBody>
+      </p:sp>
+      <p:sp>
+        <p:nvSpPr>
+          <p:cNvPr id="2" name="TextBox 1">
+            <a:extLst>
+              <a:ext uri="{FF2B5EF4-FFF2-40B4-BE49-F238E27FC236}">
+                <a16:creationId xmlns:a16="http://schemas.microsoft.com/office/drawing/2014/main" id="{35E25FF8-0506-8A6F-340C-46F748CA9204}"/>
+              </a:ext>
+            </a:extLst>
+          </p:cNvPr>
+          <p:cNvSpPr txBox="1"/>
+          <p:nvPr/>
+        </p:nvSpPr>
+        <p:spPr>
+          <a:xfrm>
+            <a:off x="5082215" y="3368674"/>
+            <a:ext cx="3217997" cy="707886"/>
+          </a:xfrm>
+          <a:prstGeom prst="rect">
+            <a:avLst/>
+          </a:prstGeom>
+          <a:noFill/>
+        </p:spPr>
+        <p:txBody>
+          <a:bodyPr wrap="none" rtlCol="0">
+            <a:spAutoFit/>
+          </a:bodyPr>
+          <a:lstStyle/>
+          <a:p>
+            <a:pPr algn="ctr"/>
+            <a:r>
+              <a:rPr lang="en-US" sz="4000" b="1" dirty="0">
+                <a:solidFill>
+                  <a:srgbClr val="545455"/>
+                </a:solidFill>
+                <a:latin typeface="SF Orson Casual Medium" pitchFamily="2" charset="0"/>
+              </a:rPr>
+              <a:t>Cooperative</a:t>
+            </a:r>
+          </a:p>
+        </p:txBody>
+      </p:sp>
+    </p:spTree>
+    <p:extLst>
+      <p:ext uri="{BB962C8B-B14F-4D97-AF65-F5344CB8AC3E}">
+        <p14:creationId xmlns:p14="http://schemas.microsoft.com/office/powerpoint/2010/main" val="991837179"/>
+      </p:ext>
+    </p:extLst>
+  </p:cSld>
+  <p:clrMapOvr>
+    <a:masterClrMapping/>
+  </p:clrMapOvr>
+</p:sld>
+</file>
+
+<file path=ppt/slides/slide11.xml><?xml version="1.0" encoding="utf-8"?>
+<p:sld xmlns:a="http://schemas.openxmlformats.org/drawingml/2006/main" xmlns:r="http://schemas.openxmlformats.org/officeDocument/2006/relationships" xmlns:p="http://schemas.openxmlformats.org/presentationml/2006/main">
+  <p:cSld>
+    <p:spTree>
+      <p:nvGrpSpPr>
+        <p:cNvPr id="1" name="">
+          <a:extLst>
+            <a:ext uri="{FF2B5EF4-FFF2-40B4-BE49-F238E27FC236}">
               <a16:creationId xmlns:a16="http://schemas.microsoft.com/office/drawing/2014/main" id="{E5D8A59F-3D34-86C7-6062-1BFC2F8FF374}"/>
             </a:ext>
           </a:extLst>
@@ -4322,7 +4527,7 @@
 </p:sld>
 </file>
 
-<file path=ppt/slides/slide11.xml><?xml version="1.0" encoding="utf-8"?>
+<file path=ppt/slides/slide12.xml><?xml version="1.0" encoding="utf-8"?>
 <p:sld xmlns:a="http://schemas.openxmlformats.org/drawingml/2006/main" xmlns:r="http://schemas.openxmlformats.org/officeDocument/2006/relationships" xmlns:p="http://schemas.openxmlformats.org/presentationml/2006/main">
   <p:cSld>
     <p:spTree>
@@ -4910,7 +5115,7 @@
         </p:blipFill>
         <p:spPr>
           <a:xfrm>
-            <a:off x="4000874" y="4047691"/>
+            <a:off x="3916497" y="3960831"/>
             <a:ext cx="7772400" cy="1034617"/>
           </a:xfrm>
           <a:prstGeom prst="rect">
@@ -5264,6 +5469,180 @@
     <p:extLst>
       <p:ext uri="{BB962C8B-B14F-4D97-AF65-F5344CB8AC3E}">
         <p14:creationId xmlns:p14="http://schemas.microsoft.com/office/powerpoint/2010/main" val="193331974"/>
+      </p:ext>
+    </p:extLst>
+  </p:cSld>
+  <p:clrMapOvr>
+    <a:masterClrMapping/>
+  </p:clrMapOvr>
+</p:sld>
+</file>
+
+<file path=ppt/slides/slide13.xml><?xml version="1.0" encoding="utf-8"?>
+<p:sld xmlns:a="http://schemas.openxmlformats.org/drawingml/2006/main" xmlns:r="http://schemas.openxmlformats.org/officeDocument/2006/relationships" xmlns:p="http://schemas.openxmlformats.org/presentationml/2006/main">
+  <p:cSld>
+    <p:spTree>
+      <p:nvGrpSpPr>
+        <p:cNvPr id="1" name=""/>
+        <p:cNvGrpSpPr/>
+        <p:nvPr/>
+      </p:nvGrpSpPr>
+      <p:grpSpPr>
+        <a:xfrm>
+          <a:off x="0" y="0"/>
+          <a:ext cx="0" cy="0"/>
+          <a:chOff x="0" y="0"/>
+          <a:chExt cx="0" cy="0"/>
+        </a:xfrm>
+      </p:grpSpPr>
+      <p:pic>
+        <p:nvPicPr>
+          <p:cNvPr id="4" name="Picture 3" descr="A white and blue objects&#10;&#10;AI-generated content may be incorrect.">
+            <a:extLst>
+              <a:ext uri="{FF2B5EF4-FFF2-40B4-BE49-F238E27FC236}">
+                <a16:creationId xmlns:a16="http://schemas.microsoft.com/office/drawing/2014/main" id="{19061012-4259-1960-4AC2-FFD6745F6401}"/>
+              </a:ext>
+            </a:extLst>
+          </p:cNvPr>
+          <p:cNvPicPr>
+            <a:picLocks noChangeAspect="1"/>
+          </p:cNvPicPr>
+          <p:nvPr/>
+        </p:nvPicPr>
+        <p:blipFill>
+          <a:blip r:embed="rId2"/>
+          <a:stretch>
+            <a:fillRect/>
+          </a:stretch>
+        </p:blipFill>
+        <p:spPr>
+          <a:xfrm>
+            <a:off x="2514600" y="604585"/>
+            <a:ext cx="6858000" cy="5140830"/>
+          </a:xfrm>
+          <a:prstGeom prst="rect">
+            <a:avLst/>
+          </a:prstGeom>
+        </p:spPr>
+      </p:pic>
+      <p:sp>
+        <p:nvSpPr>
+          <p:cNvPr id="5" name="TextBox 4">
+            <a:extLst>
+              <a:ext uri="{FF2B5EF4-FFF2-40B4-BE49-F238E27FC236}">
+                <a16:creationId xmlns:a16="http://schemas.microsoft.com/office/drawing/2014/main" id="{B1F8E29B-71A2-5D0E-D8FA-080D98F10C61}"/>
+              </a:ext>
+            </a:extLst>
+          </p:cNvPr>
+          <p:cNvSpPr txBox="1"/>
+          <p:nvPr/>
+        </p:nvSpPr>
+        <p:spPr>
+          <a:xfrm>
+            <a:off x="3409950" y="2540913"/>
+            <a:ext cx="5067300" cy="707886"/>
+          </a:xfrm>
+          <a:prstGeom prst="rect">
+            <a:avLst/>
+          </a:prstGeom>
+          <a:noFill/>
+        </p:spPr>
+        <p:txBody>
+          <a:bodyPr wrap="square" rtlCol="0">
+            <a:spAutoFit/>
+          </a:bodyPr>
+          <a:lstStyle/>
+          <a:p>
+            <a:pPr algn="ctr"/>
+            <a:r>
+              <a:rPr lang="en-US" sz="2000" dirty="0">
+                <a:solidFill>
+                  <a:schemeClr val="accent1">
+                    <a:lumMod val="50000"/>
+                  </a:schemeClr>
+                </a:solidFill>
+                <a:latin typeface="Montserrat" panose="02000505000000020004" pitchFamily="2" charset="77"/>
+              </a:rPr>
+              <a:t>We believe in the power of collaboration and community</a:t>
+            </a:r>
+          </a:p>
+        </p:txBody>
+      </p:sp>
+      <p:sp>
+        <p:nvSpPr>
+          <p:cNvPr id="8" name="TextBox 7">
+            <a:extLst>
+              <a:ext uri="{FF2B5EF4-FFF2-40B4-BE49-F238E27FC236}">
+                <a16:creationId xmlns:a16="http://schemas.microsoft.com/office/drawing/2014/main" id="{85F31144-5AE5-F6AE-1D83-4C4D89F51F68}"/>
+              </a:ext>
+            </a:extLst>
+          </p:cNvPr>
+          <p:cNvSpPr txBox="1"/>
+          <p:nvPr/>
+        </p:nvSpPr>
+        <p:spPr>
+          <a:xfrm>
+            <a:off x="3409950" y="3248799"/>
+            <a:ext cx="5067300" cy="276999"/>
+          </a:xfrm>
+          <a:prstGeom prst="rect">
+            <a:avLst/>
+          </a:prstGeom>
+          <a:noFill/>
+        </p:spPr>
+        <p:txBody>
+          <a:bodyPr wrap="square" rtlCol="0">
+            <a:spAutoFit/>
+          </a:bodyPr>
+          <a:lstStyle/>
+          <a:p>
+            <a:pPr algn="ctr"/>
+            <a:r>
+              <a:rPr lang="en-US" sz="1200" dirty="0">
+                <a:solidFill>
+                  <a:srgbClr val="637F8D"/>
+                </a:solidFill>
+                <a:latin typeface="Montserrat" panose="02000505000000020004" pitchFamily="2" charset="77"/>
+              </a:rPr>
+              <a:t>Research Community Management Cooperative</a:t>
+            </a:r>
+          </a:p>
+        </p:txBody>
+      </p:sp>
+      <p:pic>
+        <p:nvPicPr>
+          <p:cNvPr id="12" name="Picture 11" descr="A logo with a star&#10;&#10;AI-generated content may be incorrect.">
+            <a:extLst>
+              <a:ext uri="{FF2B5EF4-FFF2-40B4-BE49-F238E27FC236}">
+                <a16:creationId xmlns:a16="http://schemas.microsoft.com/office/drawing/2014/main" id="{CA63E3B8-FDED-011F-8A9B-6FCDD8F532AF}"/>
+              </a:ext>
+            </a:extLst>
+          </p:cNvPr>
+          <p:cNvPicPr>
+            <a:picLocks noChangeAspect="1"/>
+          </p:cNvPicPr>
+          <p:nvPr/>
+        </p:nvPicPr>
+        <p:blipFill>
+          <a:blip r:embed="rId3"/>
+          <a:stretch>
+            <a:fillRect/>
+          </a:stretch>
+        </p:blipFill>
+        <p:spPr>
+          <a:xfrm>
+            <a:off x="8745203" y="2345165"/>
+            <a:ext cx="359443" cy="391495"/>
+          </a:xfrm>
+          <a:prstGeom prst="rect">
+            <a:avLst/>
+          </a:prstGeom>
+        </p:spPr>
+      </p:pic>
+    </p:spTree>
+    <p:extLst>
+      <p:ext uri="{BB962C8B-B14F-4D97-AF65-F5344CB8AC3E}">
+        <p14:creationId xmlns:p14="http://schemas.microsoft.com/office/powerpoint/2010/main" val="3804967102"/>
       </p:ext>
     </p:extLst>
   </p:cSld>
@@ -5592,116 +5971,137 @@
           <a:chExt cx="0" cy="0"/>
         </a:xfrm>
       </p:grpSpPr>
-      <p:pic>
-        <p:nvPicPr>
-          <p:cNvPr id="15" name="Picture 14">
-            <a:extLst>
-              <a:ext uri="{FF2B5EF4-FFF2-40B4-BE49-F238E27FC236}">
-                <a16:creationId xmlns:a16="http://schemas.microsoft.com/office/drawing/2014/main" id="{7DAEF6B5-E232-7248-4DCD-902F9DB96869}"/>
-              </a:ext>
-            </a:extLst>
-          </p:cNvPr>
-          <p:cNvPicPr>
-            <a:picLocks noChangeAspect="1"/>
-          </p:cNvPicPr>
+      <p:grpSp>
+        <p:nvGrpSpPr>
+          <p:cNvPr id="2" name="Group 1">
+            <a:extLst>
+              <a:ext uri="{FF2B5EF4-FFF2-40B4-BE49-F238E27FC236}">
+                <a16:creationId xmlns:a16="http://schemas.microsoft.com/office/drawing/2014/main" id="{D09EFF0C-069A-F548-A200-428A26541F1B}"/>
+              </a:ext>
+            </a:extLst>
+          </p:cNvPr>
+          <p:cNvGrpSpPr/>
           <p:nvPr/>
-        </p:nvPicPr>
-        <p:blipFill>
-          <a:blip r:embed="rId2"/>
-          <a:stretch>
-            <a:fillRect/>
-          </a:stretch>
-        </p:blipFill>
-        <p:spPr>
+        </p:nvGrpSpPr>
+        <p:grpSpPr>
           <a:xfrm>
             <a:off x="1167789" y="1256294"/>
-            <a:ext cx="1996540" cy="2172706"/>
-          </a:xfrm>
-          <a:prstGeom prst="rect">
-            <a:avLst/>
-          </a:prstGeom>
-        </p:spPr>
-      </p:pic>
-      <p:sp>
-        <p:nvSpPr>
-          <p:cNvPr id="16" name="TextBox 15">
-            <a:extLst>
-              <a:ext uri="{FF2B5EF4-FFF2-40B4-BE49-F238E27FC236}">
-                <a16:creationId xmlns:a16="http://schemas.microsoft.com/office/drawing/2014/main" id="{69A27A11-989A-D3D1-E9CB-A4F2DA2C232B}"/>
-              </a:ext>
-            </a:extLst>
-          </p:cNvPr>
-          <p:cNvSpPr txBox="1"/>
-          <p:nvPr/>
-        </p:nvSpPr>
-        <p:spPr>
-          <a:xfrm>
-            <a:off x="3323082" y="1551684"/>
-            <a:ext cx="8141909" cy="1246495"/>
-          </a:xfrm>
-          <a:prstGeom prst="rect">
-            <a:avLst/>
-          </a:prstGeom>
-          <a:noFill/>
-        </p:spPr>
-        <p:txBody>
-          <a:bodyPr wrap="none" rtlCol="0">
-            <a:spAutoFit/>
-          </a:bodyPr>
-          <a:lstStyle/>
-          <a:p>
-            <a:r>
-              <a:rPr lang="en-US" sz="7500" b="1" dirty="0">
-                <a:solidFill>
-                  <a:srgbClr val="545455"/>
-                </a:solidFill>
-                <a:latin typeface="SF Orson Casual Medium" pitchFamily="2" charset="0"/>
-              </a:rPr>
-              <a:t>RCM Cooperative</a:t>
-            </a:r>
-          </a:p>
-        </p:txBody>
-      </p:sp>
-      <p:sp>
-        <p:nvSpPr>
-          <p:cNvPr id="17" name="TextBox 16">
-            <a:extLst>
-              <a:ext uri="{FF2B5EF4-FFF2-40B4-BE49-F238E27FC236}">
-                <a16:creationId xmlns:a16="http://schemas.microsoft.com/office/drawing/2014/main" id="{1DAA92DE-3F47-D461-4A54-D721976E6B3D}"/>
-              </a:ext>
-            </a:extLst>
-          </p:cNvPr>
-          <p:cNvSpPr txBox="1"/>
-          <p:nvPr/>
-        </p:nvSpPr>
-        <p:spPr>
-          <a:xfrm>
-            <a:off x="3323082" y="2798179"/>
-            <a:ext cx="7858241" cy="500778"/>
-          </a:xfrm>
-          <a:prstGeom prst="rect">
-            <a:avLst/>
-          </a:prstGeom>
-          <a:noFill/>
-        </p:spPr>
-        <p:txBody>
-          <a:bodyPr wrap="none" rtlCol="0">
-            <a:spAutoFit/>
-          </a:bodyPr>
-          <a:lstStyle/>
-          <a:p>
-            <a:r>
-              <a:rPr lang="en-US" sz="2600" dirty="0">
-                <a:solidFill>
-                  <a:srgbClr val="545455"/>
-                </a:solidFill>
-                <a:latin typeface="Montserrat" panose="02000505000000020004" pitchFamily="2" charset="77"/>
-              </a:rPr>
-              <a:t>equitable research community management</a:t>
-            </a:r>
-          </a:p>
-        </p:txBody>
-      </p:sp>
+            <a:ext cx="10297202" cy="2172706"/>
+            <a:chOff x="1167789" y="1256294"/>
+            <a:chExt cx="10297202" cy="2172706"/>
+          </a:xfrm>
+        </p:grpSpPr>
+        <p:pic>
+          <p:nvPicPr>
+            <p:cNvPr id="15" name="Picture 14">
+              <a:extLst>
+                <a:ext uri="{FF2B5EF4-FFF2-40B4-BE49-F238E27FC236}">
+                  <a16:creationId xmlns:a16="http://schemas.microsoft.com/office/drawing/2014/main" id="{7DAEF6B5-E232-7248-4DCD-902F9DB96869}"/>
+                </a:ext>
+              </a:extLst>
+            </p:cNvPr>
+            <p:cNvPicPr>
+              <a:picLocks noChangeAspect="1"/>
+            </p:cNvPicPr>
+            <p:nvPr/>
+          </p:nvPicPr>
+          <p:blipFill>
+            <a:blip r:embed="rId2"/>
+            <a:stretch>
+              <a:fillRect/>
+            </a:stretch>
+          </p:blipFill>
+          <p:spPr>
+            <a:xfrm>
+              <a:off x="1167789" y="1256294"/>
+              <a:ext cx="1996540" cy="2172706"/>
+            </a:xfrm>
+            <a:prstGeom prst="rect">
+              <a:avLst/>
+            </a:prstGeom>
+          </p:spPr>
+        </p:pic>
+        <p:sp>
+          <p:nvSpPr>
+            <p:cNvPr id="16" name="TextBox 15">
+              <a:extLst>
+                <a:ext uri="{FF2B5EF4-FFF2-40B4-BE49-F238E27FC236}">
+                  <a16:creationId xmlns:a16="http://schemas.microsoft.com/office/drawing/2014/main" id="{69A27A11-989A-D3D1-E9CB-A4F2DA2C232B}"/>
+                </a:ext>
+              </a:extLst>
+            </p:cNvPr>
+            <p:cNvSpPr txBox="1"/>
+            <p:nvPr/>
+          </p:nvSpPr>
+          <p:spPr>
+            <a:xfrm>
+              <a:off x="3323082" y="1551684"/>
+              <a:ext cx="8141909" cy="1246495"/>
+            </a:xfrm>
+            <a:prstGeom prst="rect">
+              <a:avLst/>
+            </a:prstGeom>
+            <a:noFill/>
+          </p:spPr>
+          <p:txBody>
+            <a:bodyPr wrap="none" rtlCol="0">
+              <a:spAutoFit/>
+            </a:bodyPr>
+            <a:lstStyle/>
+            <a:p>
+              <a:r>
+                <a:rPr lang="en-US" sz="7500" b="1" dirty="0">
+                  <a:solidFill>
+                    <a:srgbClr val="545455"/>
+                  </a:solidFill>
+                  <a:latin typeface="SF Orson Casual Medium" pitchFamily="2" charset="0"/>
+                </a:rPr>
+                <a:t>RCM Cooperative</a:t>
+              </a:r>
+            </a:p>
+          </p:txBody>
+        </p:sp>
+        <p:sp>
+          <p:nvSpPr>
+            <p:cNvPr id="17" name="TextBox 16">
+              <a:extLst>
+                <a:ext uri="{FF2B5EF4-FFF2-40B4-BE49-F238E27FC236}">
+                  <a16:creationId xmlns:a16="http://schemas.microsoft.com/office/drawing/2014/main" id="{1DAA92DE-3F47-D461-4A54-D721976E6B3D}"/>
+                </a:ext>
+              </a:extLst>
+            </p:cNvPr>
+            <p:cNvSpPr txBox="1"/>
+            <p:nvPr/>
+          </p:nvSpPr>
+          <p:spPr>
+            <a:xfrm>
+              <a:off x="3323082" y="2798179"/>
+              <a:ext cx="7858241" cy="500778"/>
+            </a:xfrm>
+            <a:prstGeom prst="rect">
+              <a:avLst/>
+            </a:prstGeom>
+            <a:noFill/>
+          </p:spPr>
+          <p:txBody>
+            <a:bodyPr wrap="none" rtlCol="0">
+              <a:spAutoFit/>
+            </a:bodyPr>
+            <a:lstStyle/>
+            <a:p>
+              <a:r>
+                <a:rPr lang="en-US" sz="2600" dirty="0">
+                  <a:solidFill>
+                    <a:srgbClr val="545455"/>
+                  </a:solidFill>
+                  <a:latin typeface="Montserrat" panose="02000505000000020004" pitchFamily="2" charset="77"/>
+                </a:rPr>
+                <a:t>equitable research community management</a:t>
+              </a:r>
+            </a:p>
+          </p:txBody>
+        </p:sp>
+      </p:grpSp>
     </p:spTree>
     <p:extLst>
       <p:ext uri="{BB962C8B-B14F-4D97-AF65-F5344CB8AC3E}">
@@ -5716,6 +6116,225 @@
 </file>
 
 <file path=ppt/slides/slide4.xml><?xml version="1.0" encoding="utf-8"?>
+<p:sld xmlns:a="http://schemas.openxmlformats.org/drawingml/2006/main" xmlns:r="http://schemas.openxmlformats.org/officeDocument/2006/relationships" xmlns:p="http://schemas.openxmlformats.org/presentationml/2006/main">
+  <p:cSld>
+    <p:spTree>
+      <p:nvGrpSpPr>
+        <p:cNvPr id="1" name="">
+          <a:extLst>
+            <a:ext uri="{FF2B5EF4-FFF2-40B4-BE49-F238E27FC236}">
+              <a16:creationId xmlns:a16="http://schemas.microsoft.com/office/drawing/2014/main" id="{ABDF46B5-C9AA-66B4-AECE-820B41360BFE}"/>
+            </a:ext>
+          </a:extLst>
+        </p:cNvPr>
+        <p:cNvGrpSpPr/>
+        <p:nvPr/>
+      </p:nvGrpSpPr>
+      <p:grpSpPr>
+        <a:xfrm>
+          <a:off x="0" y="0"/>
+          <a:ext cx="0" cy="0"/>
+          <a:chOff x="0" y="0"/>
+          <a:chExt cx="0" cy="0"/>
+        </a:xfrm>
+      </p:grpSpPr>
+      <p:sp>
+        <p:nvSpPr>
+          <p:cNvPr id="8" name="Rectangle 7">
+            <a:extLst>
+              <a:ext uri="{FF2B5EF4-FFF2-40B4-BE49-F238E27FC236}">
+                <a16:creationId xmlns:a16="http://schemas.microsoft.com/office/drawing/2014/main" id="{742DB6F1-2973-D97D-F806-FF0D30E91F1F}"/>
+              </a:ext>
+            </a:extLst>
+          </p:cNvPr>
+          <p:cNvSpPr>
+            <a:spLocks noChangeAspect="1"/>
+          </p:cNvSpPr>
+          <p:nvPr/>
+        </p:nvSpPr>
+        <p:spPr>
+          <a:xfrm>
+            <a:off x="878802" y="1121390"/>
+            <a:ext cx="10733168" cy="2683292"/>
+          </a:xfrm>
+          <a:prstGeom prst="rect">
+            <a:avLst/>
+          </a:prstGeom>
+          <a:noFill/>
+          <a:ln>
+            <a:noFill/>
+          </a:ln>
+        </p:spPr>
+        <p:style>
+          <a:lnRef idx="2">
+            <a:schemeClr val="accent1">
+              <a:shade val="15000"/>
+            </a:schemeClr>
+          </a:lnRef>
+          <a:fillRef idx="1">
+            <a:schemeClr val="accent1"/>
+          </a:fillRef>
+          <a:effectRef idx="0">
+            <a:schemeClr val="accent1"/>
+          </a:effectRef>
+          <a:fontRef idx="minor">
+            <a:schemeClr val="lt1"/>
+          </a:fontRef>
+        </p:style>
+        <p:txBody>
+          <a:bodyPr rtlCol="0" anchor="ctr"/>
+          <a:lstStyle/>
+          <a:p>
+            <a:pPr algn="ctr"/>
+            <a:endParaRPr lang="en-US"/>
+          </a:p>
+        </p:txBody>
+      </p:sp>
+      <p:grpSp>
+        <p:nvGrpSpPr>
+          <p:cNvPr id="2" name="Group 1">
+            <a:extLst>
+              <a:ext uri="{FF2B5EF4-FFF2-40B4-BE49-F238E27FC236}">
+                <a16:creationId xmlns:a16="http://schemas.microsoft.com/office/drawing/2014/main" id="{9D9AE90F-3401-8BC1-BA6B-B1EE0CB4064E}"/>
+              </a:ext>
+            </a:extLst>
+          </p:cNvPr>
+          <p:cNvGrpSpPr/>
+          <p:nvPr/>
+        </p:nvGrpSpPr>
+        <p:grpSpPr>
+          <a:xfrm>
+            <a:off x="1096785" y="1376683"/>
+            <a:ext cx="10297202" cy="2172706"/>
+            <a:chOff x="1167789" y="1256294"/>
+            <a:chExt cx="10297202" cy="2172706"/>
+          </a:xfrm>
+        </p:grpSpPr>
+        <p:pic>
+          <p:nvPicPr>
+            <p:cNvPr id="15" name="Picture 14">
+              <a:extLst>
+                <a:ext uri="{FF2B5EF4-FFF2-40B4-BE49-F238E27FC236}">
+                  <a16:creationId xmlns:a16="http://schemas.microsoft.com/office/drawing/2014/main" id="{645EBF39-8797-7394-7D92-B22CD631DB92}"/>
+                </a:ext>
+              </a:extLst>
+            </p:cNvPr>
+            <p:cNvPicPr>
+              <a:picLocks noChangeAspect="1"/>
+            </p:cNvPicPr>
+            <p:nvPr/>
+          </p:nvPicPr>
+          <p:blipFill>
+            <a:blip r:embed="rId2"/>
+            <a:stretch>
+              <a:fillRect/>
+            </a:stretch>
+          </p:blipFill>
+          <p:spPr>
+            <a:xfrm>
+              <a:off x="1167789" y="1256294"/>
+              <a:ext cx="1996540" cy="2172706"/>
+            </a:xfrm>
+            <a:prstGeom prst="rect">
+              <a:avLst/>
+            </a:prstGeom>
+          </p:spPr>
+        </p:pic>
+        <p:sp>
+          <p:nvSpPr>
+            <p:cNvPr id="16" name="TextBox 15">
+              <a:extLst>
+                <a:ext uri="{FF2B5EF4-FFF2-40B4-BE49-F238E27FC236}">
+                  <a16:creationId xmlns:a16="http://schemas.microsoft.com/office/drawing/2014/main" id="{9D5688E7-131F-71F6-D51F-5C4D4FB6E067}"/>
+                </a:ext>
+              </a:extLst>
+            </p:cNvPr>
+            <p:cNvSpPr txBox="1"/>
+            <p:nvPr/>
+          </p:nvSpPr>
+          <p:spPr>
+            <a:xfrm>
+              <a:off x="3323082" y="1551684"/>
+              <a:ext cx="8141909" cy="1246495"/>
+            </a:xfrm>
+            <a:prstGeom prst="rect">
+              <a:avLst/>
+            </a:prstGeom>
+            <a:noFill/>
+          </p:spPr>
+          <p:txBody>
+            <a:bodyPr wrap="none" rtlCol="0">
+              <a:spAutoFit/>
+            </a:bodyPr>
+            <a:lstStyle/>
+            <a:p>
+              <a:r>
+                <a:rPr lang="en-US" sz="7500" b="1" dirty="0">
+                  <a:solidFill>
+                    <a:srgbClr val="545455"/>
+                  </a:solidFill>
+                  <a:latin typeface="SF Orson Casual Medium" pitchFamily="2" charset="0"/>
+                </a:rPr>
+                <a:t>RCM Cooperative</a:t>
+              </a:r>
+            </a:p>
+          </p:txBody>
+        </p:sp>
+        <p:sp>
+          <p:nvSpPr>
+            <p:cNvPr id="17" name="TextBox 16">
+              <a:extLst>
+                <a:ext uri="{FF2B5EF4-FFF2-40B4-BE49-F238E27FC236}">
+                  <a16:creationId xmlns:a16="http://schemas.microsoft.com/office/drawing/2014/main" id="{8498314F-A0DD-D8F3-A108-7F6759B04CE3}"/>
+                </a:ext>
+              </a:extLst>
+            </p:cNvPr>
+            <p:cNvSpPr txBox="1"/>
+            <p:nvPr/>
+          </p:nvSpPr>
+          <p:spPr>
+            <a:xfrm>
+              <a:off x="3323082" y="2798179"/>
+              <a:ext cx="7858241" cy="500778"/>
+            </a:xfrm>
+            <a:prstGeom prst="rect">
+              <a:avLst/>
+            </a:prstGeom>
+            <a:noFill/>
+          </p:spPr>
+          <p:txBody>
+            <a:bodyPr wrap="none" rtlCol="0">
+              <a:spAutoFit/>
+            </a:bodyPr>
+            <a:lstStyle/>
+            <a:p>
+              <a:r>
+                <a:rPr lang="en-US" sz="2600" dirty="0">
+                  <a:solidFill>
+                    <a:srgbClr val="545455"/>
+                  </a:solidFill>
+                  <a:latin typeface="Montserrat" panose="02000505000000020004" pitchFamily="2" charset="77"/>
+                </a:rPr>
+                <a:t>equitable research community management</a:t>
+              </a:r>
+            </a:p>
+          </p:txBody>
+        </p:sp>
+      </p:grpSp>
+    </p:spTree>
+    <p:extLst>
+      <p:ext uri="{BB962C8B-B14F-4D97-AF65-F5344CB8AC3E}">
+        <p14:creationId xmlns:p14="http://schemas.microsoft.com/office/powerpoint/2010/main" val="3067319856"/>
+      </p:ext>
+    </p:extLst>
+  </p:cSld>
+  <p:clrMapOvr>
+    <a:masterClrMapping/>
+  </p:clrMapOvr>
+</p:sld>
+</file>
+
+<file path=ppt/slides/slide5.xml><?xml version="1.0" encoding="utf-8"?>
 <p:sld xmlns:a="http://schemas.openxmlformats.org/drawingml/2006/main" xmlns:r="http://schemas.openxmlformats.org/officeDocument/2006/relationships" xmlns:p="http://schemas.openxmlformats.org/presentationml/2006/main">
   <p:cSld>
     <p:spTree>
@@ -5962,7 +6581,7 @@
 </p:sld>
 </file>
 
-<file path=ppt/slides/slide5.xml><?xml version="1.0" encoding="utf-8"?>
+<file path=ppt/slides/slide6.xml><?xml version="1.0" encoding="utf-8"?>
 <p:sld xmlns:a="http://schemas.openxmlformats.org/drawingml/2006/main" xmlns:r="http://schemas.openxmlformats.org/officeDocument/2006/relationships" xmlns:p="http://schemas.openxmlformats.org/presentationml/2006/main">
   <p:cSld>
     <p:spTree>
@@ -6153,7 +6772,7 @@
 </p:sld>
 </file>
 
-<file path=ppt/slides/slide6.xml><?xml version="1.0" encoding="utf-8"?>
+<file path=ppt/slides/slide7.xml><?xml version="1.0" encoding="utf-8"?>
 <p:sld xmlns:a="http://schemas.openxmlformats.org/drawingml/2006/main" xmlns:r="http://schemas.openxmlformats.org/officeDocument/2006/relationships" xmlns:p="http://schemas.openxmlformats.org/presentationml/2006/main">
   <p:cSld>
     <p:spTree>
@@ -6350,7 +6969,7 @@
 </p:sld>
 </file>
 
-<file path=ppt/slides/slide7.xml><?xml version="1.0" encoding="utf-8"?>
+<file path=ppt/slides/slide8.xml><?xml version="1.0" encoding="utf-8"?>
 <p:sld xmlns:a="http://schemas.openxmlformats.org/drawingml/2006/main" xmlns:r="http://schemas.openxmlformats.org/officeDocument/2006/relationships" xmlns:p="http://schemas.openxmlformats.org/presentationml/2006/main">
   <p:cSld>
     <p:bg>
@@ -6527,7 +7146,7 @@
 </p:sld>
 </file>
 
-<file path=ppt/slides/slide8.xml><?xml version="1.0" encoding="utf-8"?>
+<file path=ppt/slides/slide9.xml><?xml version="1.0" encoding="utf-8"?>
 <p:sld xmlns:a="http://schemas.openxmlformats.org/drawingml/2006/main" xmlns:r="http://schemas.openxmlformats.org/officeDocument/2006/relationships" xmlns:p="http://schemas.openxmlformats.org/presentationml/2006/main">
   <p:cSld>
     <p:bg>
@@ -6699,154 +7318,6 @@
     <p:extLst>
       <p:ext uri="{BB962C8B-B14F-4D97-AF65-F5344CB8AC3E}">
         <p14:creationId xmlns:p14="http://schemas.microsoft.com/office/powerpoint/2010/main" val="2701810344"/>
-      </p:ext>
-    </p:extLst>
-  </p:cSld>
-  <p:clrMapOvr>
-    <a:masterClrMapping/>
-  </p:clrMapOvr>
-</p:sld>
-</file>
-
-<file path=ppt/slides/slide9.xml><?xml version="1.0" encoding="utf-8"?>
-<p:sld xmlns:a="http://schemas.openxmlformats.org/drawingml/2006/main" xmlns:r="http://schemas.openxmlformats.org/officeDocument/2006/relationships" xmlns:p="http://schemas.openxmlformats.org/presentationml/2006/main">
-  <p:cSld>
-    <p:spTree>
-      <p:nvGrpSpPr>
-        <p:cNvPr id="1" name="">
-          <a:extLst>
-            <a:ext uri="{FF2B5EF4-FFF2-40B4-BE49-F238E27FC236}">
-              <a16:creationId xmlns:a16="http://schemas.microsoft.com/office/drawing/2014/main" id="{57C506CE-72FA-30BE-B8B9-67E1E6B584BF}"/>
-            </a:ext>
-          </a:extLst>
-        </p:cNvPr>
-        <p:cNvGrpSpPr/>
-        <p:nvPr/>
-      </p:nvGrpSpPr>
-      <p:grpSpPr>
-        <a:xfrm>
-          <a:off x="0" y="0"/>
-          <a:ext cx="0" cy="0"/>
-          <a:chOff x="0" y="0"/>
-          <a:chExt cx="0" cy="0"/>
-        </a:xfrm>
-      </p:grpSpPr>
-      <p:pic>
-        <p:nvPicPr>
-          <p:cNvPr id="15" name="Picture 14">
-            <a:extLst>
-              <a:ext uri="{FF2B5EF4-FFF2-40B4-BE49-F238E27FC236}">
-                <a16:creationId xmlns:a16="http://schemas.microsoft.com/office/drawing/2014/main" id="{6FA9B8AC-39F3-952B-3524-296BE5929308}"/>
-              </a:ext>
-            </a:extLst>
-          </p:cNvPr>
-          <p:cNvPicPr>
-            <a:picLocks noChangeAspect="1"/>
-          </p:cNvPicPr>
-          <p:nvPr/>
-        </p:nvPicPr>
-        <p:blipFill>
-          <a:blip r:embed="rId2"/>
-          <a:stretch>
-            <a:fillRect/>
-          </a:stretch>
-        </p:blipFill>
-        <p:spPr>
-          <a:xfrm>
-            <a:off x="3327465" y="1947221"/>
-            <a:ext cx="1956690" cy="2129339"/>
-          </a:xfrm>
-          <a:prstGeom prst="rect">
-            <a:avLst/>
-          </a:prstGeom>
-        </p:spPr>
-      </p:pic>
-      <p:sp>
-        <p:nvSpPr>
-          <p:cNvPr id="16" name="TextBox 15">
-            <a:extLst>
-              <a:ext uri="{FF2B5EF4-FFF2-40B4-BE49-F238E27FC236}">
-                <a16:creationId xmlns:a16="http://schemas.microsoft.com/office/drawing/2014/main" id="{3850E132-CE44-4FA8-12B2-AB69839EF53D}"/>
-              </a:ext>
-            </a:extLst>
-          </p:cNvPr>
-          <p:cNvSpPr txBox="1"/>
-          <p:nvPr/>
-        </p:nvSpPr>
-        <p:spPr>
-          <a:xfrm>
-            <a:off x="5225241" y="2064923"/>
-            <a:ext cx="2931944" cy="1477328"/>
-          </a:xfrm>
-          <a:prstGeom prst="rect">
-            <a:avLst/>
-          </a:prstGeom>
-          <a:noFill/>
-        </p:spPr>
-        <p:txBody>
-          <a:bodyPr wrap="square" rtlCol="0">
-            <a:spAutoFit/>
-          </a:bodyPr>
-          <a:lstStyle/>
-          <a:p>
-            <a:pPr algn="ctr"/>
-            <a:r>
-              <a:rPr lang="en-US" sz="9000" b="1" dirty="0">
-                <a:solidFill>
-                  <a:srgbClr val="545455"/>
-                </a:solidFill>
-                <a:latin typeface="SF Orson Casual Medium" pitchFamily="2" charset="0"/>
-              </a:rPr>
-              <a:t>RCM</a:t>
-            </a:r>
-          </a:p>
-        </p:txBody>
-      </p:sp>
-      <p:sp>
-        <p:nvSpPr>
-          <p:cNvPr id="2" name="TextBox 1">
-            <a:extLst>
-              <a:ext uri="{FF2B5EF4-FFF2-40B4-BE49-F238E27FC236}">
-                <a16:creationId xmlns:a16="http://schemas.microsoft.com/office/drawing/2014/main" id="{35E25FF8-0506-8A6F-340C-46F748CA9204}"/>
-              </a:ext>
-            </a:extLst>
-          </p:cNvPr>
-          <p:cNvSpPr txBox="1"/>
-          <p:nvPr/>
-        </p:nvSpPr>
-        <p:spPr>
-          <a:xfrm>
-            <a:off x="5082215" y="3368674"/>
-            <a:ext cx="3217997" cy="707886"/>
-          </a:xfrm>
-          <a:prstGeom prst="rect">
-            <a:avLst/>
-          </a:prstGeom>
-          <a:noFill/>
-        </p:spPr>
-        <p:txBody>
-          <a:bodyPr wrap="none" rtlCol="0">
-            <a:spAutoFit/>
-          </a:bodyPr>
-          <a:lstStyle/>
-          <a:p>
-            <a:pPr algn="ctr"/>
-            <a:r>
-              <a:rPr lang="en-US" sz="4000" b="1" dirty="0">
-                <a:solidFill>
-                  <a:srgbClr val="545455"/>
-                </a:solidFill>
-                <a:latin typeface="SF Orson Casual Medium" pitchFamily="2" charset="0"/>
-              </a:rPr>
-              <a:t>Cooperative</a:t>
-            </a:r>
-          </a:p>
-        </p:txBody>
-      </p:sp>
-    </p:spTree>
-    <p:extLst>
-      <p:ext uri="{BB962C8B-B14F-4D97-AF65-F5344CB8AC3E}">
-        <p14:creationId xmlns:p14="http://schemas.microsoft.com/office/powerpoint/2010/main" val="991837179"/>
       </p:ext>
     </p:extLst>
   </p:cSld>

</xml_diff>